<commit_message>
Developpement des informations sur le PoE
</commit_message>
<xml_diff>
--- a/Module 214 - Fabrication_Ethernet.pptx
+++ b/Module 214 - Fabrication_Ethernet.pptx
@@ -11,8 +11,9 @@
     <p:sldId id="262" r:id="rId5"/>
     <p:sldId id="263" r:id="rId6"/>
     <p:sldId id="264" r:id="rId7"/>
-    <p:sldId id="266" r:id="rId8"/>
-    <p:sldId id="265" r:id="rId9"/>
+    <p:sldId id="267" r:id="rId8"/>
+    <p:sldId id="266" r:id="rId9"/>
+    <p:sldId id="265" r:id="rId10"/>
   </p:sldIdLst>
   <p:sldSz cx="12192000" cy="6858000"/>
   <p:notesSz cx="6858000" cy="9144000"/>
@@ -310,7 +311,7 @@
           <a:p>
             <a:fld id="{D406E69D-613E-4019-8533-7F772451DAA2}" type="datetimeFigureOut">
               <a:rPr lang="fr-CH" smtClean="0"/>
-              <a:t>18.02.2019</a:t>
+              <a:t>01.04.2019</a:t>
             </a:fld>
             <a:endParaRPr lang="fr-CH"/>
           </a:p>
@@ -746,7 +747,7 @@
           <a:p>
             <a:fld id="{D406E69D-613E-4019-8533-7F772451DAA2}" type="datetimeFigureOut">
               <a:rPr lang="fr-CH" smtClean="0"/>
-              <a:t>18.02.2019</a:t>
+              <a:t>01.04.2019</a:t>
             </a:fld>
             <a:endParaRPr lang="fr-CH"/>
           </a:p>
@@ -996,7 +997,7 @@
           <a:p>
             <a:fld id="{D406E69D-613E-4019-8533-7F772451DAA2}" type="datetimeFigureOut">
               <a:rPr lang="fr-CH" smtClean="0"/>
-              <a:t>18.02.2019</a:t>
+              <a:t>01.04.2019</a:t>
             </a:fld>
             <a:endParaRPr lang="fr-CH"/>
           </a:p>
@@ -1304,7 +1305,7 @@
           <a:p>
             <a:fld id="{D406E69D-613E-4019-8533-7F772451DAA2}" type="datetimeFigureOut">
               <a:rPr lang="fr-CH" smtClean="0"/>
-              <a:t>18.02.2019</a:t>
+              <a:t>01.04.2019</a:t>
             </a:fld>
             <a:endParaRPr lang="fr-CH"/>
           </a:p>
@@ -1622,7 +1623,7 @@
           <a:p>
             <a:fld id="{D406E69D-613E-4019-8533-7F772451DAA2}" type="datetimeFigureOut">
               <a:rPr lang="fr-CH" smtClean="0"/>
-              <a:t>18.02.2019</a:t>
+              <a:t>01.04.2019</a:t>
             </a:fld>
             <a:endParaRPr lang="fr-CH"/>
           </a:p>
@@ -1924,7 +1925,7 @@
           <a:p>
             <a:fld id="{D406E69D-613E-4019-8533-7F772451DAA2}" type="datetimeFigureOut">
               <a:rPr lang="fr-CH" smtClean="0"/>
-              <a:t>18.02.2019</a:t>
+              <a:t>01.04.2019</a:t>
             </a:fld>
             <a:endParaRPr lang="fr-CH"/>
           </a:p>
@@ -2291,7 +2292,7 @@
           <a:p>
             <a:fld id="{D406E69D-613E-4019-8533-7F772451DAA2}" type="datetimeFigureOut">
               <a:rPr lang="fr-CH" smtClean="0"/>
-              <a:t>18.02.2019</a:t>
+              <a:t>01.04.2019</a:t>
             </a:fld>
             <a:endParaRPr lang="fr-CH"/>
           </a:p>
@@ -2465,7 +2466,7 @@
           <a:p>
             <a:fld id="{D406E69D-613E-4019-8533-7F772451DAA2}" type="datetimeFigureOut">
               <a:rPr lang="fr-CH" smtClean="0"/>
-              <a:t>18.02.2019</a:t>
+              <a:t>01.04.2019</a:t>
             </a:fld>
             <a:endParaRPr lang="fr-CH"/>
           </a:p>
@@ -2645,7 +2646,7 @@
           <a:p>
             <a:fld id="{D406E69D-613E-4019-8533-7F772451DAA2}" type="datetimeFigureOut">
               <a:rPr lang="fr-CH" smtClean="0"/>
-              <a:t>18.02.2019</a:t>
+              <a:t>01.04.2019</a:t>
             </a:fld>
             <a:endParaRPr lang="fr-CH"/>
           </a:p>
@@ -2815,7 +2816,7 @@
           <a:p>
             <a:fld id="{D406E69D-613E-4019-8533-7F772451DAA2}" type="datetimeFigureOut">
               <a:rPr lang="fr-CH" smtClean="0"/>
-              <a:t>18.02.2019</a:t>
+              <a:t>01.04.2019</a:t>
             </a:fld>
             <a:endParaRPr lang="fr-CH"/>
           </a:p>
@@ -3065,7 +3066,7 @@
           <a:p>
             <a:fld id="{D406E69D-613E-4019-8533-7F772451DAA2}" type="datetimeFigureOut">
               <a:rPr lang="fr-CH" smtClean="0"/>
-              <a:t>18.02.2019</a:t>
+              <a:t>01.04.2019</a:t>
             </a:fld>
             <a:endParaRPr lang="fr-CH"/>
           </a:p>
@@ -3301,7 +3302,7 @@
           <a:p>
             <a:fld id="{D406E69D-613E-4019-8533-7F772451DAA2}" type="datetimeFigureOut">
               <a:rPr lang="fr-CH" smtClean="0"/>
-              <a:t>18.02.2019</a:t>
+              <a:t>01.04.2019</a:t>
             </a:fld>
             <a:endParaRPr lang="fr-CH"/>
           </a:p>
@@ -3683,7 +3684,7 @@
           <a:p>
             <a:fld id="{D406E69D-613E-4019-8533-7F772451DAA2}" type="datetimeFigureOut">
               <a:rPr lang="fr-CH" smtClean="0"/>
-              <a:t>18.02.2019</a:t>
+              <a:t>01.04.2019</a:t>
             </a:fld>
             <a:endParaRPr lang="fr-CH"/>
           </a:p>
@@ -3801,7 +3802,7 @@
           <a:p>
             <a:fld id="{D406E69D-613E-4019-8533-7F772451DAA2}" type="datetimeFigureOut">
               <a:rPr lang="fr-CH" smtClean="0"/>
-              <a:t>18.02.2019</a:t>
+              <a:t>01.04.2019</a:t>
             </a:fld>
             <a:endParaRPr lang="fr-CH"/>
           </a:p>
@@ -3896,7 +3897,7 @@
           <a:p>
             <a:fld id="{D406E69D-613E-4019-8533-7F772451DAA2}" type="datetimeFigureOut">
               <a:rPr lang="fr-CH" smtClean="0"/>
-              <a:t>18.02.2019</a:t>
+              <a:t>01.04.2019</a:t>
             </a:fld>
             <a:endParaRPr lang="fr-CH"/>
           </a:p>
@@ -4151,7 +4152,7 @@
           <a:p>
             <a:fld id="{D406E69D-613E-4019-8533-7F772451DAA2}" type="datetimeFigureOut">
               <a:rPr lang="fr-CH" smtClean="0"/>
-              <a:t>18.02.2019</a:t>
+              <a:t>01.04.2019</a:t>
             </a:fld>
             <a:endParaRPr lang="fr-CH"/>
           </a:p>
@@ -4434,7 +4435,7 @@
           <a:p>
             <a:fld id="{D406E69D-613E-4019-8533-7F772451DAA2}" type="datetimeFigureOut">
               <a:rPr lang="fr-CH" smtClean="0"/>
-              <a:t>18.02.2019</a:t>
+              <a:t>01.04.2019</a:t>
             </a:fld>
             <a:endParaRPr lang="fr-CH"/>
           </a:p>
@@ -4840,7 +4841,7 @@
           <a:p>
             <a:fld id="{D406E69D-613E-4019-8533-7F772451DAA2}" type="datetimeFigureOut">
               <a:rPr lang="fr-CH" smtClean="0"/>
-              <a:t>18.02.2019</a:t>
+              <a:t>01.04.2019</a:t>
             </a:fld>
             <a:endParaRPr lang="fr-CH"/>
           </a:p>
@@ -5401,13 +5402,7 @@
               <a:rPr lang="fr-CH" sz="4400" dirty="0" smtClean="0">
                 <a:cs typeface="Arial" panose="020B0604020202020204" pitchFamily="34" charset="0"/>
               </a:rPr>
-              <a:t>Module 214 </a:t>
-            </a:r>
-            <a:r>
-              <a:rPr lang="fr-CH" sz="4400" dirty="0" smtClean="0">
-                <a:cs typeface="Arial" panose="020B0604020202020204" pitchFamily="34" charset="0"/>
-              </a:rPr>
-              <a:t>–</a:t>
+              <a:t>Module 214 –</a:t>
             </a:r>
             <a:br>
               <a:rPr lang="fr-CH" sz="4400" dirty="0" smtClean="0">
@@ -5983,6 +5978,87 @@
       </p:grpSpPr>
       <p:sp>
         <p:nvSpPr>
+          <p:cNvPr id="3" name="Content Placeholder 2"/>
+          <p:cNvSpPr>
+            <a:spLocks noGrp="1"/>
+          </p:cNvSpPr>
+          <p:nvPr>
+            <p:ph idx="1"/>
+          </p:nvPr>
+        </p:nvSpPr>
+        <p:spPr/>
+        <p:txBody>
+          <a:bodyPr/>
+          <a:lstStyle/>
+          <a:p>
+            <a:endParaRPr lang="fr-CH" dirty="0"/>
+          </a:p>
+        </p:txBody>
+      </p:sp>
+      <p:sp>
+        <p:nvSpPr>
+          <p:cNvPr id="5" name="Title 1"/>
+          <p:cNvSpPr>
+            <a:spLocks noGrp="1"/>
+          </p:cNvSpPr>
+          <p:nvPr>
+            <p:ph type="title"/>
+          </p:nvPr>
+        </p:nvSpPr>
+        <p:spPr>
+          <a:xfrm>
+            <a:off x="684212" y="4487332"/>
+            <a:ext cx="8534400" cy="1507067"/>
+          </a:xfrm>
+        </p:spPr>
+        <p:txBody>
+          <a:bodyPr/>
+          <a:lstStyle/>
+          <a:p>
+            <a:r>
+              <a:rPr lang="fr-CH" dirty="0" smtClean="0"/>
+              <a:t>La technologie </a:t>
+            </a:r>
+            <a:r>
+              <a:rPr lang="fr-CH" dirty="0" err="1" smtClean="0"/>
+              <a:t>poe</a:t>
+            </a:r>
+            <a:endParaRPr lang="fr-CH" dirty="0"/>
+          </a:p>
+        </p:txBody>
+      </p:sp>
+    </p:spTree>
+    <p:extLst>
+      <p:ext uri="{BB962C8B-B14F-4D97-AF65-F5344CB8AC3E}">
+        <p14:creationId xmlns:p14="http://schemas.microsoft.com/office/powerpoint/2010/main" val="2309920135"/>
+      </p:ext>
+    </p:extLst>
+  </p:cSld>
+  <p:clrMapOvr>
+    <a:masterClrMapping/>
+  </p:clrMapOvr>
+</p:sld>
+</file>
+
+<file path=ppt/slides/slide8.xml><?xml version="1.0" encoding="utf-8"?>
+<p:sld xmlns:a="http://schemas.openxmlformats.org/drawingml/2006/main" xmlns:r="http://schemas.openxmlformats.org/officeDocument/2006/relationships" xmlns:p="http://schemas.openxmlformats.org/presentationml/2006/main">
+  <p:cSld>
+    <p:spTree>
+      <p:nvGrpSpPr>
+        <p:cNvPr id="1" name=""/>
+        <p:cNvGrpSpPr/>
+        <p:nvPr/>
+      </p:nvGrpSpPr>
+      <p:grpSpPr>
+        <a:xfrm>
+          <a:off x="0" y="0"/>
+          <a:ext cx="0" cy="0"/>
+          <a:chOff x="0" y="0"/>
+          <a:chExt cx="0" cy="0"/>
+        </a:xfrm>
+      </p:grpSpPr>
+      <p:sp>
+        <p:nvSpPr>
           <p:cNvPr id="2" name="Title 1"/>
           <p:cNvSpPr>
             <a:spLocks noGrp="1"/>
@@ -6043,7 +6119,7 @@
 </p:sld>
 </file>
 
-<file path=ppt/slides/slide8.xml><?xml version="1.0" encoding="utf-8"?>
+<file path=ppt/slides/slide9.xml><?xml version="1.0" encoding="utf-8"?>
 <p:sld xmlns:a="http://schemas.openxmlformats.org/drawingml/2006/main" xmlns:r="http://schemas.openxmlformats.org/officeDocument/2006/relationships" xmlns:p="http://schemas.openxmlformats.org/presentationml/2006/main">
   <p:cSld>
     <p:spTree>

</xml_diff>

<commit_message>
Modif pptx et doc cours
</commit_message>
<xml_diff>
--- a/Module 214 - Fabrication_Ethernet.pptx
+++ b/Module 214 - Fabrication_Ethernet.pptx
@@ -34,11 +34,10 @@
     <p:sldId id="293" r:id="rId28"/>
     <p:sldId id="294" r:id="rId29"/>
     <p:sldId id="262" r:id="rId30"/>
-    <p:sldId id="263" r:id="rId31"/>
-    <p:sldId id="264" r:id="rId32"/>
-    <p:sldId id="266" r:id="rId33"/>
+    <p:sldId id="295" r:id="rId31"/>
+    <p:sldId id="263" r:id="rId32"/>
+    <p:sldId id="264" r:id="rId33"/>
     <p:sldId id="265" r:id="rId34"/>
-    <p:sldId id="287" r:id="rId35"/>
   </p:sldIdLst>
   <p:sldSz cx="12192000" cy="6858000"/>
   <p:notesSz cx="6858000" cy="9144000"/>
@@ -336,7 +335,7 @@
           <a:p>
             <a:fld id="{D406E69D-613E-4019-8533-7F772451DAA2}" type="datetimeFigureOut">
               <a:rPr lang="fr-CH" smtClean="0"/>
-              <a:t>17.04.2019</a:t>
+              <a:t>25.04.2019</a:t>
             </a:fld>
             <a:endParaRPr lang="fr-CH"/>
           </a:p>
@@ -772,7 +771,7 @@
           <a:p>
             <a:fld id="{D406E69D-613E-4019-8533-7F772451DAA2}" type="datetimeFigureOut">
               <a:rPr lang="fr-CH" smtClean="0"/>
-              <a:t>17.04.2019</a:t>
+              <a:t>25.04.2019</a:t>
             </a:fld>
             <a:endParaRPr lang="fr-CH"/>
           </a:p>
@@ -1022,7 +1021,7 @@
           <a:p>
             <a:fld id="{D406E69D-613E-4019-8533-7F772451DAA2}" type="datetimeFigureOut">
               <a:rPr lang="fr-CH" smtClean="0"/>
-              <a:t>17.04.2019</a:t>
+              <a:t>25.04.2019</a:t>
             </a:fld>
             <a:endParaRPr lang="fr-CH"/>
           </a:p>
@@ -1330,7 +1329,7 @@
           <a:p>
             <a:fld id="{D406E69D-613E-4019-8533-7F772451DAA2}" type="datetimeFigureOut">
               <a:rPr lang="fr-CH" smtClean="0"/>
-              <a:t>17.04.2019</a:t>
+              <a:t>25.04.2019</a:t>
             </a:fld>
             <a:endParaRPr lang="fr-CH"/>
           </a:p>
@@ -1648,7 +1647,7 @@
           <a:p>
             <a:fld id="{D406E69D-613E-4019-8533-7F772451DAA2}" type="datetimeFigureOut">
               <a:rPr lang="fr-CH" smtClean="0"/>
-              <a:t>17.04.2019</a:t>
+              <a:t>25.04.2019</a:t>
             </a:fld>
             <a:endParaRPr lang="fr-CH"/>
           </a:p>
@@ -1950,7 +1949,7 @@
           <a:p>
             <a:fld id="{D406E69D-613E-4019-8533-7F772451DAA2}" type="datetimeFigureOut">
               <a:rPr lang="fr-CH" smtClean="0"/>
-              <a:t>17.04.2019</a:t>
+              <a:t>25.04.2019</a:t>
             </a:fld>
             <a:endParaRPr lang="fr-CH"/>
           </a:p>
@@ -2317,7 +2316,7 @@
           <a:p>
             <a:fld id="{D406E69D-613E-4019-8533-7F772451DAA2}" type="datetimeFigureOut">
               <a:rPr lang="fr-CH" smtClean="0"/>
-              <a:t>17.04.2019</a:t>
+              <a:t>25.04.2019</a:t>
             </a:fld>
             <a:endParaRPr lang="fr-CH"/>
           </a:p>
@@ -2491,7 +2490,7 @@
           <a:p>
             <a:fld id="{D406E69D-613E-4019-8533-7F772451DAA2}" type="datetimeFigureOut">
               <a:rPr lang="fr-CH" smtClean="0"/>
-              <a:t>17.04.2019</a:t>
+              <a:t>25.04.2019</a:t>
             </a:fld>
             <a:endParaRPr lang="fr-CH"/>
           </a:p>
@@ -2671,7 +2670,7 @@
           <a:p>
             <a:fld id="{D406E69D-613E-4019-8533-7F772451DAA2}" type="datetimeFigureOut">
               <a:rPr lang="fr-CH" smtClean="0"/>
-              <a:t>17.04.2019</a:t>
+              <a:t>25.04.2019</a:t>
             </a:fld>
             <a:endParaRPr lang="fr-CH"/>
           </a:p>
@@ -2841,7 +2840,7 @@
           <a:p>
             <a:fld id="{D406E69D-613E-4019-8533-7F772451DAA2}" type="datetimeFigureOut">
               <a:rPr lang="fr-CH" smtClean="0"/>
-              <a:t>17.04.2019</a:t>
+              <a:t>25.04.2019</a:t>
             </a:fld>
             <a:endParaRPr lang="fr-CH"/>
           </a:p>
@@ -3091,7 +3090,7 @@
           <a:p>
             <a:fld id="{D406E69D-613E-4019-8533-7F772451DAA2}" type="datetimeFigureOut">
               <a:rPr lang="fr-CH" smtClean="0"/>
-              <a:t>17.04.2019</a:t>
+              <a:t>25.04.2019</a:t>
             </a:fld>
             <a:endParaRPr lang="fr-CH"/>
           </a:p>
@@ -3327,7 +3326,7 @@
           <a:p>
             <a:fld id="{D406E69D-613E-4019-8533-7F772451DAA2}" type="datetimeFigureOut">
               <a:rPr lang="fr-CH" smtClean="0"/>
-              <a:t>17.04.2019</a:t>
+              <a:t>25.04.2019</a:t>
             </a:fld>
             <a:endParaRPr lang="fr-CH"/>
           </a:p>
@@ -3709,7 +3708,7 @@
           <a:p>
             <a:fld id="{D406E69D-613E-4019-8533-7F772451DAA2}" type="datetimeFigureOut">
               <a:rPr lang="fr-CH" smtClean="0"/>
-              <a:t>17.04.2019</a:t>
+              <a:t>25.04.2019</a:t>
             </a:fld>
             <a:endParaRPr lang="fr-CH"/>
           </a:p>
@@ -3827,7 +3826,7 @@
           <a:p>
             <a:fld id="{D406E69D-613E-4019-8533-7F772451DAA2}" type="datetimeFigureOut">
               <a:rPr lang="fr-CH" smtClean="0"/>
-              <a:t>17.04.2019</a:t>
+              <a:t>25.04.2019</a:t>
             </a:fld>
             <a:endParaRPr lang="fr-CH"/>
           </a:p>
@@ -3922,7 +3921,7 @@
           <a:p>
             <a:fld id="{D406E69D-613E-4019-8533-7F772451DAA2}" type="datetimeFigureOut">
               <a:rPr lang="fr-CH" smtClean="0"/>
-              <a:t>17.04.2019</a:t>
+              <a:t>25.04.2019</a:t>
             </a:fld>
             <a:endParaRPr lang="fr-CH"/>
           </a:p>
@@ -4177,7 +4176,7 @@
           <a:p>
             <a:fld id="{D406E69D-613E-4019-8533-7F772451DAA2}" type="datetimeFigureOut">
               <a:rPr lang="fr-CH" smtClean="0"/>
-              <a:t>17.04.2019</a:t>
+              <a:t>25.04.2019</a:t>
             </a:fld>
             <a:endParaRPr lang="fr-CH"/>
           </a:p>
@@ -4460,7 +4459,7 @@
           <a:p>
             <a:fld id="{D406E69D-613E-4019-8533-7F772451DAA2}" type="datetimeFigureOut">
               <a:rPr lang="fr-CH" smtClean="0"/>
-              <a:t>17.04.2019</a:t>
+              <a:t>25.04.2019</a:t>
             </a:fld>
             <a:endParaRPr lang="fr-CH"/>
           </a:p>
@@ -4866,7 +4865,7 @@
           <a:p>
             <a:fld id="{D406E69D-613E-4019-8533-7F772451DAA2}" type="datetimeFigureOut">
               <a:rPr lang="fr-CH" smtClean="0"/>
-              <a:t>17.04.2019</a:t>
+              <a:t>25.04.2019</a:t>
             </a:fld>
             <a:endParaRPr lang="fr-CH"/>
           </a:p>
@@ -11229,9 +11228,10 @@
           <a:lstStyle/>
           <a:p>
             <a:r>
-              <a:rPr lang="fr-CH" dirty="0"/>
-              <a:t>Présentation</a:t>
-            </a:r>
+              <a:rPr lang="fr-CH" dirty="0" smtClean="0"/>
+              <a:t>SOMMAIRE</a:t>
+            </a:r>
+            <a:endParaRPr lang="fr-CH" dirty="0"/>
           </a:p>
         </p:txBody>
       </p:sp>
@@ -13834,30 +13834,6 @@
       </p:grpSpPr>
       <p:sp>
         <p:nvSpPr>
-          <p:cNvPr id="5" name="Content Placeholder 2"/>
-          <p:cNvSpPr>
-            <a:spLocks noGrp="1"/>
-          </p:cNvSpPr>
-          <p:nvPr>
-            <p:ph idx="1"/>
-          </p:nvPr>
-        </p:nvSpPr>
-        <p:spPr>
-          <a:xfrm>
-            <a:off x="277793" y="902826"/>
-            <a:ext cx="11539959" cy="5660020"/>
-          </a:xfrm>
-        </p:spPr>
-        <p:txBody>
-          <a:bodyPr/>
-          <a:lstStyle/>
-          <a:p>
-            <a:endParaRPr lang="fr-CH" dirty="0"/>
-          </a:p>
-        </p:txBody>
-      </p:sp>
-      <p:sp>
-        <p:nvSpPr>
           <p:cNvPr id="6" name="Title 1"/>
           <p:cNvSpPr>
             <a:spLocks noGrp="1"/>
@@ -13883,6 +13859,150 @@
               <a:rPr lang="fr-CH" sz="2800" dirty="0"/>
               <a:t>CONNECTIQUES</a:t>
             </a:r>
+          </a:p>
+        </p:txBody>
+      </p:sp>
+      <p:sp>
+        <p:nvSpPr>
+          <p:cNvPr id="2" name="ZoneTexte 1"/>
+          <p:cNvSpPr txBox="1"/>
+          <p:nvPr/>
+        </p:nvSpPr>
+        <p:spPr>
+          <a:xfrm>
+            <a:off x="951721" y="802434"/>
+            <a:ext cx="5747657" cy="584775"/>
+          </a:xfrm>
+          <a:prstGeom prst="rect">
+            <a:avLst/>
+          </a:prstGeom>
+          <a:noFill/>
+        </p:spPr>
+        <p:txBody>
+          <a:bodyPr wrap="square" rtlCol="0">
+            <a:spAutoFit/>
+          </a:bodyPr>
+          <a:lstStyle/>
+          <a:p>
+            <a:r>
+              <a:rPr lang="fr-CH" sz="3200" b="1" dirty="0" smtClean="0"/>
+              <a:t>RJ-45 - </a:t>
+            </a:r>
+            <a:r>
+              <a:rPr lang="fr-CH" sz="3200" i="1" dirty="0" smtClean="0"/>
+              <a:t>Registered Jack 45</a:t>
+            </a:r>
+            <a:endParaRPr lang="fr-CH" sz="3200" i="1" dirty="0"/>
+          </a:p>
+        </p:txBody>
+      </p:sp>
+      <p:pic>
+        <p:nvPicPr>
+          <p:cNvPr id="3" name="Image 2"/>
+          <p:cNvPicPr>
+            <a:picLocks noChangeAspect="1"/>
+          </p:cNvPicPr>
+          <p:nvPr/>
+        </p:nvPicPr>
+        <p:blipFill>
+          <a:blip r:embed="rId2" cstate="print">
+            <a:extLst>
+              <a:ext uri="{28A0092B-C50C-407E-A947-70E740481C1C}">
+                <a14:useLocalDpi xmlns:a14="http://schemas.microsoft.com/office/drawing/2010/main" val="0"/>
+              </a:ext>
+            </a:extLst>
+          </a:blip>
+          <a:stretch>
+            <a:fillRect/>
+          </a:stretch>
+        </p:blipFill>
+        <p:spPr>
+          <a:xfrm>
+            <a:off x="9451908" y="1387209"/>
+            <a:ext cx="2041849" cy="2041849"/>
+          </a:xfrm>
+          <a:prstGeom prst="rect">
+            <a:avLst/>
+          </a:prstGeom>
+        </p:spPr>
+      </p:pic>
+      <p:sp>
+        <p:nvSpPr>
+          <p:cNvPr id="4" name="ZoneTexte 3"/>
+          <p:cNvSpPr txBox="1"/>
+          <p:nvPr/>
+        </p:nvSpPr>
+        <p:spPr>
+          <a:xfrm>
+            <a:off x="1240971" y="1754155"/>
+            <a:ext cx="7940351" cy="3831818"/>
+          </a:xfrm>
+          <a:prstGeom prst="rect">
+            <a:avLst/>
+          </a:prstGeom>
+          <a:noFill/>
+        </p:spPr>
+        <p:txBody>
+          <a:bodyPr wrap="square" rtlCol="0">
+            <a:spAutoFit/>
+          </a:bodyPr>
+          <a:lstStyle/>
+          <a:p>
+            <a:pPr>
+              <a:lnSpc>
+                <a:spcPct val="150000"/>
+              </a:lnSpc>
+            </a:pPr>
+            <a:r>
+              <a:rPr lang="fr-CH" dirty="0" smtClean="0"/>
+              <a:t>Il permet l’interconnexion d’équipements réseaux ou de téléphonies. </a:t>
+            </a:r>
+          </a:p>
+          <a:p>
+            <a:pPr>
+              <a:lnSpc>
+                <a:spcPct val="150000"/>
+              </a:lnSpc>
+            </a:pPr>
+            <a:endParaRPr lang="fr-CH" dirty="0" smtClean="0"/>
+          </a:p>
+          <a:p>
+            <a:pPr>
+              <a:lnSpc>
+                <a:spcPct val="150000"/>
+              </a:lnSpc>
+            </a:pPr>
+            <a:r>
+              <a:rPr lang="fr-CH" dirty="0" smtClean="0"/>
+              <a:t>Un RJ-45 possède 8 broches où les paires torsadées passeront.</a:t>
+            </a:r>
+          </a:p>
+          <a:p>
+            <a:endParaRPr lang="fr-CH" dirty="0"/>
+          </a:p>
+          <a:p>
+            <a:endParaRPr lang="fr-CH" dirty="0"/>
+          </a:p>
+          <a:p>
+            <a:endParaRPr lang="fr-CH" dirty="0" smtClean="0"/>
+          </a:p>
+          <a:p>
+            <a:endParaRPr lang="fr-CH" dirty="0"/>
+          </a:p>
+          <a:p>
+            <a:endParaRPr lang="fr-CH" dirty="0" smtClean="0"/>
+          </a:p>
+          <a:p>
+            <a:endParaRPr lang="fr-CH" dirty="0"/>
+          </a:p>
+          <a:p>
+            <a:endParaRPr lang="fr-CH" dirty="0" smtClean="0"/>
+          </a:p>
+          <a:p>
+            <a:endParaRPr lang="fr-CH" dirty="0"/>
+          </a:p>
+          <a:p>
+            <a:endParaRPr lang="fr-CH" dirty="0"/>
           </a:p>
         </p:txBody>
       </p:sp>
@@ -13918,30 +14038,6 @@
       </p:grpSpPr>
       <p:sp>
         <p:nvSpPr>
-          <p:cNvPr id="3" name="Content Placeholder 2"/>
-          <p:cNvSpPr>
-            <a:spLocks noGrp="1"/>
-          </p:cNvSpPr>
-          <p:nvPr>
-            <p:ph idx="1"/>
-          </p:nvPr>
-        </p:nvSpPr>
-        <p:spPr>
-          <a:xfrm>
-            <a:off x="277793" y="902826"/>
-            <a:ext cx="11539959" cy="5660020"/>
-          </a:xfrm>
-        </p:spPr>
-        <p:txBody>
-          <a:bodyPr/>
-          <a:lstStyle/>
-          <a:p>
-            <a:endParaRPr lang="fr-CH" dirty="0"/>
-          </a:p>
-        </p:txBody>
-      </p:sp>
-      <p:sp>
-        <p:nvSpPr>
           <p:cNvPr id="4" name="Title 1"/>
           <p:cNvSpPr>
             <a:spLocks noGrp="1"/>
@@ -13967,6 +14063,348 @@
               <a:rPr lang="fr-CH" sz="2800" dirty="0"/>
               <a:t>Introduction</a:t>
             </a:r>
+          </a:p>
+        </p:txBody>
+      </p:sp>
+      <p:sp>
+        <p:nvSpPr>
+          <p:cNvPr id="5" name="Content Placeholder 2"/>
+          <p:cNvSpPr txBox="1">
+            <a:spLocks/>
+          </p:cNvSpPr>
+          <p:nvPr/>
+        </p:nvSpPr>
+        <p:spPr>
+          <a:xfrm>
+            <a:off x="0" y="1399593"/>
+            <a:ext cx="10216729" cy="3546074"/>
+          </a:xfrm>
+          <a:prstGeom prst="rect">
+            <a:avLst/>
+          </a:prstGeom>
+        </p:spPr>
+        <p:txBody>
+          <a:bodyPr vert="horz" lIns="91440" tIns="45720" rIns="91440" bIns="45720" rtlCol="0" anchor="ctr">
+            <a:normAutofit/>
+          </a:bodyPr>
+          <a:lstStyle>
+            <a:lvl1pPr marL="285750" indent="-285750" algn="l" defTabSz="457200" rtl="0" eaLnBrk="1" latinLnBrk="0" hangingPunct="1">
+              <a:spcBef>
+                <a:spcPct val="20000"/>
+              </a:spcBef>
+              <a:spcAft>
+                <a:spcPts val="600"/>
+              </a:spcAft>
+              <a:buClr>
+                <a:schemeClr val="tx1"/>
+              </a:buClr>
+              <a:buSzPct val="80000"/>
+              <a:buFont typeface="Wingdings 3" panose="05040102010807070707" pitchFamily="18" charset="2"/>
+              <a:buChar char=""/>
+              <a:defRPr sz="2000" kern="1200" cap="none">
+                <a:solidFill>
+                  <a:schemeClr val="bg2">
+                    <a:lumMod val="75000"/>
+                  </a:schemeClr>
+                </a:solidFill>
+                <a:effectLst/>
+                <a:latin typeface="+mn-lt"/>
+                <a:ea typeface="+mn-ea"/>
+                <a:cs typeface="+mn-cs"/>
+              </a:defRPr>
+            </a:lvl1pPr>
+            <a:lvl2pPr marL="742950" indent="-285750" algn="l" defTabSz="457200" rtl="0" eaLnBrk="1" latinLnBrk="0" hangingPunct="1">
+              <a:spcBef>
+                <a:spcPct val="20000"/>
+              </a:spcBef>
+              <a:spcAft>
+                <a:spcPts val="600"/>
+              </a:spcAft>
+              <a:buClr>
+                <a:schemeClr val="tx1"/>
+              </a:buClr>
+              <a:buSzPct val="80000"/>
+              <a:buFont typeface="Wingdings 3" panose="05040102010807070707" pitchFamily="18" charset="2"/>
+              <a:buChar char=""/>
+              <a:defRPr sz="1800" kern="1200" cap="none">
+                <a:solidFill>
+                  <a:schemeClr val="bg2">
+                    <a:lumMod val="75000"/>
+                  </a:schemeClr>
+                </a:solidFill>
+                <a:effectLst/>
+                <a:latin typeface="+mn-lt"/>
+                <a:ea typeface="+mn-ea"/>
+                <a:cs typeface="+mn-cs"/>
+              </a:defRPr>
+            </a:lvl2pPr>
+            <a:lvl3pPr marL="1200150" indent="-285750" algn="l" defTabSz="457200" rtl="0" eaLnBrk="1" latinLnBrk="0" hangingPunct="1">
+              <a:spcBef>
+                <a:spcPct val="20000"/>
+              </a:spcBef>
+              <a:spcAft>
+                <a:spcPts val="600"/>
+              </a:spcAft>
+              <a:buClr>
+                <a:schemeClr val="tx1"/>
+              </a:buClr>
+              <a:buSzPct val="80000"/>
+              <a:buFont typeface="Wingdings 3" panose="05040102010807070707" pitchFamily="18" charset="2"/>
+              <a:buChar char=""/>
+              <a:defRPr sz="1600" kern="1200" cap="none">
+                <a:solidFill>
+                  <a:schemeClr val="bg2">
+                    <a:lumMod val="75000"/>
+                  </a:schemeClr>
+                </a:solidFill>
+                <a:effectLst/>
+                <a:latin typeface="+mn-lt"/>
+                <a:ea typeface="+mn-ea"/>
+                <a:cs typeface="+mn-cs"/>
+              </a:defRPr>
+            </a:lvl3pPr>
+            <a:lvl4pPr marL="1543050" indent="-171450" algn="l" defTabSz="457200" rtl="0" eaLnBrk="1" latinLnBrk="0" hangingPunct="1">
+              <a:spcBef>
+                <a:spcPct val="20000"/>
+              </a:spcBef>
+              <a:spcAft>
+                <a:spcPts val="600"/>
+              </a:spcAft>
+              <a:buClr>
+                <a:schemeClr val="tx1"/>
+              </a:buClr>
+              <a:buSzPct val="80000"/>
+              <a:buFont typeface="Wingdings 3" panose="05040102010807070707" pitchFamily="18" charset="2"/>
+              <a:buChar char=""/>
+              <a:defRPr sz="1400" kern="1200" cap="none">
+                <a:solidFill>
+                  <a:schemeClr val="bg2">
+                    <a:lumMod val="75000"/>
+                  </a:schemeClr>
+                </a:solidFill>
+                <a:effectLst/>
+                <a:latin typeface="+mn-lt"/>
+                <a:ea typeface="+mn-ea"/>
+                <a:cs typeface="+mn-cs"/>
+              </a:defRPr>
+            </a:lvl4pPr>
+            <a:lvl5pPr marL="2000250" indent="-171450" algn="l" defTabSz="457200" rtl="0" eaLnBrk="1" latinLnBrk="0" hangingPunct="1">
+              <a:spcBef>
+                <a:spcPct val="20000"/>
+              </a:spcBef>
+              <a:spcAft>
+                <a:spcPts val="600"/>
+              </a:spcAft>
+              <a:buClr>
+                <a:schemeClr val="tx1"/>
+              </a:buClr>
+              <a:buSzPct val="80000"/>
+              <a:buFont typeface="Wingdings 3" panose="05040102010807070707" pitchFamily="18" charset="2"/>
+              <a:buChar char=""/>
+              <a:defRPr sz="1400" kern="1200" cap="none">
+                <a:solidFill>
+                  <a:schemeClr val="bg2">
+                    <a:lumMod val="75000"/>
+                  </a:schemeClr>
+                </a:solidFill>
+                <a:effectLst/>
+                <a:latin typeface="+mn-lt"/>
+                <a:ea typeface="+mn-ea"/>
+                <a:cs typeface="+mn-cs"/>
+              </a:defRPr>
+            </a:lvl5pPr>
+            <a:lvl6pPr marL="2514600" indent="-228600" algn="l" defTabSz="457200" rtl="0" eaLnBrk="1" latinLnBrk="0" hangingPunct="1">
+              <a:spcBef>
+                <a:spcPct val="20000"/>
+              </a:spcBef>
+              <a:spcAft>
+                <a:spcPts val="600"/>
+              </a:spcAft>
+              <a:buClr>
+                <a:schemeClr val="tx1"/>
+              </a:buClr>
+              <a:buSzPct val="80000"/>
+              <a:buFont typeface="Wingdings 3" panose="05040102010807070707" pitchFamily="18" charset="2"/>
+              <a:buChar char=""/>
+              <a:defRPr sz="1400" kern="1200" cap="none">
+                <a:solidFill>
+                  <a:schemeClr val="bg2">
+                    <a:lumMod val="75000"/>
+                  </a:schemeClr>
+                </a:solidFill>
+                <a:effectLst/>
+                <a:latin typeface="+mn-lt"/>
+                <a:ea typeface="+mn-ea"/>
+                <a:cs typeface="+mn-cs"/>
+              </a:defRPr>
+            </a:lvl6pPr>
+            <a:lvl7pPr marL="2971800" indent="-228600" algn="l" defTabSz="457200" rtl="0" eaLnBrk="1" latinLnBrk="0" hangingPunct="1">
+              <a:spcBef>
+                <a:spcPct val="20000"/>
+              </a:spcBef>
+              <a:spcAft>
+                <a:spcPts val="600"/>
+              </a:spcAft>
+              <a:buClr>
+                <a:schemeClr val="tx1"/>
+              </a:buClr>
+              <a:buSzPct val="80000"/>
+              <a:buFont typeface="Wingdings 3" panose="05040102010807070707" pitchFamily="18" charset="2"/>
+              <a:buChar char=""/>
+              <a:defRPr sz="1400" kern="1200" cap="none">
+                <a:solidFill>
+                  <a:schemeClr val="bg2">
+                    <a:lumMod val="75000"/>
+                  </a:schemeClr>
+                </a:solidFill>
+                <a:effectLst/>
+                <a:latin typeface="+mn-lt"/>
+                <a:ea typeface="+mn-ea"/>
+                <a:cs typeface="+mn-cs"/>
+              </a:defRPr>
+            </a:lvl7pPr>
+            <a:lvl8pPr marL="3429000" indent="-228600" algn="l" defTabSz="457200" rtl="0" eaLnBrk="1" latinLnBrk="0" hangingPunct="1">
+              <a:spcBef>
+                <a:spcPct val="20000"/>
+              </a:spcBef>
+              <a:spcAft>
+                <a:spcPts val="600"/>
+              </a:spcAft>
+              <a:buClr>
+                <a:schemeClr val="tx1"/>
+              </a:buClr>
+              <a:buSzPct val="80000"/>
+              <a:buFont typeface="Wingdings 3" panose="05040102010807070707" pitchFamily="18" charset="2"/>
+              <a:buChar char=""/>
+              <a:defRPr sz="1400" kern="1200" cap="none">
+                <a:solidFill>
+                  <a:schemeClr val="bg2">
+                    <a:lumMod val="75000"/>
+                  </a:schemeClr>
+                </a:solidFill>
+                <a:effectLst/>
+                <a:latin typeface="+mn-lt"/>
+                <a:ea typeface="+mn-ea"/>
+                <a:cs typeface="+mn-cs"/>
+              </a:defRPr>
+            </a:lvl8pPr>
+            <a:lvl9pPr marL="3886200" indent="-228600" algn="l" defTabSz="457200" rtl="0" eaLnBrk="1" latinLnBrk="0" hangingPunct="1">
+              <a:spcBef>
+                <a:spcPct val="20000"/>
+              </a:spcBef>
+              <a:spcAft>
+                <a:spcPts val="600"/>
+              </a:spcAft>
+              <a:buClr>
+                <a:schemeClr val="tx1"/>
+              </a:buClr>
+              <a:buSzPct val="80000"/>
+              <a:buFont typeface="Wingdings 3" panose="05040102010807070707" pitchFamily="18" charset="2"/>
+              <a:buChar char=""/>
+              <a:defRPr sz="1400" kern="1200" cap="none">
+                <a:solidFill>
+                  <a:schemeClr val="bg2">
+                    <a:lumMod val="75000"/>
+                  </a:schemeClr>
+                </a:solidFill>
+                <a:effectLst/>
+                <a:latin typeface="+mn-lt"/>
+                <a:ea typeface="+mn-ea"/>
+                <a:cs typeface="+mn-cs"/>
+              </a:defRPr>
+            </a:lvl9pPr>
+          </a:lstStyle>
+          <a:p>
+            <a:pPr lvl="1">
+              <a:lnSpc>
+                <a:spcPct val="150000"/>
+              </a:lnSpc>
+            </a:pPr>
+            <a:r>
+              <a:rPr lang="fr-CH" sz="2400" dirty="0" smtClean="0">
+                <a:solidFill>
+                  <a:schemeClr val="tx1"/>
+                </a:solidFill>
+              </a:rPr>
+              <a:t>Sujet : La fabrication d’un câble Ethernet</a:t>
+            </a:r>
+          </a:p>
+          <a:p>
+            <a:pPr lvl="1">
+              <a:lnSpc>
+                <a:spcPct val="150000"/>
+              </a:lnSpc>
+            </a:pPr>
+            <a:r>
+              <a:rPr lang="fr-CH" sz="2400" dirty="0" smtClean="0">
+                <a:solidFill>
+                  <a:schemeClr val="tx1"/>
+                </a:solidFill>
+              </a:rPr>
+              <a:t>Cette présentation à comme objectifs :</a:t>
+            </a:r>
+          </a:p>
+          <a:p>
+            <a:pPr lvl="2">
+              <a:lnSpc>
+                <a:spcPct val="150000"/>
+              </a:lnSpc>
+            </a:pPr>
+            <a:r>
+              <a:rPr lang="fr-CH" sz="2200" dirty="0" smtClean="0">
+                <a:solidFill>
+                  <a:schemeClr val="tx1"/>
+                </a:solidFill>
+              </a:rPr>
+              <a:t>Décrire et présenter les différentes normes, catégories et technologies d’un câble Ethernet</a:t>
+            </a:r>
+          </a:p>
+          <a:p>
+            <a:pPr lvl="2">
+              <a:lnSpc>
+                <a:spcPct val="150000"/>
+              </a:lnSpc>
+            </a:pPr>
+            <a:r>
+              <a:rPr lang="fr-CH" sz="2200" dirty="0">
+                <a:solidFill>
+                  <a:schemeClr val="tx1"/>
+                </a:solidFill>
+              </a:rPr>
+              <a:t>D</a:t>
+            </a:r>
+            <a:r>
+              <a:rPr lang="fr-CH" sz="2200" dirty="0" smtClean="0">
+                <a:solidFill>
+                  <a:schemeClr val="tx1"/>
+                </a:solidFill>
+              </a:rPr>
+              <a:t>émontrer la fabrication d’un câble RJ-45</a:t>
+            </a:r>
+          </a:p>
+          <a:p>
+            <a:pPr lvl="2">
+              <a:lnSpc>
+                <a:spcPct val="150000"/>
+              </a:lnSpc>
+            </a:pPr>
+            <a:endParaRPr lang="fr-CH" sz="2200" dirty="0" smtClean="0">
+              <a:solidFill>
+                <a:schemeClr val="tx1"/>
+              </a:solidFill>
+            </a:endParaRPr>
+          </a:p>
+          <a:p>
+            <a:pPr lvl="2">
+              <a:lnSpc>
+                <a:spcPct val="150000"/>
+              </a:lnSpc>
+            </a:pPr>
+            <a:endParaRPr lang="fr-CH" sz="2200" dirty="0" smtClean="0">
+              <a:solidFill>
+                <a:schemeClr val="tx1"/>
+              </a:solidFill>
+            </a:endParaRPr>
           </a:p>
         </p:txBody>
       </p:sp>
@@ -14002,30 +14440,6 @@
       </p:grpSpPr>
       <p:sp>
         <p:nvSpPr>
-          <p:cNvPr id="5" name="Content Placeholder 2"/>
-          <p:cNvSpPr>
-            <a:spLocks noGrp="1"/>
-          </p:cNvSpPr>
-          <p:nvPr>
-            <p:ph idx="1"/>
-          </p:nvPr>
-        </p:nvSpPr>
-        <p:spPr>
-          <a:xfrm>
-            <a:off x="277793" y="902826"/>
-            <a:ext cx="11539959" cy="5660020"/>
-          </a:xfrm>
-        </p:spPr>
-        <p:txBody>
-          <a:bodyPr/>
-          <a:lstStyle/>
-          <a:p>
-            <a:endParaRPr lang="fr-CH" dirty="0"/>
-          </a:p>
-        </p:txBody>
-      </p:sp>
-      <p:sp>
-        <p:nvSpPr>
           <p:cNvPr id="6" name="Title 1"/>
           <p:cNvSpPr>
             <a:spLocks noGrp="1"/>
@@ -14036,8 +14450,8 @@
         </p:nvSpPr>
         <p:spPr>
           <a:xfrm>
-            <a:off x="1" y="0"/>
-            <a:ext cx="1689904" cy="510199"/>
+            <a:off x="0" y="0"/>
+            <a:ext cx="3032567" cy="510199"/>
           </a:xfrm>
         </p:spPr>
         <p:txBody>
@@ -14049,15 +14463,143 @@
             <a:pPr algn="ctr"/>
             <a:r>
               <a:rPr lang="fr-CH" sz="2800" dirty="0"/>
-              <a:t>NORMES</a:t>
-            </a:r>
-          </a:p>
-        </p:txBody>
-      </p:sp>
+              <a:t>CONNECTIQUES</a:t>
+            </a:r>
+          </a:p>
+        </p:txBody>
+      </p:sp>
+      <p:sp>
+        <p:nvSpPr>
+          <p:cNvPr id="2" name="ZoneTexte 1"/>
+          <p:cNvSpPr txBox="1"/>
+          <p:nvPr/>
+        </p:nvSpPr>
+        <p:spPr>
+          <a:xfrm>
+            <a:off x="951721" y="802434"/>
+            <a:ext cx="5747657" cy="584775"/>
+          </a:xfrm>
+          <a:prstGeom prst="rect">
+            <a:avLst/>
+          </a:prstGeom>
+          <a:noFill/>
+        </p:spPr>
+        <p:txBody>
+          <a:bodyPr wrap="square" rtlCol="0">
+            <a:spAutoFit/>
+          </a:bodyPr>
+          <a:lstStyle/>
+          <a:p>
+            <a:r>
+              <a:rPr lang="fr-CH" sz="3200" b="1" dirty="0" smtClean="0"/>
+              <a:t>RJ-45 - </a:t>
+            </a:r>
+            <a:r>
+              <a:rPr lang="fr-CH" sz="3200" i="1" dirty="0" smtClean="0"/>
+              <a:t>Registered Jack 45</a:t>
+            </a:r>
+            <a:endParaRPr lang="fr-CH" sz="3200" i="1" dirty="0"/>
+          </a:p>
+        </p:txBody>
+      </p:sp>
+      <p:sp>
+        <p:nvSpPr>
+          <p:cNvPr id="4" name="ZoneTexte 3"/>
+          <p:cNvSpPr txBox="1"/>
+          <p:nvPr/>
+        </p:nvSpPr>
+        <p:spPr>
+          <a:xfrm>
+            <a:off x="1240971" y="1754155"/>
+            <a:ext cx="7940351" cy="3554819"/>
+          </a:xfrm>
+          <a:prstGeom prst="rect">
+            <a:avLst/>
+          </a:prstGeom>
+          <a:noFill/>
+        </p:spPr>
+        <p:txBody>
+          <a:bodyPr wrap="square" rtlCol="0">
+            <a:spAutoFit/>
+          </a:bodyPr>
+          <a:lstStyle/>
+          <a:p>
+            <a:pPr>
+              <a:lnSpc>
+                <a:spcPct val="150000"/>
+              </a:lnSpc>
+            </a:pPr>
+            <a:r>
+              <a:rPr lang="fr-CH" b="1" dirty="0" smtClean="0"/>
+              <a:t>Différentes applications :</a:t>
+            </a:r>
+            <a:endParaRPr lang="fr-CH" b="1" dirty="0"/>
+          </a:p>
+          <a:p>
+            <a:pPr>
+              <a:lnSpc>
+                <a:spcPct val="150000"/>
+              </a:lnSpc>
+            </a:pPr>
+            <a:r>
+              <a:rPr lang="fr-CH" dirty="0" smtClean="0"/>
+              <a:t>Suivant la paire torsadée utilisée sur une broche, l’application sera différentes.</a:t>
+            </a:r>
+          </a:p>
+          <a:p>
+            <a:endParaRPr lang="fr-CH" dirty="0"/>
+          </a:p>
+          <a:p>
+            <a:endParaRPr lang="fr-CH" dirty="0" smtClean="0"/>
+          </a:p>
+          <a:p>
+            <a:endParaRPr lang="fr-CH" dirty="0"/>
+          </a:p>
+          <a:p>
+            <a:endParaRPr lang="fr-CH" dirty="0" smtClean="0"/>
+          </a:p>
+          <a:p>
+            <a:endParaRPr lang="fr-CH" dirty="0"/>
+          </a:p>
+          <a:p>
+            <a:endParaRPr lang="fr-CH" dirty="0" smtClean="0"/>
+          </a:p>
+          <a:p>
+            <a:endParaRPr lang="fr-CH" dirty="0"/>
+          </a:p>
+          <a:p>
+            <a:endParaRPr lang="fr-CH" dirty="0"/>
+          </a:p>
+        </p:txBody>
+      </p:sp>
+      <p:pic>
+        <p:nvPicPr>
+          <p:cNvPr id="5" name="Image 4"/>
+          <p:cNvPicPr>
+            <a:picLocks noChangeAspect="1"/>
+          </p:cNvPicPr>
+          <p:nvPr/>
+        </p:nvPicPr>
+        <p:blipFill>
+          <a:blip r:embed="rId2"/>
+          <a:stretch>
+            <a:fillRect/>
+          </a:stretch>
+        </p:blipFill>
+        <p:spPr>
+          <a:xfrm>
+            <a:off x="3920027" y="3217401"/>
+            <a:ext cx="4351946" cy="2458519"/>
+          </a:xfrm>
+          <a:prstGeom prst="rect">
+            <a:avLst/>
+          </a:prstGeom>
+        </p:spPr>
+      </p:pic>
     </p:spTree>
     <p:extLst>
       <p:ext uri="{BB962C8B-B14F-4D97-AF65-F5344CB8AC3E}">
-        <p14:creationId xmlns:p14="http://schemas.microsoft.com/office/powerpoint/2010/main" val="237110104"/>
+        <p14:creationId xmlns:p14="http://schemas.microsoft.com/office/powerpoint/2010/main" val="1775298629"/>
       </p:ext>
     </p:extLst>
   </p:cSld>
@@ -14120,8 +14662,8 @@
         </p:nvSpPr>
         <p:spPr>
           <a:xfrm>
-            <a:off x="0" y="0"/>
-            <a:ext cx="2488557" cy="510199"/>
+            <a:off x="1" y="0"/>
+            <a:ext cx="1689904" cy="510199"/>
           </a:xfrm>
         </p:spPr>
         <p:txBody>
@@ -14133,7 +14675,7 @@
             <a:pPr algn="ctr"/>
             <a:r>
               <a:rPr lang="fr-CH" sz="2800" dirty="0"/>
-              <a:t>FABRICATION</a:t>
+              <a:t>NORMES</a:t>
             </a:r>
           </a:p>
         </p:txBody>
@@ -14141,7 +14683,7 @@
     </p:spTree>
     <p:extLst>
       <p:ext uri="{BB962C8B-B14F-4D97-AF65-F5344CB8AC3E}">
-        <p14:creationId xmlns:p14="http://schemas.microsoft.com/office/powerpoint/2010/main" val="1207272401"/>
+        <p14:creationId xmlns:p14="http://schemas.microsoft.com/office/powerpoint/2010/main" val="237110104"/>
       </p:ext>
     </p:extLst>
   </p:cSld>
@@ -14168,10 +14710,64 @@
           <a:chExt cx="0" cy="0"/>
         </a:xfrm>
       </p:grpSpPr>
+      <p:sp>
+        <p:nvSpPr>
+          <p:cNvPr id="5" name="Content Placeholder 2"/>
+          <p:cNvSpPr>
+            <a:spLocks noGrp="1"/>
+          </p:cNvSpPr>
+          <p:nvPr>
+            <p:ph idx="1"/>
+          </p:nvPr>
+        </p:nvSpPr>
+        <p:spPr>
+          <a:xfrm>
+            <a:off x="277793" y="902826"/>
+            <a:ext cx="11539959" cy="5660020"/>
+          </a:xfrm>
+        </p:spPr>
+        <p:txBody>
+          <a:bodyPr/>
+          <a:lstStyle/>
+          <a:p>
+            <a:endParaRPr lang="fr-CH" dirty="0"/>
+          </a:p>
+        </p:txBody>
+      </p:sp>
+      <p:sp>
+        <p:nvSpPr>
+          <p:cNvPr id="6" name="Title 1"/>
+          <p:cNvSpPr>
+            <a:spLocks noGrp="1"/>
+          </p:cNvSpPr>
+          <p:nvPr>
+            <p:ph type="title"/>
+          </p:nvPr>
+        </p:nvSpPr>
+        <p:spPr>
+          <a:xfrm>
+            <a:off x="0" y="0"/>
+            <a:ext cx="2488557" cy="510199"/>
+          </a:xfrm>
+        </p:spPr>
+        <p:txBody>
+          <a:bodyPr numCol="1">
+            <a:noAutofit/>
+          </a:bodyPr>
+          <a:lstStyle/>
+          <a:p>
+            <a:pPr algn="ctr"/>
+            <a:r>
+              <a:rPr lang="fr-CH" sz="2800" dirty="0"/>
+              <a:t>FABRICATION</a:t>
+            </a:r>
+          </a:p>
+        </p:txBody>
+      </p:sp>
     </p:spTree>
     <p:extLst>
       <p:ext uri="{BB962C8B-B14F-4D97-AF65-F5344CB8AC3E}">
-        <p14:creationId xmlns:p14="http://schemas.microsoft.com/office/powerpoint/2010/main" val="728918343"/>
+        <p14:creationId xmlns:p14="http://schemas.microsoft.com/office/powerpoint/2010/main" val="1207272401"/>
       </p:ext>
     </p:extLst>
   </p:cSld>
@@ -14210,22 +14806,60 @@
         </p:nvSpPr>
         <p:spPr>
           <a:xfrm rot="10800000" flipV="1">
-            <a:off x="305687" y="844953"/>
+            <a:off x="1312243" y="1"/>
             <a:ext cx="9567515" cy="2476981"/>
           </a:xfrm>
         </p:spPr>
         <p:txBody>
-          <a:bodyPr>
+          <a:bodyPr anchor="ctr">
             <a:noAutofit/>
           </a:bodyPr>
           <a:lstStyle/>
           <a:p>
             <a:r>
-              <a:rPr lang="fr-CH" sz="8000" dirty="0">
+              <a:rPr lang="fr-CH" sz="5400" dirty="0">
                 <a:cs typeface="Arial" panose="020B0604020202020204" pitchFamily="34" charset="0"/>
               </a:rPr>
               <a:t>Merci de votre écoute </a:t>
             </a:r>
+          </a:p>
+        </p:txBody>
+      </p:sp>
+      <p:sp>
+        <p:nvSpPr>
+          <p:cNvPr id="3" name="Rectangle 2"/>
+          <p:cNvSpPr/>
+          <p:nvPr/>
+        </p:nvSpPr>
+        <p:spPr>
+          <a:xfrm>
+            <a:off x="1312243" y="2476983"/>
+            <a:ext cx="5512585" cy="1862048"/>
+          </a:xfrm>
+          <a:prstGeom prst="rect">
+            <a:avLst/>
+          </a:prstGeom>
+        </p:spPr>
+        <p:txBody>
+          <a:bodyPr wrap="square">
+            <a:spAutoFit/>
+          </a:bodyPr>
+          <a:lstStyle/>
+          <a:p>
+            <a:r>
+              <a:rPr lang="fr-CH" sz="4800" dirty="0" smtClean="0">
+                <a:cs typeface="Arial" panose="020B0604020202020204" pitchFamily="34" charset="0"/>
+              </a:rPr>
+              <a:t>Des questions </a:t>
+            </a:r>
+            <a:r>
+              <a:rPr lang="fr-CH" sz="11500" dirty="0">
+                <a:latin typeface="Andalus" panose="02020603050405020304" pitchFamily="18" charset="-78"/>
+                <a:cs typeface="Andalus" panose="02020603050405020304" pitchFamily="18" charset="-78"/>
+              </a:rPr>
+              <a:t>?</a:t>
+            </a:r>
+            <a:endParaRPr lang="fr-CH" sz="2000" dirty="0"/>
           </a:p>
         </p:txBody>
       </p:sp>
@@ -14233,74 +14867,6 @@
     <p:extLst>
       <p:ext uri="{BB962C8B-B14F-4D97-AF65-F5344CB8AC3E}">
         <p14:creationId xmlns:p14="http://schemas.microsoft.com/office/powerpoint/2010/main" val="3904854099"/>
-      </p:ext>
-    </p:extLst>
-  </p:cSld>
-  <p:clrMapOvr>
-    <a:masterClrMapping/>
-  </p:clrMapOvr>
-</p:sld>
-</file>
-
-<file path=ppt/slides/slide34.xml><?xml version="1.0" encoding="utf-8"?>
-<p:sld xmlns:a="http://schemas.openxmlformats.org/drawingml/2006/main" xmlns:r="http://schemas.openxmlformats.org/officeDocument/2006/relationships" xmlns:p="http://schemas.openxmlformats.org/presentationml/2006/main">
-  <p:cSld>
-    <p:spTree>
-      <p:nvGrpSpPr>
-        <p:cNvPr id="1" name=""/>
-        <p:cNvGrpSpPr/>
-        <p:nvPr/>
-      </p:nvGrpSpPr>
-      <p:grpSpPr>
-        <a:xfrm>
-          <a:off x="0" y="0"/>
-          <a:ext cx="0" cy="0"/>
-          <a:chOff x="0" y="0"/>
-          <a:chExt cx="0" cy="0"/>
-        </a:xfrm>
-      </p:grpSpPr>
-      <p:sp>
-        <p:nvSpPr>
-          <p:cNvPr id="2" name="Title 1"/>
-          <p:cNvSpPr>
-            <a:spLocks noGrp="1"/>
-          </p:cNvSpPr>
-          <p:nvPr>
-            <p:ph type="ctrTitle"/>
-          </p:nvPr>
-        </p:nvSpPr>
-        <p:spPr>
-          <a:xfrm rot="10800000" flipV="1">
-            <a:off x="375135" y="1273217"/>
-            <a:ext cx="9567515" cy="2476981"/>
-          </a:xfrm>
-        </p:spPr>
-        <p:txBody>
-          <a:bodyPr>
-            <a:noAutofit/>
-          </a:bodyPr>
-          <a:lstStyle/>
-          <a:p>
-            <a:r>
-              <a:rPr lang="fr-CH" sz="8000" dirty="0">
-                <a:cs typeface="Arial" panose="020B0604020202020204" pitchFamily="34" charset="0"/>
-              </a:rPr>
-              <a:t>Question </a:t>
-            </a:r>
-            <a:r>
-              <a:rPr lang="fr-CH" sz="23900" dirty="0">
-                <a:latin typeface="Andalus" panose="02020603050405020304" pitchFamily="18" charset="-78"/>
-                <a:cs typeface="Andalus" panose="02020603050405020304" pitchFamily="18" charset="-78"/>
-              </a:rPr>
-              <a:t>?</a:t>
-            </a:r>
-          </a:p>
-        </p:txBody>
-      </p:sp>
-    </p:spTree>
-    <p:extLst>
-      <p:ext uri="{BB962C8B-B14F-4D97-AF65-F5344CB8AC3E}">
-        <p14:creationId xmlns:p14="http://schemas.microsoft.com/office/powerpoint/2010/main" val="1360412453"/>
       </p:ext>
     </p:extLst>
   </p:cSld>

</xml_diff>

<commit_message>
Ajout des normes dans le PowerPoint
</commit_message>
<xml_diff>
--- a/Module 214 - Fabrication_Ethernet.pptx
+++ b/Module 214 - Fabrication_Ethernet.pptx
@@ -37,8 +37,10 @@
     <p:sldId id="296" r:id="rId31"/>
     <p:sldId id="298" r:id="rId32"/>
     <p:sldId id="263" r:id="rId33"/>
-    <p:sldId id="264" r:id="rId34"/>
-    <p:sldId id="265" r:id="rId35"/>
+    <p:sldId id="309" r:id="rId34"/>
+    <p:sldId id="308" r:id="rId35"/>
+    <p:sldId id="264" r:id="rId36"/>
+    <p:sldId id="265" r:id="rId37"/>
   </p:sldIdLst>
   <p:sldSz cx="12192000" cy="6858000"/>
   <p:notesSz cx="6858000" cy="9144000"/>
@@ -138,6 +140,50 @@
     </a:lvl9pPr>
   </p:defaultTextStyle>
   <p:extLst>
+    <p:ext uri="{521415D9-36F7-43E2-AB2F-B90AF26B5E84}">
+      <p14:sectionLst xmlns:p14="http://schemas.microsoft.com/office/powerpoint/2010/main">
+        <p14:section name="Section par défaut" id="{E4984EEA-9CF1-47EC-83EB-FE43C2621253}">
+          <p14:sldIdLst>
+            <p14:sldId id="256"/>
+            <p14:sldId id="283"/>
+            <p14:sldId id="284"/>
+            <p14:sldId id="285"/>
+            <p14:sldId id="300"/>
+            <p14:sldId id="286"/>
+            <p14:sldId id="275"/>
+            <p14:sldId id="301"/>
+            <p14:sldId id="302"/>
+            <p14:sldId id="303"/>
+            <p14:sldId id="304"/>
+            <p14:sldId id="261"/>
+            <p14:sldId id="273"/>
+            <p14:sldId id="272"/>
+            <p14:sldId id="305"/>
+            <p14:sldId id="306"/>
+            <p14:sldId id="307"/>
+            <p14:sldId id="274"/>
+            <p14:sldId id="260"/>
+            <p14:sldId id="288"/>
+            <p14:sldId id="289"/>
+            <p14:sldId id="290"/>
+            <p14:sldId id="291"/>
+            <p14:sldId id="292"/>
+            <p14:sldId id="293"/>
+            <p14:sldId id="294"/>
+            <p14:sldId id="262"/>
+            <p14:sldId id="295"/>
+            <p14:sldId id="297"/>
+            <p14:sldId id="296"/>
+            <p14:sldId id="298"/>
+            <p14:sldId id="263"/>
+            <p14:sldId id="309"/>
+            <p14:sldId id="308"/>
+            <p14:sldId id="264"/>
+            <p14:sldId id="265"/>
+          </p14:sldIdLst>
+        </p14:section>
+      </p14:sectionLst>
+    </p:ext>
     <p:ext uri="{EFAFB233-063F-42B5-8137-9DF3F51BA10A}">
       <p15:sldGuideLst xmlns:p15="http://schemas.microsoft.com/office/powerpoint/2012/main"/>
     </p:ext>
@@ -336,7 +382,7 @@
           <a:p>
             <a:fld id="{D406E69D-613E-4019-8533-7F772451DAA2}" type="datetimeFigureOut">
               <a:rPr lang="fr-CH" smtClean="0"/>
-              <a:t>27.04.2019</a:t>
+              <a:t>28.04.2019</a:t>
             </a:fld>
             <a:endParaRPr lang="fr-CH"/>
           </a:p>
@@ -772,7 +818,7 @@
           <a:p>
             <a:fld id="{D406E69D-613E-4019-8533-7F772451DAA2}" type="datetimeFigureOut">
               <a:rPr lang="fr-CH" smtClean="0"/>
-              <a:t>27.04.2019</a:t>
+              <a:t>28.04.2019</a:t>
             </a:fld>
             <a:endParaRPr lang="fr-CH"/>
           </a:p>
@@ -1022,7 +1068,7 @@
           <a:p>
             <a:fld id="{D406E69D-613E-4019-8533-7F772451DAA2}" type="datetimeFigureOut">
               <a:rPr lang="fr-CH" smtClean="0"/>
-              <a:t>27.04.2019</a:t>
+              <a:t>28.04.2019</a:t>
             </a:fld>
             <a:endParaRPr lang="fr-CH"/>
           </a:p>
@@ -1330,7 +1376,7 @@
           <a:p>
             <a:fld id="{D406E69D-613E-4019-8533-7F772451DAA2}" type="datetimeFigureOut">
               <a:rPr lang="fr-CH" smtClean="0"/>
-              <a:t>27.04.2019</a:t>
+              <a:t>28.04.2019</a:t>
             </a:fld>
             <a:endParaRPr lang="fr-CH"/>
           </a:p>
@@ -1648,7 +1694,7 @@
           <a:p>
             <a:fld id="{D406E69D-613E-4019-8533-7F772451DAA2}" type="datetimeFigureOut">
               <a:rPr lang="fr-CH" smtClean="0"/>
-              <a:t>27.04.2019</a:t>
+              <a:t>28.04.2019</a:t>
             </a:fld>
             <a:endParaRPr lang="fr-CH"/>
           </a:p>
@@ -1950,7 +1996,7 @@
           <a:p>
             <a:fld id="{D406E69D-613E-4019-8533-7F772451DAA2}" type="datetimeFigureOut">
               <a:rPr lang="fr-CH" smtClean="0"/>
-              <a:t>27.04.2019</a:t>
+              <a:t>28.04.2019</a:t>
             </a:fld>
             <a:endParaRPr lang="fr-CH"/>
           </a:p>
@@ -2317,7 +2363,7 @@
           <a:p>
             <a:fld id="{D406E69D-613E-4019-8533-7F772451DAA2}" type="datetimeFigureOut">
               <a:rPr lang="fr-CH" smtClean="0"/>
-              <a:t>27.04.2019</a:t>
+              <a:t>28.04.2019</a:t>
             </a:fld>
             <a:endParaRPr lang="fr-CH"/>
           </a:p>
@@ -2491,7 +2537,7 @@
           <a:p>
             <a:fld id="{D406E69D-613E-4019-8533-7F772451DAA2}" type="datetimeFigureOut">
               <a:rPr lang="fr-CH" smtClean="0"/>
-              <a:t>27.04.2019</a:t>
+              <a:t>28.04.2019</a:t>
             </a:fld>
             <a:endParaRPr lang="fr-CH"/>
           </a:p>
@@ -2671,7 +2717,7 @@
           <a:p>
             <a:fld id="{D406E69D-613E-4019-8533-7F772451DAA2}" type="datetimeFigureOut">
               <a:rPr lang="fr-CH" smtClean="0"/>
-              <a:t>27.04.2019</a:t>
+              <a:t>28.04.2019</a:t>
             </a:fld>
             <a:endParaRPr lang="fr-CH"/>
           </a:p>
@@ -2841,7 +2887,7 @@
           <a:p>
             <a:fld id="{D406E69D-613E-4019-8533-7F772451DAA2}" type="datetimeFigureOut">
               <a:rPr lang="fr-CH" smtClean="0"/>
-              <a:t>27.04.2019</a:t>
+              <a:t>28.04.2019</a:t>
             </a:fld>
             <a:endParaRPr lang="fr-CH"/>
           </a:p>
@@ -3091,7 +3137,7 @@
           <a:p>
             <a:fld id="{D406E69D-613E-4019-8533-7F772451DAA2}" type="datetimeFigureOut">
               <a:rPr lang="fr-CH" smtClean="0"/>
-              <a:t>27.04.2019</a:t>
+              <a:t>28.04.2019</a:t>
             </a:fld>
             <a:endParaRPr lang="fr-CH"/>
           </a:p>
@@ -3327,7 +3373,7 @@
           <a:p>
             <a:fld id="{D406E69D-613E-4019-8533-7F772451DAA2}" type="datetimeFigureOut">
               <a:rPr lang="fr-CH" smtClean="0"/>
-              <a:t>27.04.2019</a:t>
+              <a:t>28.04.2019</a:t>
             </a:fld>
             <a:endParaRPr lang="fr-CH"/>
           </a:p>
@@ -3709,7 +3755,7 @@
           <a:p>
             <a:fld id="{D406E69D-613E-4019-8533-7F772451DAA2}" type="datetimeFigureOut">
               <a:rPr lang="fr-CH" smtClean="0"/>
-              <a:t>27.04.2019</a:t>
+              <a:t>28.04.2019</a:t>
             </a:fld>
             <a:endParaRPr lang="fr-CH"/>
           </a:p>
@@ -3827,7 +3873,7 @@
           <a:p>
             <a:fld id="{D406E69D-613E-4019-8533-7F772451DAA2}" type="datetimeFigureOut">
               <a:rPr lang="fr-CH" smtClean="0"/>
-              <a:t>27.04.2019</a:t>
+              <a:t>28.04.2019</a:t>
             </a:fld>
             <a:endParaRPr lang="fr-CH"/>
           </a:p>
@@ -3922,7 +3968,7 @@
           <a:p>
             <a:fld id="{D406E69D-613E-4019-8533-7F772451DAA2}" type="datetimeFigureOut">
               <a:rPr lang="fr-CH" smtClean="0"/>
-              <a:t>27.04.2019</a:t>
+              <a:t>28.04.2019</a:t>
             </a:fld>
             <a:endParaRPr lang="fr-CH"/>
           </a:p>
@@ -4177,7 +4223,7 @@
           <a:p>
             <a:fld id="{D406E69D-613E-4019-8533-7F772451DAA2}" type="datetimeFigureOut">
               <a:rPr lang="fr-CH" smtClean="0"/>
-              <a:t>27.04.2019</a:t>
+              <a:t>28.04.2019</a:t>
             </a:fld>
             <a:endParaRPr lang="fr-CH"/>
           </a:p>
@@ -4460,7 +4506,7 @@
           <a:p>
             <a:fld id="{D406E69D-613E-4019-8533-7F772451DAA2}" type="datetimeFigureOut">
               <a:rPr lang="fr-CH" smtClean="0"/>
-              <a:t>27.04.2019</a:t>
+              <a:t>28.04.2019</a:t>
             </a:fld>
             <a:endParaRPr lang="fr-CH"/>
           </a:p>
@@ -4866,7 +4912,7 @@
           <a:p>
             <a:fld id="{D406E69D-613E-4019-8533-7F772451DAA2}" type="datetimeFigureOut">
               <a:rPr lang="fr-CH" smtClean="0"/>
-              <a:t>27.04.2019</a:t>
+              <a:t>28.04.2019</a:t>
             </a:fld>
             <a:endParaRPr lang="fr-CH"/>
           </a:p>
@@ -13669,15 +13715,42 @@
         </p:nvSpPr>
         <p:spPr>
           <a:xfrm>
-            <a:off x="277793" y="902826"/>
-            <a:ext cx="11539959" cy="5660020"/>
+            <a:off x="326020" y="634971"/>
+            <a:ext cx="11539959" cy="510199"/>
           </a:xfrm>
         </p:spPr>
         <p:txBody>
-          <a:bodyPr/>
+          <a:bodyPr>
+            <a:normAutofit/>
+          </a:bodyPr>
           <a:lstStyle/>
           <a:p>
-            <a:endParaRPr lang="fr-CH" dirty="0"/>
+            <a:pPr marL="0" indent="0">
+              <a:buNone/>
+            </a:pPr>
+            <a:r>
+              <a:rPr lang="it-IT" sz="2400" dirty="0">
+                <a:solidFill>
+                  <a:schemeClr val="tx1"/>
+                </a:solidFill>
+              </a:rPr>
+              <a:t>IEEE </a:t>
+            </a:r>
+            <a:r>
+              <a:rPr lang="it-IT" sz="2400" dirty="0">
+                <a:solidFill>
+                  <a:schemeClr val="tx1"/>
+                </a:solidFill>
+                <a:latin typeface="+mj-lt"/>
+              </a:rPr>
+              <a:t>802.3</a:t>
+            </a:r>
+            <a:endParaRPr lang="fr-CH" sz="2400" dirty="0">
+              <a:solidFill>
+                <a:schemeClr val="tx1"/>
+              </a:solidFill>
+              <a:latin typeface="+mj-lt"/>
+            </a:endParaRPr>
           </a:p>
         </p:txBody>
       </p:sp>
@@ -13711,6 +13784,367 @@
           </a:p>
         </p:txBody>
       </p:sp>
+      <p:sp>
+        <p:nvSpPr>
+          <p:cNvPr id="2" name="ZoneTexte 1">
+            <a:extLst>
+              <a:ext uri="{FF2B5EF4-FFF2-40B4-BE49-F238E27FC236}">
+                <a16:creationId xmlns:a16="http://schemas.microsoft.com/office/drawing/2014/main" id="{A35CA12C-1266-4CF7-B4FA-9BCC04FF0A7A}"/>
+              </a:ext>
+            </a:extLst>
+          </p:cNvPr>
+          <p:cNvSpPr txBox="1"/>
+          <p:nvPr/>
+        </p:nvSpPr>
+        <p:spPr>
+          <a:xfrm>
+            <a:off x="609601" y="1302327"/>
+            <a:ext cx="8589818" cy="646331"/>
+          </a:xfrm>
+          <a:prstGeom prst="rect">
+            <a:avLst/>
+          </a:prstGeom>
+          <a:noFill/>
+        </p:spPr>
+        <p:txBody>
+          <a:bodyPr wrap="square" rtlCol="0">
+            <a:spAutoFit/>
+          </a:bodyPr>
+          <a:lstStyle/>
+          <a:p>
+            <a:r>
+              <a:rPr lang="fr-CH" dirty="0"/>
+              <a:t>IEEE signifie « Institute of </a:t>
+            </a:r>
+            <a:r>
+              <a:rPr lang="fr-CH" dirty="0" err="1"/>
+              <a:t>Electrical</a:t>
+            </a:r>
+            <a:r>
+              <a:rPr lang="fr-CH" dirty="0"/>
+              <a:t> and Electronics </a:t>
+            </a:r>
+            <a:r>
+              <a:rPr lang="fr-CH" dirty="0" err="1"/>
+              <a:t>Engineers</a:t>
+            </a:r>
+            <a:r>
+              <a:rPr lang="fr-CH" dirty="0"/>
+              <a:t> » ou en français « Institut d'ingénieurs en électricité et électronique »</a:t>
+            </a:r>
+          </a:p>
+        </p:txBody>
+      </p:sp>
+      <p:sp>
+        <p:nvSpPr>
+          <p:cNvPr id="3" name="ZoneTexte 2">
+            <a:extLst>
+              <a:ext uri="{FF2B5EF4-FFF2-40B4-BE49-F238E27FC236}">
+                <a16:creationId xmlns:a16="http://schemas.microsoft.com/office/drawing/2014/main" id="{A87DECA1-1134-4B40-9A37-999B0F16999A}"/>
+              </a:ext>
+            </a:extLst>
+          </p:cNvPr>
+          <p:cNvSpPr txBox="1"/>
+          <p:nvPr/>
+        </p:nvSpPr>
+        <p:spPr>
+          <a:xfrm>
+            <a:off x="609601" y="2216727"/>
+            <a:ext cx="8589818" cy="646331"/>
+          </a:xfrm>
+          <a:prstGeom prst="rect">
+            <a:avLst/>
+          </a:prstGeom>
+          <a:noFill/>
+        </p:spPr>
+        <p:txBody>
+          <a:bodyPr wrap="square" rtlCol="0">
+            <a:spAutoFit/>
+          </a:bodyPr>
+          <a:lstStyle/>
+          <a:p>
+            <a:r>
+              <a:rPr lang="fr-CH" dirty="0"/>
+              <a:t>Ils ont créé plusieurs normes dont la IEEE 802.3 qui fait référence à un ensemble de protocoles qui définissent les réseaux locaux (LAN).</a:t>
+            </a:r>
+          </a:p>
+        </p:txBody>
+      </p:sp>
+      <p:sp>
+        <p:nvSpPr>
+          <p:cNvPr id="4" name="ZoneTexte 3">
+            <a:extLst>
+              <a:ext uri="{FF2B5EF4-FFF2-40B4-BE49-F238E27FC236}">
+                <a16:creationId xmlns:a16="http://schemas.microsoft.com/office/drawing/2014/main" id="{4484CECE-1614-4AEE-A3E5-0B7519852559}"/>
+              </a:ext>
+            </a:extLst>
+          </p:cNvPr>
+          <p:cNvSpPr txBox="1"/>
+          <p:nvPr/>
+        </p:nvSpPr>
+        <p:spPr>
+          <a:xfrm>
+            <a:off x="609601" y="3429000"/>
+            <a:ext cx="2974109" cy="369332"/>
+          </a:xfrm>
+          <a:prstGeom prst="rect">
+            <a:avLst/>
+          </a:prstGeom>
+          <a:noFill/>
+        </p:spPr>
+        <p:txBody>
+          <a:bodyPr wrap="square" rtlCol="0">
+            <a:spAutoFit/>
+          </a:bodyPr>
+          <a:lstStyle/>
+          <a:p>
+            <a:r>
+              <a:rPr lang="fr-CH" b="1" dirty="0">
+                <a:latin typeface="+mj-lt"/>
+              </a:rPr>
+              <a:t>Les deux opérations :</a:t>
+            </a:r>
+          </a:p>
+        </p:txBody>
+      </p:sp>
+      <p:grpSp>
+        <p:nvGrpSpPr>
+          <p:cNvPr id="9" name="Groupe 8">
+            <a:extLst>
+              <a:ext uri="{FF2B5EF4-FFF2-40B4-BE49-F238E27FC236}">
+                <a16:creationId xmlns:a16="http://schemas.microsoft.com/office/drawing/2014/main" id="{23D82E5C-A968-44F6-8506-2728DD4691EC}"/>
+              </a:ext>
+            </a:extLst>
+          </p:cNvPr>
+          <p:cNvGrpSpPr/>
+          <p:nvPr/>
+        </p:nvGrpSpPr>
+        <p:grpSpPr>
+          <a:xfrm>
+            <a:off x="1525390" y="3810277"/>
+            <a:ext cx="7923410" cy="1184940"/>
+            <a:chOff x="1525390" y="3810277"/>
+            <a:chExt cx="7923410" cy="1184940"/>
+          </a:xfrm>
+        </p:grpSpPr>
+        <p:sp>
+          <p:nvSpPr>
+            <p:cNvPr id="7" name="Rectangle 6">
+              <a:extLst>
+                <a:ext uri="{FF2B5EF4-FFF2-40B4-BE49-F238E27FC236}">
+                  <a16:creationId xmlns:a16="http://schemas.microsoft.com/office/drawing/2014/main" id="{9916E7EC-0F54-4B06-88D6-BC6EA432DDDE}"/>
+                </a:ext>
+              </a:extLst>
+            </p:cNvPr>
+            <p:cNvSpPr/>
+            <p:nvPr/>
+          </p:nvSpPr>
+          <p:spPr>
+            <a:xfrm>
+              <a:off x="1525390" y="3810277"/>
+              <a:ext cx="2058320" cy="369332"/>
+            </a:xfrm>
+            <a:prstGeom prst="rect">
+              <a:avLst/>
+            </a:prstGeom>
+          </p:spPr>
+          <p:txBody>
+            <a:bodyPr wrap="none">
+              <a:spAutoFit/>
+            </a:bodyPr>
+            <a:lstStyle/>
+            <a:p>
+              <a:r>
+                <a:rPr lang="fr-CH" dirty="0">
+                  <a:latin typeface="Calibri" panose="020F0502020204030204" pitchFamily="34" charset="0"/>
+                  <a:ea typeface="Calibri" panose="020F0502020204030204" pitchFamily="34" charset="0"/>
+                  <a:cs typeface="Arial" panose="020B0604020202020204" pitchFamily="34" charset="0"/>
+                </a:rPr>
+                <a:t>le mode </a:t>
+              </a:r>
+              <a:r>
+                <a:rPr lang="fr-CH" dirty="0" err="1">
+                  <a:latin typeface="Calibri" panose="020F0502020204030204" pitchFamily="34" charset="0"/>
+                  <a:ea typeface="Calibri" panose="020F0502020204030204" pitchFamily="34" charset="0"/>
+                  <a:cs typeface="Arial" panose="020B0604020202020204" pitchFamily="34" charset="0"/>
+                </a:rPr>
+                <a:t>half</a:t>
+              </a:r>
+              <a:r>
+                <a:rPr lang="fr-CH" dirty="0">
+                  <a:latin typeface="Calibri" panose="020F0502020204030204" pitchFamily="34" charset="0"/>
+                  <a:ea typeface="Calibri" panose="020F0502020204030204" pitchFamily="34" charset="0"/>
+                  <a:cs typeface="Arial" panose="020B0604020202020204" pitchFamily="34" charset="0"/>
+                </a:rPr>
+                <a:t>-duplex</a:t>
+              </a:r>
+              <a:endParaRPr lang="fr-CH" dirty="0"/>
+            </a:p>
+          </p:txBody>
+        </p:sp>
+        <p:sp>
+          <p:nvSpPr>
+            <p:cNvPr id="8" name="ZoneTexte 7">
+              <a:extLst>
+                <a:ext uri="{FF2B5EF4-FFF2-40B4-BE49-F238E27FC236}">
+                  <a16:creationId xmlns:a16="http://schemas.microsoft.com/office/drawing/2014/main" id="{D91180B7-05B4-4F84-BBE4-1ABBF07A8C2A}"/>
+                </a:ext>
+              </a:extLst>
+            </p:cNvPr>
+            <p:cNvSpPr txBox="1"/>
+            <p:nvPr/>
+          </p:nvSpPr>
+          <p:spPr>
+            <a:xfrm>
+              <a:off x="3707705" y="3994943"/>
+              <a:ext cx="5741095" cy="1000274"/>
+            </a:xfrm>
+            <a:prstGeom prst="rect">
+              <a:avLst/>
+            </a:prstGeom>
+            <a:noFill/>
+          </p:spPr>
+          <p:txBody>
+            <a:bodyPr wrap="square" rtlCol="0">
+              <a:spAutoFit/>
+            </a:bodyPr>
+            <a:lstStyle/>
+            <a:p>
+              <a:pPr>
+                <a:spcAft>
+                  <a:spcPts val="600"/>
+                </a:spcAft>
+              </a:pPr>
+              <a:r>
+                <a:rPr lang="fr-CH" dirty="0"/>
+                <a:t>Ressemble au fonctionnement d’un talkie-walkie.</a:t>
+              </a:r>
+            </a:p>
+            <a:p>
+              <a:pPr>
+                <a:spcAft>
+                  <a:spcPts val="600"/>
+                </a:spcAft>
+              </a:pPr>
+              <a:r>
+                <a:rPr lang="fr-CH" dirty="0"/>
+                <a:t>Il peut recevoir et envoyer des données que d’un seul périphérique à la fois.</a:t>
+              </a:r>
+            </a:p>
+          </p:txBody>
+        </p:sp>
+      </p:grpSp>
+      <p:grpSp>
+        <p:nvGrpSpPr>
+          <p:cNvPr id="10" name="Groupe 9">
+            <a:extLst>
+              <a:ext uri="{FF2B5EF4-FFF2-40B4-BE49-F238E27FC236}">
+                <a16:creationId xmlns:a16="http://schemas.microsoft.com/office/drawing/2014/main" id="{465546DD-A06A-4710-95C0-C71CCAD0287A}"/>
+              </a:ext>
+            </a:extLst>
+          </p:cNvPr>
+          <p:cNvGrpSpPr/>
+          <p:nvPr/>
+        </p:nvGrpSpPr>
+        <p:grpSpPr>
+          <a:xfrm>
+            <a:off x="1525390" y="5120361"/>
+            <a:ext cx="7923410" cy="1184940"/>
+            <a:chOff x="1525390" y="3810277"/>
+            <a:chExt cx="7923410" cy="1184940"/>
+          </a:xfrm>
+        </p:grpSpPr>
+        <p:sp>
+          <p:nvSpPr>
+            <p:cNvPr id="11" name="Rectangle 10">
+              <a:extLst>
+                <a:ext uri="{FF2B5EF4-FFF2-40B4-BE49-F238E27FC236}">
+                  <a16:creationId xmlns:a16="http://schemas.microsoft.com/office/drawing/2014/main" id="{91B49790-0484-4C5B-A768-A3CEE69E7730}"/>
+                </a:ext>
+              </a:extLst>
+            </p:cNvPr>
+            <p:cNvSpPr/>
+            <p:nvPr/>
+          </p:nvSpPr>
+          <p:spPr>
+            <a:xfrm>
+              <a:off x="1525390" y="3810277"/>
+              <a:ext cx="2000612" cy="369332"/>
+            </a:xfrm>
+            <a:prstGeom prst="rect">
+              <a:avLst/>
+            </a:prstGeom>
+          </p:spPr>
+          <p:txBody>
+            <a:bodyPr wrap="none">
+              <a:spAutoFit/>
+            </a:bodyPr>
+            <a:lstStyle/>
+            <a:p>
+              <a:r>
+                <a:rPr lang="fr-CH" dirty="0">
+                  <a:latin typeface="Calibri" panose="020F0502020204030204" pitchFamily="34" charset="0"/>
+                  <a:ea typeface="Calibri" panose="020F0502020204030204" pitchFamily="34" charset="0"/>
+                  <a:cs typeface="Arial" panose="020B0604020202020204" pitchFamily="34" charset="0"/>
+                </a:rPr>
+                <a:t>le mode full-duplex</a:t>
+              </a:r>
+              <a:endParaRPr lang="fr-CH" dirty="0"/>
+            </a:p>
+          </p:txBody>
+        </p:sp>
+        <p:sp>
+          <p:nvSpPr>
+            <p:cNvPr id="12" name="ZoneTexte 11">
+              <a:extLst>
+                <a:ext uri="{FF2B5EF4-FFF2-40B4-BE49-F238E27FC236}">
+                  <a16:creationId xmlns:a16="http://schemas.microsoft.com/office/drawing/2014/main" id="{CE58D107-D557-4FAB-855F-DF42D305D917}"/>
+                </a:ext>
+              </a:extLst>
+            </p:cNvPr>
+            <p:cNvSpPr txBox="1"/>
+            <p:nvPr/>
+          </p:nvSpPr>
+          <p:spPr>
+            <a:xfrm>
+              <a:off x="3707705" y="3994943"/>
+              <a:ext cx="5741095" cy="1000274"/>
+            </a:xfrm>
+            <a:prstGeom prst="rect">
+              <a:avLst/>
+            </a:prstGeom>
+            <a:noFill/>
+          </p:spPr>
+          <p:txBody>
+            <a:bodyPr wrap="square" rtlCol="0">
+              <a:spAutoFit/>
+            </a:bodyPr>
+            <a:lstStyle/>
+            <a:p>
+              <a:pPr>
+                <a:spcAft>
+                  <a:spcPts val="600"/>
+                </a:spcAft>
+              </a:pPr>
+              <a:r>
+                <a:rPr lang="fr-CH" dirty="0"/>
+                <a:t>Ressemble au fonctionnement d’un talkie-walkie.</a:t>
+              </a:r>
+            </a:p>
+            <a:p>
+              <a:pPr>
+                <a:spcAft>
+                  <a:spcPts val="600"/>
+                </a:spcAft>
+              </a:pPr>
+              <a:r>
+                <a:rPr lang="fr-CH" dirty="0"/>
+                <a:t>Il peut recevoir et envoyer des données de plusieurs périphériques simultanément.</a:t>
+              </a:r>
+            </a:p>
+          </p:txBody>
+        </p:sp>
+      </p:grpSp>
     </p:spTree>
     <p:extLst>
       <p:ext uri="{BB962C8B-B14F-4D97-AF65-F5344CB8AC3E}">
@@ -13753,6 +14187,352 @@
         </p:nvSpPr>
         <p:spPr>
           <a:xfrm>
+            <a:off x="326020" y="634971"/>
+            <a:ext cx="11539959" cy="510199"/>
+          </a:xfrm>
+        </p:spPr>
+        <p:txBody>
+          <a:bodyPr>
+            <a:normAutofit/>
+          </a:bodyPr>
+          <a:lstStyle/>
+          <a:p>
+            <a:pPr marL="0" indent="0">
+              <a:buNone/>
+            </a:pPr>
+            <a:r>
+              <a:rPr lang="it-IT" sz="2400" dirty="0">
+                <a:solidFill>
+                  <a:schemeClr val="tx1"/>
+                </a:solidFill>
+              </a:rPr>
+              <a:t>IEEE </a:t>
+            </a:r>
+            <a:r>
+              <a:rPr lang="it-IT" sz="2400" dirty="0">
+                <a:solidFill>
+                  <a:schemeClr val="tx1"/>
+                </a:solidFill>
+                <a:latin typeface="+mj-lt"/>
+              </a:rPr>
+              <a:t>802.3</a:t>
+            </a:r>
+            <a:endParaRPr lang="fr-CH" sz="2400" dirty="0">
+              <a:solidFill>
+                <a:schemeClr val="tx1"/>
+              </a:solidFill>
+              <a:latin typeface="+mj-lt"/>
+            </a:endParaRPr>
+          </a:p>
+        </p:txBody>
+      </p:sp>
+      <p:sp>
+        <p:nvSpPr>
+          <p:cNvPr id="6" name="Title 1"/>
+          <p:cNvSpPr>
+            <a:spLocks noGrp="1"/>
+          </p:cNvSpPr>
+          <p:nvPr>
+            <p:ph type="title"/>
+          </p:nvPr>
+        </p:nvSpPr>
+        <p:spPr>
+          <a:xfrm>
+            <a:off x="1" y="0"/>
+            <a:ext cx="1689904" cy="510199"/>
+          </a:xfrm>
+        </p:spPr>
+        <p:txBody>
+          <a:bodyPr numCol="1">
+            <a:noAutofit/>
+          </a:bodyPr>
+          <a:lstStyle/>
+          <a:p>
+            <a:pPr algn="ctr"/>
+            <a:r>
+              <a:rPr lang="fr-CH" sz="2800" dirty="0"/>
+              <a:t>NORMES</a:t>
+            </a:r>
+          </a:p>
+        </p:txBody>
+      </p:sp>
+      <p:sp>
+        <p:nvSpPr>
+          <p:cNvPr id="14" name="ZoneTexte 13">
+            <a:extLst>
+              <a:ext uri="{FF2B5EF4-FFF2-40B4-BE49-F238E27FC236}">
+                <a16:creationId xmlns:a16="http://schemas.microsoft.com/office/drawing/2014/main" id="{DCFCBA6D-32BF-45B9-913E-FC03E263FEB7}"/>
+              </a:ext>
+            </a:extLst>
+          </p:cNvPr>
+          <p:cNvSpPr txBox="1"/>
+          <p:nvPr/>
+        </p:nvSpPr>
+        <p:spPr>
+          <a:xfrm>
+            <a:off x="609601" y="1269942"/>
+            <a:ext cx="2974109" cy="369332"/>
+          </a:xfrm>
+          <a:prstGeom prst="rect">
+            <a:avLst/>
+          </a:prstGeom>
+          <a:noFill/>
+        </p:spPr>
+        <p:txBody>
+          <a:bodyPr wrap="square" rtlCol="0">
+            <a:spAutoFit/>
+          </a:bodyPr>
+          <a:lstStyle/>
+          <a:p>
+            <a:r>
+              <a:rPr lang="fr-CH" b="1" dirty="0">
+                <a:latin typeface="+mj-lt"/>
+              </a:rPr>
+              <a:t>Les débits :</a:t>
+            </a:r>
+          </a:p>
+        </p:txBody>
+      </p:sp>
+      <p:sp>
+        <p:nvSpPr>
+          <p:cNvPr id="15" name="ZoneTexte 14">
+            <a:extLst>
+              <a:ext uri="{FF2B5EF4-FFF2-40B4-BE49-F238E27FC236}">
+                <a16:creationId xmlns:a16="http://schemas.microsoft.com/office/drawing/2014/main" id="{6335B29D-0CD6-4CAA-B965-93BCC03492D8}"/>
+              </a:ext>
+            </a:extLst>
+          </p:cNvPr>
+          <p:cNvSpPr txBox="1"/>
+          <p:nvPr/>
+        </p:nvSpPr>
+        <p:spPr>
+          <a:xfrm>
+            <a:off x="942109" y="1764046"/>
+            <a:ext cx="5643418" cy="369332"/>
+          </a:xfrm>
+          <a:prstGeom prst="rect">
+            <a:avLst/>
+          </a:prstGeom>
+          <a:noFill/>
+        </p:spPr>
+        <p:txBody>
+          <a:bodyPr wrap="square" rtlCol="0">
+            <a:spAutoFit/>
+          </a:bodyPr>
+          <a:lstStyle/>
+          <a:p>
+            <a:r>
+              <a:rPr lang="fr-CH" dirty="0"/>
+              <a:t>Il existe 4 débits différents à ce jour.</a:t>
+            </a:r>
+          </a:p>
+        </p:txBody>
+      </p:sp>
+      <p:sp>
+        <p:nvSpPr>
+          <p:cNvPr id="16" name="Rectangle 15">
+            <a:extLst>
+              <a:ext uri="{FF2B5EF4-FFF2-40B4-BE49-F238E27FC236}">
+                <a16:creationId xmlns:a16="http://schemas.microsoft.com/office/drawing/2014/main" id="{598DB639-CD18-4A74-9FFE-C44EB01149A7}"/>
+              </a:ext>
+            </a:extLst>
+          </p:cNvPr>
+          <p:cNvSpPr/>
+          <p:nvPr/>
+        </p:nvSpPr>
+        <p:spPr>
+          <a:xfrm>
+            <a:off x="1320451" y="2258150"/>
+            <a:ext cx="5703806" cy="1701684"/>
+          </a:xfrm>
+          <a:prstGeom prst="rect">
+            <a:avLst/>
+          </a:prstGeom>
+        </p:spPr>
+        <p:txBody>
+          <a:bodyPr wrap="none">
+            <a:spAutoFit/>
+          </a:bodyPr>
+          <a:lstStyle/>
+          <a:p>
+            <a:pPr marL="285750" indent="-285750">
+              <a:lnSpc>
+                <a:spcPct val="150000"/>
+              </a:lnSpc>
+              <a:buFont typeface="Arial" panose="020B0604020202020204" pitchFamily="34" charset="0"/>
+              <a:buChar char="•"/>
+            </a:pPr>
+            <a:r>
+              <a:rPr lang="fr-CH" dirty="0">
+                <a:ea typeface="Calibri" panose="020F0502020204030204" pitchFamily="34" charset="0"/>
+                <a:cs typeface="Arial" panose="020B0604020202020204" pitchFamily="34" charset="0"/>
+              </a:rPr>
+              <a:t>Ethernet qui a un débit de 10 Mb/s,</a:t>
+            </a:r>
+          </a:p>
+          <a:p>
+            <a:pPr marL="285750" indent="-285750">
+              <a:lnSpc>
+                <a:spcPct val="150000"/>
+              </a:lnSpc>
+              <a:buFont typeface="Arial" panose="020B0604020202020204" pitchFamily="34" charset="0"/>
+              <a:buChar char="•"/>
+            </a:pPr>
+            <a:r>
+              <a:rPr lang="fr-CH" dirty="0"/>
+              <a:t>Fast Ethernet qui a un débit de 100 Mb/s,</a:t>
+            </a:r>
+          </a:p>
+          <a:p>
+            <a:pPr marL="285750" indent="-285750">
+              <a:lnSpc>
+                <a:spcPct val="150000"/>
+              </a:lnSpc>
+              <a:buFont typeface="Arial" panose="020B0604020202020204" pitchFamily="34" charset="0"/>
+              <a:buChar char="•"/>
+            </a:pPr>
+            <a:r>
+              <a:rPr lang="fr-CH" dirty="0"/>
+              <a:t>GigaEthernet qui a un débit de 1’000Mb/s et</a:t>
+            </a:r>
+          </a:p>
+          <a:p>
+            <a:pPr marL="285750" indent="-285750">
+              <a:lnSpc>
+                <a:spcPct val="150000"/>
+              </a:lnSpc>
+              <a:buFont typeface="Arial" panose="020B0604020202020204" pitchFamily="34" charset="0"/>
+              <a:buChar char="•"/>
+            </a:pPr>
+            <a:r>
+              <a:rPr lang="fr-CH" dirty="0"/>
+              <a:t>10 GigaEthernet qui a un débit de 10’000Mb/s.</a:t>
+            </a:r>
+          </a:p>
+        </p:txBody>
+      </p:sp>
+    </p:spTree>
+    <p:extLst>
+      <p:ext uri="{BB962C8B-B14F-4D97-AF65-F5344CB8AC3E}">
+        <p14:creationId xmlns:p14="http://schemas.microsoft.com/office/powerpoint/2010/main" val="743191427"/>
+      </p:ext>
+    </p:extLst>
+  </p:cSld>
+  <p:clrMapOvr>
+    <a:masterClrMapping/>
+  </p:clrMapOvr>
+</p:sld>
+</file>
+
+<file path=ppt/slides/slide34.xml><?xml version="1.0" encoding="utf-8"?>
+<p:sld xmlns:a="http://schemas.openxmlformats.org/drawingml/2006/main" xmlns:r="http://schemas.openxmlformats.org/officeDocument/2006/relationships" xmlns:p="http://schemas.openxmlformats.org/presentationml/2006/main">
+  <p:cSld>
+    <p:spTree>
+      <p:nvGrpSpPr>
+        <p:cNvPr id="1" name=""/>
+        <p:cNvGrpSpPr/>
+        <p:nvPr/>
+      </p:nvGrpSpPr>
+      <p:grpSpPr>
+        <a:xfrm>
+          <a:off x="0" y="0"/>
+          <a:ext cx="0" cy="0"/>
+          <a:chOff x="0" y="0"/>
+          <a:chExt cx="0" cy="0"/>
+        </a:xfrm>
+      </p:grpSpPr>
+      <p:sp>
+        <p:nvSpPr>
+          <p:cNvPr id="2" name="Titre 1">
+            <a:extLst>
+              <a:ext uri="{FF2B5EF4-FFF2-40B4-BE49-F238E27FC236}">
+                <a16:creationId xmlns:a16="http://schemas.microsoft.com/office/drawing/2014/main" id="{42B1C103-5438-4ED4-9DC3-64DAD3FD626E}"/>
+              </a:ext>
+            </a:extLst>
+          </p:cNvPr>
+          <p:cNvSpPr>
+            <a:spLocks noGrp="1"/>
+          </p:cNvSpPr>
+          <p:nvPr>
+            <p:ph type="title"/>
+          </p:nvPr>
+        </p:nvSpPr>
+        <p:spPr/>
+        <p:txBody>
+          <a:bodyPr/>
+          <a:lstStyle/>
+          <a:p>
+            <a:endParaRPr lang="fr-CH"/>
+          </a:p>
+        </p:txBody>
+      </p:sp>
+      <p:sp>
+        <p:nvSpPr>
+          <p:cNvPr id="3" name="Espace réservé du contenu 2">
+            <a:extLst>
+              <a:ext uri="{FF2B5EF4-FFF2-40B4-BE49-F238E27FC236}">
+                <a16:creationId xmlns:a16="http://schemas.microsoft.com/office/drawing/2014/main" id="{3BB66C46-EE36-4F98-8862-5AD66F47ABF5}"/>
+              </a:ext>
+            </a:extLst>
+          </p:cNvPr>
+          <p:cNvSpPr>
+            <a:spLocks noGrp="1"/>
+          </p:cNvSpPr>
+          <p:nvPr>
+            <p:ph idx="1"/>
+          </p:nvPr>
+        </p:nvSpPr>
+        <p:spPr/>
+        <p:txBody>
+          <a:bodyPr/>
+          <a:lstStyle/>
+          <a:p>
+            <a:endParaRPr lang="fr-CH"/>
+          </a:p>
+        </p:txBody>
+      </p:sp>
+    </p:spTree>
+    <p:extLst>
+      <p:ext uri="{BB962C8B-B14F-4D97-AF65-F5344CB8AC3E}">
+        <p14:creationId xmlns:p14="http://schemas.microsoft.com/office/powerpoint/2010/main" val="3797207043"/>
+      </p:ext>
+    </p:extLst>
+  </p:cSld>
+  <p:clrMapOvr>
+    <a:masterClrMapping/>
+  </p:clrMapOvr>
+</p:sld>
+</file>
+
+<file path=ppt/slides/slide35.xml><?xml version="1.0" encoding="utf-8"?>
+<p:sld xmlns:a="http://schemas.openxmlformats.org/drawingml/2006/main" xmlns:r="http://schemas.openxmlformats.org/officeDocument/2006/relationships" xmlns:p="http://schemas.openxmlformats.org/presentationml/2006/main">
+  <p:cSld>
+    <p:spTree>
+      <p:nvGrpSpPr>
+        <p:cNvPr id="1" name=""/>
+        <p:cNvGrpSpPr/>
+        <p:nvPr/>
+      </p:nvGrpSpPr>
+      <p:grpSpPr>
+        <a:xfrm>
+          <a:off x="0" y="0"/>
+          <a:ext cx="0" cy="0"/>
+          <a:chOff x="0" y="0"/>
+          <a:chExt cx="0" cy="0"/>
+        </a:xfrm>
+      </p:grpSpPr>
+      <p:sp>
+        <p:nvSpPr>
+          <p:cNvPr id="5" name="Content Placeholder 2"/>
+          <p:cNvSpPr>
+            <a:spLocks noGrp="1"/>
+          </p:cNvSpPr>
+          <p:nvPr>
+            <p:ph idx="1"/>
+          </p:nvPr>
+        </p:nvSpPr>
+        <p:spPr>
+          <a:xfrm>
             <a:off x="277793" y="902826"/>
             <a:ext cx="11539959" cy="5660020"/>
           </a:xfrm>
@@ -13808,7 +14588,7 @@
 </p:sld>
 </file>
 
-<file path=ppt/slides/slide34.xml><?xml version="1.0" encoding="utf-8"?>
+<file path=ppt/slides/slide36.xml><?xml version="1.0" encoding="utf-8"?>
 <p:sld xmlns:a="http://schemas.openxmlformats.org/drawingml/2006/main" xmlns:r="http://schemas.openxmlformats.org/officeDocument/2006/relationships" xmlns:p="http://schemas.openxmlformats.org/presentationml/2006/main">
   <p:cSld>
     <p:spTree>

</xml_diff>

<commit_message>
Ajout d'un slide CAT3
</commit_message>
<xml_diff>
--- a/Module 214 - Fabrication_Ethernet.pptx
+++ b/Module 214 - Fabrication_Ethernet.pptx
@@ -17,32 +17,33 @@
     <p:sldId id="303" r:id="rId11"/>
     <p:sldId id="304" r:id="rId12"/>
     <p:sldId id="261" r:id="rId13"/>
-    <p:sldId id="273" r:id="rId14"/>
-    <p:sldId id="272" r:id="rId15"/>
-    <p:sldId id="305" r:id="rId16"/>
-    <p:sldId id="306" r:id="rId17"/>
-    <p:sldId id="307" r:id="rId18"/>
-    <p:sldId id="274" r:id="rId19"/>
-    <p:sldId id="260" r:id="rId20"/>
-    <p:sldId id="288" r:id="rId21"/>
-    <p:sldId id="289" r:id="rId22"/>
-    <p:sldId id="290" r:id="rId23"/>
-    <p:sldId id="291" r:id="rId24"/>
-    <p:sldId id="292" r:id="rId25"/>
-    <p:sldId id="293" r:id="rId26"/>
-    <p:sldId id="294" r:id="rId27"/>
-    <p:sldId id="262" r:id="rId28"/>
-    <p:sldId id="295" r:id="rId29"/>
-    <p:sldId id="297" r:id="rId30"/>
-    <p:sldId id="296" r:id="rId31"/>
-    <p:sldId id="298" r:id="rId32"/>
-    <p:sldId id="263" r:id="rId33"/>
-    <p:sldId id="309" r:id="rId34"/>
-    <p:sldId id="308" r:id="rId35"/>
-    <p:sldId id="264" r:id="rId36"/>
-    <p:sldId id="310" r:id="rId37"/>
-    <p:sldId id="311" r:id="rId38"/>
-    <p:sldId id="265" r:id="rId39"/>
+    <p:sldId id="313" r:id="rId14"/>
+    <p:sldId id="273" r:id="rId15"/>
+    <p:sldId id="272" r:id="rId16"/>
+    <p:sldId id="305" r:id="rId17"/>
+    <p:sldId id="306" r:id="rId18"/>
+    <p:sldId id="307" r:id="rId19"/>
+    <p:sldId id="274" r:id="rId20"/>
+    <p:sldId id="260" r:id="rId21"/>
+    <p:sldId id="288" r:id="rId22"/>
+    <p:sldId id="289" r:id="rId23"/>
+    <p:sldId id="290" r:id="rId24"/>
+    <p:sldId id="291" r:id="rId25"/>
+    <p:sldId id="292" r:id="rId26"/>
+    <p:sldId id="293" r:id="rId27"/>
+    <p:sldId id="294" r:id="rId28"/>
+    <p:sldId id="262" r:id="rId29"/>
+    <p:sldId id="295" r:id="rId30"/>
+    <p:sldId id="297" r:id="rId31"/>
+    <p:sldId id="296" r:id="rId32"/>
+    <p:sldId id="298" r:id="rId33"/>
+    <p:sldId id="263" r:id="rId34"/>
+    <p:sldId id="309" r:id="rId35"/>
+    <p:sldId id="308" r:id="rId36"/>
+    <p:sldId id="264" r:id="rId37"/>
+    <p:sldId id="310" r:id="rId38"/>
+    <p:sldId id="311" r:id="rId39"/>
+    <p:sldId id="265" r:id="rId40"/>
   </p:sldIdLst>
   <p:sldSz cx="12192000" cy="6858000"/>
   <p:notesSz cx="6858000" cy="9144000"/>
@@ -158,6 +159,7 @@
             <p14:sldId id="303"/>
             <p14:sldId id="304"/>
             <p14:sldId id="261"/>
+            <p14:sldId id="313"/>
             <p14:sldId id="273"/>
             <p14:sldId id="272"/>
             <p14:sldId id="305"/>
@@ -428,7 +430,7 @@
           <a:p>
             <a:fld id="{CE6FAF98-85C3-4CED-96AD-EC23129ABD35}" type="slidenum">
               <a:rPr lang="fr-CH" smtClean="0"/>
-              <a:t>‹N°›</a:t>
+              <a:t>‹#›</a:t>
             </a:fld>
             <a:endParaRPr lang="fr-CH"/>
           </a:p>
@@ -864,7 +866,7 @@
           <a:p>
             <a:fld id="{CE6FAF98-85C3-4CED-96AD-EC23129ABD35}" type="slidenum">
               <a:rPr lang="fr-CH" smtClean="0"/>
-              <a:t>‹N°›</a:t>
+              <a:t>‹#›</a:t>
             </a:fld>
             <a:endParaRPr lang="fr-CH"/>
           </a:p>
@@ -1114,7 +1116,7 @@
           <a:p>
             <a:fld id="{CE6FAF98-85C3-4CED-96AD-EC23129ABD35}" type="slidenum">
               <a:rPr lang="fr-CH" smtClean="0"/>
-              <a:t>‹N°›</a:t>
+              <a:t>‹#›</a:t>
             </a:fld>
             <a:endParaRPr lang="fr-CH"/>
           </a:p>
@@ -1422,7 +1424,7 @@
           <a:p>
             <a:fld id="{CE6FAF98-85C3-4CED-96AD-EC23129ABD35}" type="slidenum">
               <a:rPr lang="fr-CH" smtClean="0"/>
-              <a:t>‹N°›</a:t>
+              <a:t>‹#›</a:t>
             </a:fld>
             <a:endParaRPr lang="fr-CH"/>
           </a:p>
@@ -1740,7 +1742,7 @@
           <a:p>
             <a:fld id="{CE6FAF98-85C3-4CED-96AD-EC23129ABD35}" type="slidenum">
               <a:rPr lang="fr-CH" smtClean="0"/>
-              <a:t>‹N°›</a:t>
+              <a:t>‹#›</a:t>
             </a:fld>
             <a:endParaRPr lang="fr-CH"/>
           </a:p>
@@ -2042,7 +2044,7 @@
           <a:p>
             <a:fld id="{CE6FAF98-85C3-4CED-96AD-EC23129ABD35}" type="slidenum">
               <a:rPr lang="fr-CH" smtClean="0"/>
-              <a:t>‹N°›</a:t>
+              <a:t>‹#›</a:t>
             </a:fld>
             <a:endParaRPr lang="fr-CH"/>
           </a:p>
@@ -2409,7 +2411,7 @@
           <a:p>
             <a:fld id="{CE6FAF98-85C3-4CED-96AD-EC23129ABD35}" type="slidenum">
               <a:rPr lang="fr-CH" smtClean="0"/>
-              <a:t>‹N°›</a:t>
+              <a:t>‹#›</a:t>
             </a:fld>
             <a:endParaRPr lang="fr-CH"/>
           </a:p>
@@ -2583,7 +2585,7 @@
           <a:p>
             <a:fld id="{CE6FAF98-85C3-4CED-96AD-EC23129ABD35}" type="slidenum">
               <a:rPr lang="fr-CH" smtClean="0"/>
-              <a:t>‹N°›</a:t>
+              <a:t>‹#›</a:t>
             </a:fld>
             <a:endParaRPr lang="fr-CH"/>
           </a:p>
@@ -2763,7 +2765,7 @@
           <a:p>
             <a:fld id="{CE6FAF98-85C3-4CED-96AD-EC23129ABD35}" type="slidenum">
               <a:rPr lang="fr-CH" smtClean="0"/>
-              <a:t>‹N°›</a:t>
+              <a:t>‹#›</a:t>
             </a:fld>
             <a:endParaRPr lang="fr-CH"/>
           </a:p>
@@ -2933,7 +2935,7 @@
           <a:p>
             <a:fld id="{CE6FAF98-85C3-4CED-96AD-EC23129ABD35}" type="slidenum">
               <a:rPr lang="fr-CH" smtClean="0"/>
-              <a:t>‹N°›</a:t>
+              <a:t>‹#›</a:t>
             </a:fld>
             <a:endParaRPr lang="fr-CH"/>
           </a:p>
@@ -3183,7 +3185,7 @@
           <a:p>
             <a:fld id="{CE6FAF98-85C3-4CED-96AD-EC23129ABD35}" type="slidenum">
               <a:rPr lang="fr-CH" smtClean="0"/>
-              <a:t>‹N°›</a:t>
+              <a:t>‹#›</a:t>
             </a:fld>
             <a:endParaRPr lang="fr-CH"/>
           </a:p>
@@ -3419,7 +3421,7 @@
           <a:p>
             <a:fld id="{CE6FAF98-85C3-4CED-96AD-EC23129ABD35}" type="slidenum">
               <a:rPr lang="fr-CH" smtClean="0"/>
-              <a:t>‹N°›</a:t>
+              <a:t>‹#›</a:t>
             </a:fld>
             <a:endParaRPr lang="fr-CH"/>
           </a:p>
@@ -3801,7 +3803,7 @@
           <a:p>
             <a:fld id="{CE6FAF98-85C3-4CED-96AD-EC23129ABD35}" type="slidenum">
               <a:rPr lang="fr-CH" smtClean="0"/>
-              <a:t>‹N°›</a:t>
+              <a:t>‹#›</a:t>
             </a:fld>
             <a:endParaRPr lang="fr-CH"/>
           </a:p>
@@ -3919,7 +3921,7 @@
           <a:p>
             <a:fld id="{CE6FAF98-85C3-4CED-96AD-EC23129ABD35}" type="slidenum">
               <a:rPr lang="fr-CH" smtClean="0"/>
-              <a:t>‹N°›</a:t>
+              <a:t>‹#›</a:t>
             </a:fld>
             <a:endParaRPr lang="fr-CH"/>
           </a:p>
@@ -4014,7 +4016,7 @@
           <a:p>
             <a:fld id="{CE6FAF98-85C3-4CED-96AD-EC23129ABD35}" type="slidenum">
               <a:rPr lang="fr-CH" smtClean="0"/>
-              <a:t>‹N°›</a:t>
+              <a:t>‹#›</a:t>
             </a:fld>
             <a:endParaRPr lang="fr-CH"/>
           </a:p>
@@ -4269,7 +4271,7 @@
           <a:p>
             <a:fld id="{CE6FAF98-85C3-4CED-96AD-EC23129ABD35}" type="slidenum">
               <a:rPr lang="fr-CH" smtClean="0"/>
-              <a:t>‹N°›</a:t>
+              <a:t>‹#›</a:t>
             </a:fld>
             <a:endParaRPr lang="fr-CH"/>
           </a:p>
@@ -4552,7 +4554,7 @@
           <a:p>
             <a:fld id="{CE6FAF98-85C3-4CED-96AD-EC23129ABD35}" type="slidenum">
               <a:rPr lang="fr-CH" smtClean="0"/>
-              <a:t>‹N°›</a:t>
+              <a:t>‹#›</a:t>
             </a:fld>
             <a:endParaRPr lang="fr-CH"/>
           </a:p>
@@ -4998,7 +5000,7 @@
           <a:p>
             <a:fld id="{CE6FAF98-85C3-4CED-96AD-EC23129ABD35}" type="slidenum">
               <a:rPr lang="fr-CH" smtClean="0"/>
-              <a:t>‹N°›</a:t>
+              <a:t>‹#›</a:t>
             </a:fld>
             <a:endParaRPr lang="fr-CH"/>
           </a:p>
@@ -6796,15 +6798,20 @@
             <a:pPr algn="ctr"/>
             <a:r>
               <a:rPr lang="fr-CH" sz="2800" dirty="0"/>
-              <a:t>CATEGORIE 5</a:t>
-            </a:r>
+              <a:t>CATEGORIE </a:t>
+            </a:r>
+            <a:r>
+              <a:rPr lang="fr-CH" sz="2800" dirty="0"/>
+              <a:t>3</a:t>
+            </a:r>
+            <a:endParaRPr lang="fr-CH" sz="2800" dirty="0"/>
           </a:p>
         </p:txBody>
       </p:sp>
     </p:spTree>
     <p:extLst>
       <p:ext uri="{BB962C8B-B14F-4D97-AF65-F5344CB8AC3E}">
-        <p14:creationId xmlns:p14="http://schemas.microsoft.com/office/powerpoint/2010/main" val="3479421088"/>
+        <p14:creationId xmlns:p14="http://schemas.microsoft.com/office/powerpoint/2010/main" val="188863873"/>
       </p:ext>
     </p:extLst>
   </p:cSld>
@@ -6868,6 +6875,90 @@
         <p:spPr>
           <a:xfrm>
             <a:off x="0" y="0"/>
+            <a:ext cx="2511706" cy="510199"/>
+          </a:xfrm>
+        </p:spPr>
+        <p:txBody>
+          <a:bodyPr numCol="1">
+            <a:noAutofit/>
+          </a:bodyPr>
+          <a:lstStyle/>
+          <a:p>
+            <a:pPr algn="ctr"/>
+            <a:r>
+              <a:rPr lang="fr-CH" sz="2800" dirty="0"/>
+              <a:t>CATEGORIE 5</a:t>
+            </a:r>
+          </a:p>
+        </p:txBody>
+      </p:sp>
+    </p:spTree>
+    <p:extLst>
+      <p:ext uri="{BB962C8B-B14F-4D97-AF65-F5344CB8AC3E}">
+        <p14:creationId xmlns:p14="http://schemas.microsoft.com/office/powerpoint/2010/main" val="3479421088"/>
+      </p:ext>
+    </p:extLst>
+  </p:cSld>
+  <p:clrMapOvr>
+    <a:masterClrMapping/>
+  </p:clrMapOvr>
+</p:sld>
+</file>
+
+<file path=ppt/slides/slide15.xml><?xml version="1.0" encoding="utf-8"?>
+<p:sld xmlns:a="http://schemas.openxmlformats.org/drawingml/2006/main" xmlns:r="http://schemas.openxmlformats.org/officeDocument/2006/relationships" xmlns:p="http://schemas.openxmlformats.org/presentationml/2006/main">
+  <p:cSld>
+    <p:spTree>
+      <p:nvGrpSpPr>
+        <p:cNvPr id="1" name=""/>
+        <p:cNvGrpSpPr/>
+        <p:nvPr/>
+      </p:nvGrpSpPr>
+      <p:grpSpPr>
+        <a:xfrm>
+          <a:off x="0" y="0"/>
+          <a:ext cx="0" cy="0"/>
+          <a:chOff x="0" y="0"/>
+          <a:chExt cx="0" cy="0"/>
+        </a:xfrm>
+      </p:grpSpPr>
+      <p:sp>
+        <p:nvSpPr>
+          <p:cNvPr id="5" name="Content Placeholder 2"/>
+          <p:cNvSpPr>
+            <a:spLocks noGrp="1"/>
+          </p:cNvSpPr>
+          <p:nvPr>
+            <p:ph idx="1"/>
+          </p:nvPr>
+        </p:nvSpPr>
+        <p:spPr>
+          <a:xfrm>
+            <a:off x="277793" y="902826"/>
+            <a:ext cx="11539959" cy="5660020"/>
+          </a:xfrm>
+        </p:spPr>
+        <p:txBody>
+          <a:bodyPr/>
+          <a:lstStyle/>
+          <a:p>
+            <a:endParaRPr lang="fr-CH" dirty="0"/>
+          </a:p>
+        </p:txBody>
+      </p:sp>
+      <p:sp>
+        <p:nvSpPr>
+          <p:cNvPr id="6" name="Title 1"/>
+          <p:cNvSpPr>
+            <a:spLocks noGrp="1"/>
+          </p:cNvSpPr>
+          <p:nvPr>
+            <p:ph type="title"/>
+          </p:nvPr>
+        </p:nvSpPr>
+        <p:spPr>
+          <a:xfrm>
+            <a:off x="0" y="0"/>
             <a:ext cx="2720051" cy="510199"/>
           </a:xfrm>
         </p:spPr>
@@ -6898,7 +6989,7 @@
 </p:sld>
 </file>
 
-<file path=ppt/slides/slide15.xml><?xml version="1.0" encoding="utf-8"?>
+<file path=ppt/slides/slide16.xml><?xml version="1.0" encoding="utf-8"?>
 <p:sld xmlns:a="http://schemas.openxmlformats.org/drawingml/2006/main" xmlns:r="http://schemas.openxmlformats.org/officeDocument/2006/relationships" xmlns:p="http://schemas.openxmlformats.org/presentationml/2006/main">
   <p:cSld>
     <p:spTree>
@@ -7821,7 +7912,7 @@
 </p:sld>
 </file>
 
-<file path=ppt/slides/slide16.xml><?xml version="1.0" encoding="utf-8"?>
+<file path=ppt/slides/slide17.xml><?xml version="1.0" encoding="utf-8"?>
 <p:sld xmlns:a="http://schemas.openxmlformats.org/drawingml/2006/main" xmlns:r="http://schemas.openxmlformats.org/officeDocument/2006/relationships" xmlns:p="http://schemas.openxmlformats.org/presentationml/2006/main">
   <p:cSld>
     <p:spTree>
@@ -8474,7 +8565,7 @@
 </p:sld>
 </file>
 
-<file path=ppt/slides/slide17.xml><?xml version="1.0" encoding="utf-8"?>
+<file path=ppt/slides/slide18.xml><?xml version="1.0" encoding="utf-8"?>
 <p:sld xmlns:a="http://schemas.openxmlformats.org/drawingml/2006/main" xmlns:r="http://schemas.openxmlformats.org/officeDocument/2006/relationships" xmlns:p="http://schemas.openxmlformats.org/presentationml/2006/main">
   <p:cSld>
     <p:spTree>
@@ -9436,90 +9527,6 @@
 </p:sld>
 </file>
 
-<file path=ppt/slides/slide18.xml><?xml version="1.0" encoding="utf-8"?>
-<p:sld xmlns:a="http://schemas.openxmlformats.org/drawingml/2006/main" xmlns:r="http://schemas.openxmlformats.org/officeDocument/2006/relationships" xmlns:p="http://schemas.openxmlformats.org/presentationml/2006/main">
-  <p:cSld>
-    <p:spTree>
-      <p:nvGrpSpPr>
-        <p:cNvPr id="1" name=""/>
-        <p:cNvGrpSpPr/>
-        <p:nvPr/>
-      </p:nvGrpSpPr>
-      <p:grpSpPr>
-        <a:xfrm>
-          <a:off x="0" y="0"/>
-          <a:ext cx="0" cy="0"/>
-          <a:chOff x="0" y="0"/>
-          <a:chExt cx="0" cy="0"/>
-        </a:xfrm>
-      </p:grpSpPr>
-      <p:sp>
-        <p:nvSpPr>
-          <p:cNvPr id="5" name="Title 1"/>
-          <p:cNvSpPr>
-            <a:spLocks noGrp="1"/>
-          </p:cNvSpPr>
-          <p:nvPr>
-            <p:ph type="title"/>
-          </p:nvPr>
-        </p:nvSpPr>
-        <p:spPr>
-          <a:xfrm>
-            <a:off x="1" y="0"/>
-            <a:ext cx="2500131" cy="510199"/>
-          </a:xfrm>
-        </p:spPr>
-        <p:txBody>
-          <a:bodyPr numCol="1">
-            <a:noAutofit/>
-          </a:bodyPr>
-          <a:lstStyle/>
-          <a:p>
-            <a:pPr algn="ctr"/>
-            <a:r>
-              <a:rPr lang="fr-CH" sz="2800" dirty="0"/>
-              <a:t>CATEGORIE 8</a:t>
-            </a:r>
-          </a:p>
-        </p:txBody>
-      </p:sp>
-      <p:sp>
-        <p:nvSpPr>
-          <p:cNvPr id="6" name="Content Placeholder 2"/>
-          <p:cNvSpPr>
-            <a:spLocks noGrp="1"/>
-          </p:cNvSpPr>
-          <p:nvPr>
-            <p:ph idx="1"/>
-          </p:nvPr>
-        </p:nvSpPr>
-        <p:spPr>
-          <a:xfrm>
-            <a:off x="277793" y="902826"/>
-            <a:ext cx="11539959" cy="5660020"/>
-          </a:xfrm>
-        </p:spPr>
-        <p:txBody>
-          <a:bodyPr/>
-          <a:lstStyle/>
-          <a:p>
-            <a:endParaRPr lang="fr-CH" dirty="0"/>
-          </a:p>
-        </p:txBody>
-      </p:sp>
-    </p:spTree>
-    <p:extLst>
-      <p:ext uri="{BB962C8B-B14F-4D97-AF65-F5344CB8AC3E}">
-        <p14:creationId xmlns:p14="http://schemas.microsoft.com/office/powerpoint/2010/main" val="214735131"/>
-      </p:ext>
-    </p:extLst>
-  </p:cSld>
-  <p:clrMapOvr>
-    <a:masterClrMapping/>
-  </p:clrMapOvr>
-</p:sld>
-</file>
-
 <file path=ppt/slides/slide19.xml><?xml version="1.0" encoding="utf-8"?>
 <p:sld xmlns:a="http://schemas.openxmlformats.org/drawingml/2006/main" xmlns:r="http://schemas.openxmlformats.org/officeDocument/2006/relationships" xmlns:p="http://schemas.openxmlformats.org/presentationml/2006/main">
   <p:cSld>
@@ -9539,6 +9546,308 @@
       </p:grpSpPr>
       <p:sp>
         <p:nvSpPr>
+          <p:cNvPr id="5" name="Title 1"/>
+          <p:cNvSpPr>
+            <a:spLocks noGrp="1"/>
+          </p:cNvSpPr>
+          <p:nvPr>
+            <p:ph type="title"/>
+          </p:nvPr>
+        </p:nvSpPr>
+        <p:spPr>
+          <a:xfrm>
+            <a:off x="1" y="0"/>
+            <a:ext cx="2500131" cy="510199"/>
+          </a:xfrm>
+        </p:spPr>
+        <p:txBody>
+          <a:bodyPr numCol="1">
+            <a:noAutofit/>
+          </a:bodyPr>
+          <a:lstStyle/>
+          <a:p>
+            <a:pPr algn="ctr"/>
+            <a:r>
+              <a:rPr lang="fr-CH" sz="2800" dirty="0"/>
+              <a:t>CATEGORIE 8</a:t>
+            </a:r>
+          </a:p>
+        </p:txBody>
+      </p:sp>
+      <p:sp>
+        <p:nvSpPr>
+          <p:cNvPr id="6" name="Content Placeholder 2"/>
+          <p:cNvSpPr>
+            <a:spLocks noGrp="1"/>
+          </p:cNvSpPr>
+          <p:nvPr>
+            <p:ph idx="1"/>
+          </p:nvPr>
+        </p:nvSpPr>
+        <p:spPr>
+          <a:xfrm>
+            <a:off x="277793" y="902826"/>
+            <a:ext cx="11539959" cy="5660020"/>
+          </a:xfrm>
+        </p:spPr>
+        <p:txBody>
+          <a:bodyPr/>
+          <a:lstStyle/>
+          <a:p>
+            <a:endParaRPr lang="fr-CH" dirty="0"/>
+          </a:p>
+        </p:txBody>
+      </p:sp>
+    </p:spTree>
+    <p:extLst>
+      <p:ext uri="{BB962C8B-B14F-4D97-AF65-F5344CB8AC3E}">
+        <p14:creationId xmlns:p14="http://schemas.microsoft.com/office/powerpoint/2010/main" val="214735131"/>
+      </p:ext>
+    </p:extLst>
+  </p:cSld>
+  <p:clrMapOvr>
+    <a:masterClrMapping/>
+  </p:clrMapOvr>
+</p:sld>
+</file>
+
+<file path=ppt/slides/slide2.xml><?xml version="1.0" encoding="utf-8"?>
+<p:sld xmlns:a="http://schemas.openxmlformats.org/drawingml/2006/main" xmlns:r="http://schemas.openxmlformats.org/officeDocument/2006/relationships" xmlns:p="http://schemas.openxmlformats.org/presentationml/2006/main">
+  <p:cSld>
+    <p:spTree>
+      <p:nvGrpSpPr>
+        <p:cNvPr id="1" name=""/>
+        <p:cNvGrpSpPr/>
+        <p:nvPr/>
+      </p:nvGrpSpPr>
+      <p:grpSpPr>
+        <a:xfrm>
+          <a:off x="0" y="0"/>
+          <a:ext cx="0" cy="0"/>
+          <a:chOff x="0" y="0"/>
+          <a:chExt cx="0" cy="0"/>
+        </a:xfrm>
+      </p:grpSpPr>
+      <p:sp>
+        <p:nvSpPr>
+          <p:cNvPr id="2" name="Title 1"/>
+          <p:cNvSpPr>
+            <a:spLocks noGrp="1"/>
+          </p:cNvSpPr>
+          <p:nvPr>
+            <p:ph type="title"/>
+          </p:nvPr>
+        </p:nvSpPr>
+        <p:spPr>
+          <a:xfrm>
+            <a:off x="646112" y="452718"/>
+            <a:ext cx="4273130" cy="716325"/>
+          </a:xfrm>
+        </p:spPr>
+        <p:txBody>
+          <a:bodyPr/>
+          <a:lstStyle/>
+          <a:p>
+            <a:r>
+              <a:rPr lang="fr-CH" dirty="0"/>
+              <a:t>SOMMAIRE</a:t>
+            </a:r>
+          </a:p>
+        </p:txBody>
+      </p:sp>
+      <p:sp>
+        <p:nvSpPr>
+          <p:cNvPr id="3" name="Content Placeholder 2"/>
+          <p:cNvSpPr>
+            <a:spLocks noGrp="1"/>
+          </p:cNvSpPr>
+          <p:nvPr>
+            <p:ph idx="1"/>
+          </p:nvPr>
+        </p:nvSpPr>
+        <p:spPr>
+          <a:xfrm>
+            <a:off x="999140" y="1520483"/>
+            <a:ext cx="10216729" cy="5042363"/>
+          </a:xfrm>
+        </p:spPr>
+        <p:txBody>
+          <a:bodyPr>
+            <a:normAutofit fontScale="77500" lnSpcReduction="20000"/>
+          </a:bodyPr>
+          <a:lstStyle/>
+          <a:p>
+            <a:pPr>
+              <a:lnSpc>
+                <a:spcPct val="150000"/>
+              </a:lnSpc>
+            </a:pPr>
+            <a:r>
+              <a:rPr lang="fr-CH" sz="2600" dirty="0">
+                <a:solidFill>
+                  <a:schemeClr val="tx1"/>
+                </a:solidFill>
+              </a:rPr>
+              <a:t>Introduction</a:t>
+            </a:r>
+          </a:p>
+          <a:p>
+            <a:pPr>
+              <a:lnSpc>
+                <a:spcPct val="150000"/>
+              </a:lnSpc>
+            </a:pPr>
+            <a:r>
+              <a:rPr lang="fr-CH" sz="2600" dirty="0">
+                <a:solidFill>
+                  <a:schemeClr val="tx1"/>
+                </a:solidFill>
+              </a:rPr>
+              <a:t>Historique</a:t>
+            </a:r>
+          </a:p>
+          <a:p>
+            <a:pPr>
+              <a:lnSpc>
+                <a:spcPct val="150000"/>
+              </a:lnSpc>
+            </a:pPr>
+            <a:r>
+              <a:rPr lang="fr-CH" sz="2600" dirty="0">
+                <a:solidFill>
+                  <a:schemeClr val="tx1"/>
+                </a:solidFill>
+              </a:rPr>
+              <a:t>Usage</a:t>
+            </a:r>
+          </a:p>
+          <a:p>
+            <a:pPr>
+              <a:lnSpc>
+                <a:spcPct val="150000"/>
+              </a:lnSpc>
+            </a:pPr>
+            <a:r>
+              <a:rPr lang="fr-CH" sz="2600" dirty="0">
+                <a:solidFill>
+                  <a:schemeClr val="tx1"/>
+                </a:solidFill>
+              </a:rPr>
+              <a:t>La Technologie PoE</a:t>
+            </a:r>
+          </a:p>
+          <a:p>
+            <a:pPr>
+              <a:lnSpc>
+                <a:spcPct val="150000"/>
+              </a:lnSpc>
+            </a:pPr>
+            <a:r>
+              <a:rPr lang="fr-CH" sz="2600" dirty="0">
+                <a:solidFill>
+                  <a:schemeClr val="tx1"/>
+                </a:solidFill>
+              </a:rPr>
+              <a:t>Catégories des câbles Ethernet</a:t>
+            </a:r>
+          </a:p>
+          <a:p>
+            <a:pPr>
+              <a:lnSpc>
+                <a:spcPct val="150000"/>
+              </a:lnSpc>
+            </a:pPr>
+            <a:r>
+              <a:rPr lang="fr-CH" sz="2600" dirty="0">
+                <a:solidFill>
+                  <a:schemeClr val="tx1"/>
+                </a:solidFill>
+              </a:rPr>
+              <a:t>Blindages</a:t>
+            </a:r>
+          </a:p>
+          <a:p>
+            <a:pPr>
+              <a:lnSpc>
+                <a:spcPct val="150000"/>
+              </a:lnSpc>
+            </a:pPr>
+            <a:r>
+              <a:rPr lang="fr-CH" sz="2600" dirty="0">
+                <a:solidFill>
+                  <a:schemeClr val="tx1"/>
+                </a:solidFill>
+              </a:rPr>
+              <a:t>Connectiques</a:t>
+            </a:r>
+          </a:p>
+          <a:p>
+            <a:pPr>
+              <a:lnSpc>
+                <a:spcPct val="150000"/>
+              </a:lnSpc>
+            </a:pPr>
+            <a:r>
+              <a:rPr lang="fr-CH" sz="2600" dirty="0">
+                <a:solidFill>
+                  <a:schemeClr val="tx1"/>
+                </a:solidFill>
+              </a:rPr>
+              <a:t>Normes</a:t>
+            </a:r>
+          </a:p>
+          <a:p>
+            <a:pPr>
+              <a:lnSpc>
+                <a:spcPct val="150000"/>
+              </a:lnSpc>
+            </a:pPr>
+            <a:r>
+              <a:rPr lang="fr-CH" sz="2600" dirty="0">
+                <a:solidFill>
+                  <a:schemeClr val="tx1"/>
+                </a:solidFill>
+              </a:rPr>
+              <a:t>Fabrication</a:t>
+            </a:r>
+          </a:p>
+          <a:p>
+            <a:endParaRPr lang="fr-CH" dirty="0"/>
+          </a:p>
+        </p:txBody>
+      </p:sp>
+    </p:spTree>
+    <p:extLst>
+      <p:ext uri="{BB962C8B-B14F-4D97-AF65-F5344CB8AC3E}">
+        <p14:creationId xmlns:p14="http://schemas.microsoft.com/office/powerpoint/2010/main" val="829066155"/>
+      </p:ext>
+    </p:extLst>
+  </p:cSld>
+  <p:clrMapOvr>
+    <a:masterClrMapping/>
+  </p:clrMapOvr>
+</p:sld>
+</file>
+
+<file path=ppt/slides/slide20.xml><?xml version="1.0" encoding="utf-8"?>
+<p:sld xmlns:a="http://schemas.openxmlformats.org/drawingml/2006/main" xmlns:r="http://schemas.openxmlformats.org/officeDocument/2006/relationships" xmlns:p="http://schemas.openxmlformats.org/presentationml/2006/main">
+  <p:cSld>
+    <p:spTree>
+      <p:nvGrpSpPr>
+        <p:cNvPr id="1" name=""/>
+        <p:cNvGrpSpPr/>
+        <p:nvPr/>
+      </p:nvGrpSpPr>
+      <p:grpSpPr>
+        <a:xfrm>
+          <a:off x="0" y="0"/>
+          <a:ext cx="0" cy="0"/>
+          <a:chOff x="0" y="0"/>
+          <a:chExt cx="0" cy="0"/>
+        </a:xfrm>
+      </p:grpSpPr>
+      <p:sp>
+        <p:nvSpPr>
           <p:cNvPr id="8" name="Title 1"/>
           <p:cNvSpPr>
             <a:spLocks noGrp="1"/>
@@ -9572,7 +9881,7 @@
           <p:cNvPr id="5" name="Content Placeholder 2">
             <a:extLst>
               <a:ext uri="{FF2B5EF4-FFF2-40B4-BE49-F238E27FC236}">
-                <a16:creationId xmlns:a16="http://schemas.microsoft.com/office/drawing/2014/main" id="{F8CDF8D4-22A3-4F52-B3A1-BDF90524C006}"/>
+                <a16:creationId xmlns:a16="http://schemas.microsoft.com/office/drawing/2014/main" xmlns="" id="{F8CDF8D4-22A3-4F52-B3A1-BDF90524C006}"/>
               </a:ext>
             </a:extLst>
           </p:cNvPr>
@@ -9839,7 +10148,7 @@
           <p:cNvPr id="6" name="Content Placeholder 2">
             <a:extLst>
               <a:ext uri="{FF2B5EF4-FFF2-40B4-BE49-F238E27FC236}">
-                <a16:creationId xmlns:a16="http://schemas.microsoft.com/office/drawing/2014/main" id="{8D58F6CE-D1F4-48B3-95BD-E6A6BBA27883}"/>
+                <a16:creationId xmlns:a16="http://schemas.microsoft.com/office/drawing/2014/main" xmlns="" id="{8D58F6CE-D1F4-48B3-95BD-E6A6BBA27883}"/>
               </a:ext>
             </a:extLst>
           </p:cNvPr>
@@ -10297,7 +10606,7 @@
 </p:sld>
 </file>
 
-<file path=ppt/slides/slide2.xml><?xml version="1.0" encoding="utf-8"?>
+<file path=ppt/slides/slide21.xml><?xml version="1.0" encoding="utf-8"?>
 <p:sld xmlns:a="http://schemas.openxmlformats.org/drawingml/2006/main" xmlns:r="http://schemas.openxmlformats.org/officeDocument/2006/relationships" xmlns:p="http://schemas.openxmlformats.org/presentationml/2006/main">
   <p:cSld>
     <p:spTree>
@@ -10316,228 +10625,10 @@
       </p:grpSpPr>
       <p:sp>
         <p:nvSpPr>
-          <p:cNvPr id="2" name="Title 1"/>
-          <p:cNvSpPr>
-            <a:spLocks noGrp="1"/>
-          </p:cNvSpPr>
-          <p:nvPr>
-            <p:ph type="title"/>
-          </p:nvPr>
-        </p:nvSpPr>
-        <p:spPr>
-          <a:xfrm>
-            <a:off x="646112" y="452718"/>
-            <a:ext cx="4273130" cy="716325"/>
-          </a:xfrm>
-        </p:spPr>
-        <p:txBody>
-          <a:bodyPr/>
-          <a:lstStyle/>
-          <a:p>
-            <a:r>
-              <a:rPr lang="fr-CH" dirty="0"/>
-              <a:t>SOMMAIRE</a:t>
-            </a:r>
-          </a:p>
-        </p:txBody>
-      </p:sp>
-      <p:sp>
-        <p:nvSpPr>
-          <p:cNvPr id="3" name="Content Placeholder 2"/>
-          <p:cNvSpPr>
-            <a:spLocks noGrp="1"/>
-          </p:cNvSpPr>
-          <p:nvPr>
-            <p:ph idx="1"/>
-          </p:nvPr>
-        </p:nvSpPr>
-        <p:spPr>
-          <a:xfrm>
-            <a:off x="999140" y="1520483"/>
-            <a:ext cx="10216729" cy="5042363"/>
-          </a:xfrm>
-        </p:spPr>
-        <p:txBody>
-          <a:bodyPr>
-            <a:normAutofit fontScale="77500" lnSpcReduction="20000"/>
-          </a:bodyPr>
-          <a:lstStyle/>
-          <a:p>
-            <a:pPr>
-              <a:lnSpc>
-                <a:spcPct val="150000"/>
-              </a:lnSpc>
-            </a:pPr>
-            <a:r>
-              <a:rPr lang="fr-CH" sz="2600" dirty="0">
-                <a:solidFill>
-                  <a:schemeClr val="tx1"/>
-                </a:solidFill>
-              </a:rPr>
-              <a:t>Introduction</a:t>
-            </a:r>
-          </a:p>
-          <a:p>
-            <a:pPr>
-              <a:lnSpc>
-                <a:spcPct val="150000"/>
-              </a:lnSpc>
-            </a:pPr>
-            <a:r>
-              <a:rPr lang="fr-CH" sz="2600" dirty="0">
-                <a:solidFill>
-                  <a:schemeClr val="tx1"/>
-                </a:solidFill>
-              </a:rPr>
-              <a:t>Historique</a:t>
-            </a:r>
-          </a:p>
-          <a:p>
-            <a:pPr>
-              <a:lnSpc>
-                <a:spcPct val="150000"/>
-              </a:lnSpc>
-            </a:pPr>
-            <a:r>
-              <a:rPr lang="fr-CH" sz="2600" dirty="0">
-                <a:solidFill>
-                  <a:schemeClr val="tx1"/>
-                </a:solidFill>
-              </a:rPr>
-              <a:t>Usage</a:t>
-            </a:r>
-          </a:p>
-          <a:p>
-            <a:pPr>
-              <a:lnSpc>
-                <a:spcPct val="150000"/>
-              </a:lnSpc>
-            </a:pPr>
-            <a:r>
-              <a:rPr lang="fr-CH" sz="2600" dirty="0">
-                <a:solidFill>
-                  <a:schemeClr val="tx1"/>
-                </a:solidFill>
-              </a:rPr>
-              <a:t>La Technologie PoE</a:t>
-            </a:r>
-          </a:p>
-          <a:p>
-            <a:pPr>
-              <a:lnSpc>
-                <a:spcPct val="150000"/>
-              </a:lnSpc>
-            </a:pPr>
-            <a:r>
-              <a:rPr lang="fr-CH" sz="2600" dirty="0">
-                <a:solidFill>
-                  <a:schemeClr val="tx1"/>
-                </a:solidFill>
-              </a:rPr>
-              <a:t>Catégories des câbles Ethernet</a:t>
-            </a:r>
-          </a:p>
-          <a:p>
-            <a:pPr>
-              <a:lnSpc>
-                <a:spcPct val="150000"/>
-              </a:lnSpc>
-            </a:pPr>
-            <a:r>
-              <a:rPr lang="fr-CH" sz="2600" dirty="0">
-                <a:solidFill>
-                  <a:schemeClr val="tx1"/>
-                </a:solidFill>
-              </a:rPr>
-              <a:t>Blindages</a:t>
-            </a:r>
-          </a:p>
-          <a:p>
-            <a:pPr>
-              <a:lnSpc>
-                <a:spcPct val="150000"/>
-              </a:lnSpc>
-            </a:pPr>
-            <a:r>
-              <a:rPr lang="fr-CH" sz="2600" dirty="0">
-                <a:solidFill>
-                  <a:schemeClr val="tx1"/>
-                </a:solidFill>
-              </a:rPr>
-              <a:t>Connectiques</a:t>
-            </a:r>
-          </a:p>
-          <a:p>
-            <a:pPr>
-              <a:lnSpc>
-                <a:spcPct val="150000"/>
-              </a:lnSpc>
-            </a:pPr>
-            <a:r>
-              <a:rPr lang="fr-CH" sz="2600" dirty="0">
-                <a:solidFill>
-                  <a:schemeClr val="tx1"/>
-                </a:solidFill>
-              </a:rPr>
-              <a:t>Normes</a:t>
-            </a:r>
-          </a:p>
-          <a:p>
-            <a:pPr>
-              <a:lnSpc>
-                <a:spcPct val="150000"/>
-              </a:lnSpc>
-            </a:pPr>
-            <a:r>
-              <a:rPr lang="fr-CH" sz="2600" dirty="0">
-                <a:solidFill>
-                  <a:schemeClr val="tx1"/>
-                </a:solidFill>
-              </a:rPr>
-              <a:t>Fabrication</a:t>
-            </a:r>
-          </a:p>
-          <a:p>
-            <a:endParaRPr lang="fr-CH" dirty="0"/>
-          </a:p>
-        </p:txBody>
-      </p:sp>
-    </p:spTree>
-    <p:extLst>
-      <p:ext uri="{BB962C8B-B14F-4D97-AF65-F5344CB8AC3E}">
-        <p14:creationId xmlns:p14="http://schemas.microsoft.com/office/powerpoint/2010/main" val="829066155"/>
-      </p:ext>
-    </p:extLst>
-  </p:cSld>
-  <p:clrMapOvr>
-    <a:masterClrMapping/>
-  </p:clrMapOvr>
-</p:sld>
-</file>
-
-<file path=ppt/slides/slide20.xml><?xml version="1.0" encoding="utf-8"?>
-<p:sld xmlns:a="http://schemas.openxmlformats.org/drawingml/2006/main" xmlns:r="http://schemas.openxmlformats.org/officeDocument/2006/relationships" xmlns:p="http://schemas.openxmlformats.org/presentationml/2006/main">
-  <p:cSld>
-    <p:spTree>
-      <p:nvGrpSpPr>
-        <p:cNvPr id="1" name=""/>
-        <p:cNvGrpSpPr/>
-        <p:nvPr/>
-      </p:nvGrpSpPr>
-      <p:grpSpPr>
-        <a:xfrm>
-          <a:off x="0" y="0"/>
-          <a:ext cx="0" cy="0"/>
-          <a:chOff x="0" y="0"/>
-          <a:chExt cx="0" cy="0"/>
-        </a:xfrm>
-      </p:grpSpPr>
-      <p:sp>
-        <p:nvSpPr>
           <p:cNvPr id="4" name="Title 1">
             <a:extLst>
               <a:ext uri="{FF2B5EF4-FFF2-40B4-BE49-F238E27FC236}">
-                <a16:creationId xmlns:a16="http://schemas.microsoft.com/office/drawing/2014/main" id="{02619F9C-EB8C-47C2-8D51-281BE6C9E803}"/>
+                <a16:creationId xmlns:a16="http://schemas.microsoft.com/office/drawing/2014/main" xmlns="" id="{02619F9C-EB8C-47C2-8D51-281BE6C9E803}"/>
               </a:ext>
             </a:extLst>
           </p:cNvPr>
@@ -10650,7 +10741,7 @@
           <p:cNvPr id="9" name="Image 8">
             <a:extLst>
               <a:ext uri="{FF2B5EF4-FFF2-40B4-BE49-F238E27FC236}">
-                <a16:creationId xmlns:a16="http://schemas.microsoft.com/office/drawing/2014/main" id="{581026FC-1090-4023-909F-15FCFF27EEA7}"/>
+                <a16:creationId xmlns:a16="http://schemas.microsoft.com/office/drawing/2014/main" xmlns="" id="{581026FC-1090-4023-909F-15FCFF27EEA7}"/>
               </a:ext>
             </a:extLst>
           </p:cNvPr>
@@ -10688,7 +10779,7 @@
 </p:sld>
 </file>
 
-<file path=ppt/slides/slide21.xml><?xml version="1.0" encoding="utf-8"?>
+<file path=ppt/slides/slide22.xml><?xml version="1.0" encoding="utf-8"?>
 <p:sld xmlns:a="http://schemas.openxmlformats.org/drawingml/2006/main" xmlns:r="http://schemas.openxmlformats.org/officeDocument/2006/relationships" xmlns:p="http://schemas.openxmlformats.org/presentationml/2006/main">
   <p:cSld>
     <p:spTree>
@@ -10710,7 +10801,7 @@
           <p:cNvPr id="4" name="Title 1">
             <a:extLst>
               <a:ext uri="{FF2B5EF4-FFF2-40B4-BE49-F238E27FC236}">
-                <a16:creationId xmlns:a16="http://schemas.microsoft.com/office/drawing/2014/main" id="{02619F9C-EB8C-47C2-8D51-281BE6C9E803}"/>
+                <a16:creationId xmlns:a16="http://schemas.microsoft.com/office/drawing/2014/main" xmlns="" id="{02619F9C-EB8C-47C2-8D51-281BE6C9E803}"/>
               </a:ext>
             </a:extLst>
           </p:cNvPr>
@@ -10823,7 +10914,7 @@
           <p:cNvPr id="2" name="ZoneTexte 1">
             <a:extLst>
               <a:ext uri="{FF2B5EF4-FFF2-40B4-BE49-F238E27FC236}">
-                <a16:creationId xmlns:a16="http://schemas.microsoft.com/office/drawing/2014/main" id="{08E408DC-C551-47B5-8C33-FA0FF463FB0C}"/>
+                <a16:creationId xmlns:a16="http://schemas.microsoft.com/office/drawing/2014/main" xmlns="" id="{08E408DC-C551-47B5-8C33-FA0FF463FB0C}"/>
               </a:ext>
             </a:extLst>
           </p:cNvPr>
@@ -10863,7 +10954,7 @@
           <p:cNvPr id="5" name="Picture 14" descr="C:\Users\wmeisen\AppData\Local\Microsoft\Windows\INetCache\Content.MSO\A42E0746.tmp">
             <a:extLst>
               <a:ext uri="{FF2B5EF4-FFF2-40B4-BE49-F238E27FC236}">
-                <a16:creationId xmlns:a16="http://schemas.microsoft.com/office/drawing/2014/main" id="{DB87F8D8-06EF-4D76-BC3D-CB6B00B6B72E}"/>
+                <a16:creationId xmlns:a16="http://schemas.microsoft.com/office/drawing/2014/main" xmlns="" id="{DB87F8D8-06EF-4D76-BC3D-CB6B00B6B72E}"/>
               </a:ext>
             </a:extLst>
           </p:cNvPr>
@@ -10910,7 +11001,7 @@
 </p:sld>
 </file>
 
-<file path=ppt/slides/slide22.xml><?xml version="1.0" encoding="utf-8"?>
+<file path=ppt/slides/slide23.xml><?xml version="1.0" encoding="utf-8"?>
 <p:sld xmlns:a="http://schemas.openxmlformats.org/drawingml/2006/main" xmlns:r="http://schemas.openxmlformats.org/officeDocument/2006/relationships" xmlns:p="http://schemas.openxmlformats.org/presentationml/2006/main">
   <p:cSld>
     <p:spTree>
@@ -10932,7 +11023,7 @@
           <p:cNvPr id="4" name="Title 1">
             <a:extLst>
               <a:ext uri="{FF2B5EF4-FFF2-40B4-BE49-F238E27FC236}">
-                <a16:creationId xmlns:a16="http://schemas.microsoft.com/office/drawing/2014/main" id="{02619F9C-EB8C-47C2-8D51-281BE6C9E803}"/>
+                <a16:creationId xmlns:a16="http://schemas.microsoft.com/office/drawing/2014/main" xmlns="" id="{02619F9C-EB8C-47C2-8D51-281BE6C9E803}"/>
               </a:ext>
             </a:extLst>
           </p:cNvPr>
@@ -11045,7 +11136,7 @@
           <p:cNvPr id="2" name="ZoneTexte 1">
             <a:extLst>
               <a:ext uri="{FF2B5EF4-FFF2-40B4-BE49-F238E27FC236}">
-                <a16:creationId xmlns:a16="http://schemas.microsoft.com/office/drawing/2014/main" id="{08E408DC-C551-47B5-8C33-FA0FF463FB0C}"/>
+                <a16:creationId xmlns:a16="http://schemas.microsoft.com/office/drawing/2014/main" xmlns="" id="{08E408DC-C551-47B5-8C33-FA0FF463FB0C}"/>
               </a:ext>
             </a:extLst>
           </p:cNvPr>
@@ -11085,7 +11176,7 @@
           <p:cNvPr id="6" name="Picture 16" descr="RÃ©sultat de recherche d'images pour &quot;paire torsadÃ©e F/UTP&quot;">
             <a:extLst>
               <a:ext uri="{FF2B5EF4-FFF2-40B4-BE49-F238E27FC236}">
-                <a16:creationId xmlns:a16="http://schemas.microsoft.com/office/drawing/2014/main" id="{2BCB4FA7-7321-47D4-A2CA-C79743355770}"/>
+                <a16:creationId xmlns:a16="http://schemas.microsoft.com/office/drawing/2014/main" xmlns="" id="{2BCB4FA7-7321-47D4-A2CA-C79743355770}"/>
               </a:ext>
             </a:extLst>
           </p:cNvPr>
@@ -11132,7 +11223,7 @@
 </p:sld>
 </file>
 
-<file path=ppt/slides/slide23.xml><?xml version="1.0" encoding="utf-8"?>
+<file path=ppt/slides/slide24.xml><?xml version="1.0" encoding="utf-8"?>
 <p:sld xmlns:a="http://schemas.openxmlformats.org/drawingml/2006/main" xmlns:r="http://schemas.openxmlformats.org/officeDocument/2006/relationships" xmlns:p="http://schemas.openxmlformats.org/presentationml/2006/main">
   <p:cSld>
     <p:spTree>
@@ -11154,7 +11245,7 @@
           <p:cNvPr id="4" name="Title 1">
             <a:extLst>
               <a:ext uri="{FF2B5EF4-FFF2-40B4-BE49-F238E27FC236}">
-                <a16:creationId xmlns:a16="http://schemas.microsoft.com/office/drawing/2014/main" id="{02619F9C-EB8C-47C2-8D51-281BE6C9E803}"/>
+                <a16:creationId xmlns:a16="http://schemas.microsoft.com/office/drawing/2014/main" xmlns="" id="{02619F9C-EB8C-47C2-8D51-281BE6C9E803}"/>
               </a:ext>
             </a:extLst>
           </p:cNvPr>
@@ -11267,7 +11358,7 @@
           <p:cNvPr id="2" name="ZoneTexte 1">
             <a:extLst>
               <a:ext uri="{FF2B5EF4-FFF2-40B4-BE49-F238E27FC236}">
-                <a16:creationId xmlns:a16="http://schemas.microsoft.com/office/drawing/2014/main" id="{08E408DC-C551-47B5-8C33-FA0FF463FB0C}"/>
+                <a16:creationId xmlns:a16="http://schemas.microsoft.com/office/drawing/2014/main" xmlns="" id="{08E408DC-C551-47B5-8C33-FA0FF463FB0C}"/>
               </a:ext>
             </a:extLst>
           </p:cNvPr>
@@ -11316,7 +11407,7 @@
           <p:cNvPr id="5" name="Picture 17" descr="RÃ©sultat de recherche d'images pour &quot;paire torsadÃ©e U/FTP&quot;">
             <a:extLst>
               <a:ext uri="{FF2B5EF4-FFF2-40B4-BE49-F238E27FC236}">
-                <a16:creationId xmlns:a16="http://schemas.microsoft.com/office/drawing/2014/main" id="{C285CD3B-FCE6-4B9F-ADED-4D7689EB7309}"/>
+                <a16:creationId xmlns:a16="http://schemas.microsoft.com/office/drawing/2014/main" xmlns="" id="{C285CD3B-FCE6-4B9F-ADED-4D7689EB7309}"/>
               </a:ext>
             </a:extLst>
           </p:cNvPr>
@@ -11363,7 +11454,7 @@
 </p:sld>
 </file>
 
-<file path=ppt/slides/slide24.xml><?xml version="1.0" encoding="utf-8"?>
+<file path=ppt/slides/slide25.xml><?xml version="1.0" encoding="utf-8"?>
 <p:sld xmlns:a="http://schemas.openxmlformats.org/drawingml/2006/main" xmlns:r="http://schemas.openxmlformats.org/officeDocument/2006/relationships" xmlns:p="http://schemas.openxmlformats.org/presentationml/2006/main">
   <p:cSld>
     <p:spTree>
@@ -11385,7 +11476,7 @@
           <p:cNvPr id="4" name="Title 1">
             <a:extLst>
               <a:ext uri="{FF2B5EF4-FFF2-40B4-BE49-F238E27FC236}">
-                <a16:creationId xmlns:a16="http://schemas.microsoft.com/office/drawing/2014/main" id="{02619F9C-EB8C-47C2-8D51-281BE6C9E803}"/>
+                <a16:creationId xmlns:a16="http://schemas.microsoft.com/office/drawing/2014/main" xmlns="" id="{02619F9C-EB8C-47C2-8D51-281BE6C9E803}"/>
               </a:ext>
             </a:extLst>
           </p:cNvPr>
@@ -11498,7 +11589,7 @@
           <p:cNvPr id="2" name="ZoneTexte 1">
             <a:extLst>
               <a:ext uri="{FF2B5EF4-FFF2-40B4-BE49-F238E27FC236}">
-                <a16:creationId xmlns:a16="http://schemas.microsoft.com/office/drawing/2014/main" id="{08E408DC-C551-47B5-8C33-FA0FF463FB0C}"/>
+                <a16:creationId xmlns:a16="http://schemas.microsoft.com/office/drawing/2014/main" xmlns="" id="{08E408DC-C551-47B5-8C33-FA0FF463FB0C}"/>
               </a:ext>
             </a:extLst>
           </p:cNvPr>
@@ -11547,7 +11638,7 @@
           <p:cNvPr id="6" name="Picture 18" descr="RÃ©sultat de recherche d'images pour &quot;paire torsadÃ©e U/FTP&quot;">
             <a:extLst>
               <a:ext uri="{FF2B5EF4-FFF2-40B4-BE49-F238E27FC236}">
-                <a16:creationId xmlns:a16="http://schemas.microsoft.com/office/drawing/2014/main" id="{9D8E18DB-E786-4429-9285-47D633DE094F}"/>
+                <a16:creationId xmlns:a16="http://schemas.microsoft.com/office/drawing/2014/main" xmlns="" id="{9D8E18DB-E786-4429-9285-47D633DE094F}"/>
               </a:ext>
             </a:extLst>
           </p:cNvPr>
@@ -11594,7 +11685,7 @@
 </p:sld>
 </file>
 
-<file path=ppt/slides/slide25.xml><?xml version="1.0" encoding="utf-8"?>
+<file path=ppt/slides/slide26.xml><?xml version="1.0" encoding="utf-8"?>
 <p:sld xmlns:a="http://schemas.openxmlformats.org/drawingml/2006/main" xmlns:r="http://schemas.openxmlformats.org/officeDocument/2006/relationships" xmlns:p="http://schemas.openxmlformats.org/presentationml/2006/main">
   <p:cSld>
     <p:spTree>
@@ -11616,7 +11707,7 @@
           <p:cNvPr id="4" name="Title 1">
             <a:extLst>
               <a:ext uri="{FF2B5EF4-FFF2-40B4-BE49-F238E27FC236}">
-                <a16:creationId xmlns:a16="http://schemas.microsoft.com/office/drawing/2014/main" id="{02619F9C-EB8C-47C2-8D51-281BE6C9E803}"/>
+                <a16:creationId xmlns:a16="http://schemas.microsoft.com/office/drawing/2014/main" xmlns="" id="{02619F9C-EB8C-47C2-8D51-281BE6C9E803}"/>
               </a:ext>
             </a:extLst>
           </p:cNvPr>
@@ -11729,7 +11820,7 @@
           <p:cNvPr id="2" name="ZoneTexte 1">
             <a:extLst>
               <a:ext uri="{FF2B5EF4-FFF2-40B4-BE49-F238E27FC236}">
-                <a16:creationId xmlns:a16="http://schemas.microsoft.com/office/drawing/2014/main" id="{08E408DC-C551-47B5-8C33-FA0FF463FB0C}"/>
+                <a16:creationId xmlns:a16="http://schemas.microsoft.com/office/drawing/2014/main" xmlns="" id="{08E408DC-C551-47B5-8C33-FA0FF463FB0C}"/>
               </a:ext>
             </a:extLst>
           </p:cNvPr>
@@ -11778,7 +11869,7 @@
           <p:cNvPr id="5" name="Picture 19">
             <a:extLst>
               <a:ext uri="{FF2B5EF4-FFF2-40B4-BE49-F238E27FC236}">
-                <a16:creationId xmlns:a16="http://schemas.microsoft.com/office/drawing/2014/main" id="{13636A98-632D-420B-8319-4B91165B5181}"/>
+                <a16:creationId xmlns:a16="http://schemas.microsoft.com/office/drawing/2014/main" xmlns="" id="{13636A98-632D-420B-8319-4B91165B5181}"/>
               </a:ext>
             </a:extLst>
           </p:cNvPr>
@@ -11827,7 +11918,7 @@
 </p:sld>
 </file>
 
-<file path=ppt/slides/slide26.xml><?xml version="1.0" encoding="utf-8"?>
+<file path=ppt/slides/slide27.xml><?xml version="1.0" encoding="utf-8"?>
 <p:sld xmlns:a="http://schemas.openxmlformats.org/drawingml/2006/main" xmlns:r="http://schemas.openxmlformats.org/officeDocument/2006/relationships" xmlns:p="http://schemas.openxmlformats.org/presentationml/2006/main">
   <p:cSld>
     <p:spTree>
@@ -11849,7 +11940,7 @@
           <p:cNvPr id="4" name="Title 1">
             <a:extLst>
               <a:ext uri="{FF2B5EF4-FFF2-40B4-BE49-F238E27FC236}">
-                <a16:creationId xmlns:a16="http://schemas.microsoft.com/office/drawing/2014/main" id="{02619F9C-EB8C-47C2-8D51-281BE6C9E803}"/>
+                <a16:creationId xmlns:a16="http://schemas.microsoft.com/office/drawing/2014/main" xmlns="" id="{02619F9C-EB8C-47C2-8D51-281BE6C9E803}"/>
               </a:ext>
             </a:extLst>
           </p:cNvPr>
@@ -11962,7 +12053,7 @@
           <p:cNvPr id="2" name="ZoneTexte 1">
             <a:extLst>
               <a:ext uri="{FF2B5EF4-FFF2-40B4-BE49-F238E27FC236}">
-                <a16:creationId xmlns:a16="http://schemas.microsoft.com/office/drawing/2014/main" id="{08E408DC-C551-47B5-8C33-FA0FF463FB0C}"/>
+                <a16:creationId xmlns:a16="http://schemas.microsoft.com/office/drawing/2014/main" xmlns="" id="{08E408DC-C551-47B5-8C33-FA0FF463FB0C}"/>
               </a:ext>
             </a:extLst>
           </p:cNvPr>
@@ -12011,7 +12102,7 @@
           <p:cNvPr id="6" name="Picture 20">
             <a:extLst>
               <a:ext uri="{FF2B5EF4-FFF2-40B4-BE49-F238E27FC236}">
-                <a16:creationId xmlns:a16="http://schemas.microsoft.com/office/drawing/2014/main" id="{C7598FC5-56B3-45F2-AD6E-4CFF22FFEDAE}"/>
+                <a16:creationId xmlns:a16="http://schemas.microsoft.com/office/drawing/2014/main" xmlns="" id="{C7598FC5-56B3-45F2-AD6E-4CFF22FFEDAE}"/>
               </a:ext>
             </a:extLst>
           </p:cNvPr>
@@ -12060,7 +12151,7 @@
 </p:sld>
 </file>
 
-<file path=ppt/slides/slide27.xml><?xml version="1.0" encoding="utf-8"?>
+<file path=ppt/slides/slide28.xml><?xml version="1.0" encoding="utf-8"?>
 <p:sld xmlns:a="http://schemas.openxmlformats.org/drawingml/2006/main" xmlns:r="http://schemas.openxmlformats.org/officeDocument/2006/relationships" xmlns:p="http://schemas.openxmlformats.org/presentationml/2006/main">
   <p:cSld>
     <p:spTree>
@@ -12338,7 +12429,7 @@
 </p:sld>
 </file>
 
-<file path=ppt/slides/slide28.xml><?xml version="1.0" encoding="utf-8"?>
+<file path=ppt/slides/slide29.xml><?xml version="1.0" encoding="utf-8"?>
 <p:sld xmlns:a="http://schemas.openxmlformats.org/drawingml/2006/main" xmlns:r="http://schemas.openxmlformats.org/officeDocument/2006/relationships" xmlns:p="http://schemas.openxmlformats.org/presentationml/2006/main">
   <p:cSld>
     <p:spTree>
@@ -12535,7 +12626,401 @@
 </p:sld>
 </file>
 
-<file path=ppt/slides/slide29.xml><?xml version="1.0" encoding="utf-8"?>
+<file path=ppt/slides/slide3.xml><?xml version="1.0" encoding="utf-8"?>
+<p:sld xmlns:a="http://schemas.openxmlformats.org/drawingml/2006/main" xmlns:r="http://schemas.openxmlformats.org/officeDocument/2006/relationships" xmlns:p="http://schemas.openxmlformats.org/presentationml/2006/main">
+  <p:cSld>
+    <p:spTree>
+      <p:nvGrpSpPr>
+        <p:cNvPr id="1" name=""/>
+        <p:cNvGrpSpPr/>
+        <p:nvPr/>
+      </p:nvGrpSpPr>
+      <p:grpSpPr>
+        <a:xfrm>
+          <a:off x="0" y="0"/>
+          <a:ext cx="0" cy="0"/>
+          <a:chOff x="0" y="0"/>
+          <a:chExt cx="0" cy="0"/>
+        </a:xfrm>
+      </p:grpSpPr>
+      <p:sp>
+        <p:nvSpPr>
+          <p:cNvPr id="4" name="Title 1"/>
+          <p:cNvSpPr>
+            <a:spLocks noGrp="1"/>
+          </p:cNvSpPr>
+          <p:nvPr>
+            <p:ph type="title"/>
+          </p:nvPr>
+        </p:nvSpPr>
+        <p:spPr>
+          <a:xfrm>
+            <a:off x="0" y="0"/>
+            <a:ext cx="2916820" cy="510199"/>
+          </a:xfrm>
+        </p:spPr>
+        <p:txBody>
+          <a:bodyPr numCol="1">
+            <a:noAutofit/>
+          </a:bodyPr>
+          <a:lstStyle/>
+          <a:p>
+            <a:pPr algn="ctr"/>
+            <a:r>
+              <a:rPr lang="fr-CH" sz="2800" dirty="0"/>
+              <a:t>Introduction</a:t>
+            </a:r>
+          </a:p>
+        </p:txBody>
+      </p:sp>
+      <p:sp>
+        <p:nvSpPr>
+          <p:cNvPr id="5" name="Content Placeholder 2"/>
+          <p:cNvSpPr txBox="1">
+            <a:spLocks/>
+          </p:cNvSpPr>
+          <p:nvPr/>
+        </p:nvSpPr>
+        <p:spPr>
+          <a:xfrm>
+            <a:off x="615821" y="1698172"/>
+            <a:ext cx="10216729" cy="3546074"/>
+          </a:xfrm>
+          <a:prstGeom prst="rect">
+            <a:avLst/>
+          </a:prstGeom>
+        </p:spPr>
+        <p:txBody>
+          <a:bodyPr vert="horz" lIns="91440" tIns="45720" rIns="91440" bIns="45720" rtlCol="0" anchor="ctr">
+            <a:normAutofit/>
+          </a:bodyPr>
+          <a:lstStyle>
+            <a:lvl1pPr marL="285750" indent="-285750" algn="l" defTabSz="457200" rtl="0" eaLnBrk="1" latinLnBrk="0" hangingPunct="1">
+              <a:spcBef>
+                <a:spcPct val="20000"/>
+              </a:spcBef>
+              <a:spcAft>
+                <a:spcPts val="600"/>
+              </a:spcAft>
+              <a:buClr>
+                <a:schemeClr val="tx1"/>
+              </a:buClr>
+              <a:buSzPct val="80000"/>
+              <a:buFont typeface="Wingdings 3" panose="05040102010807070707" pitchFamily="18" charset="2"/>
+              <a:buChar char=""/>
+              <a:defRPr sz="2000" kern="1200" cap="none">
+                <a:solidFill>
+                  <a:schemeClr val="bg2">
+                    <a:lumMod val="75000"/>
+                  </a:schemeClr>
+                </a:solidFill>
+                <a:effectLst/>
+                <a:latin typeface="+mn-lt"/>
+                <a:ea typeface="+mn-ea"/>
+                <a:cs typeface="+mn-cs"/>
+              </a:defRPr>
+            </a:lvl1pPr>
+            <a:lvl2pPr marL="742950" indent="-285750" algn="l" defTabSz="457200" rtl="0" eaLnBrk="1" latinLnBrk="0" hangingPunct="1">
+              <a:spcBef>
+                <a:spcPct val="20000"/>
+              </a:spcBef>
+              <a:spcAft>
+                <a:spcPts val="600"/>
+              </a:spcAft>
+              <a:buClr>
+                <a:schemeClr val="tx1"/>
+              </a:buClr>
+              <a:buSzPct val="80000"/>
+              <a:buFont typeface="Wingdings 3" panose="05040102010807070707" pitchFamily="18" charset="2"/>
+              <a:buChar char=""/>
+              <a:defRPr sz="1800" kern="1200" cap="none">
+                <a:solidFill>
+                  <a:schemeClr val="bg2">
+                    <a:lumMod val="75000"/>
+                  </a:schemeClr>
+                </a:solidFill>
+                <a:effectLst/>
+                <a:latin typeface="+mn-lt"/>
+                <a:ea typeface="+mn-ea"/>
+                <a:cs typeface="+mn-cs"/>
+              </a:defRPr>
+            </a:lvl2pPr>
+            <a:lvl3pPr marL="1200150" indent="-285750" algn="l" defTabSz="457200" rtl="0" eaLnBrk="1" latinLnBrk="0" hangingPunct="1">
+              <a:spcBef>
+                <a:spcPct val="20000"/>
+              </a:spcBef>
+              <a:spcAft>
+                <a:spcPts val="600"/>
+              </a:spcAft>
+              <a:buClr>
+                <a:schemeClr val="tx1"/>
+              </a:buClr>
+              <a:buSzPct val="80000"/>
+              <a:buFont typeface="Wingdings 3" panose="05040102010807070707" pitchFamily="18" charset="2"/>
+              <a:buChar char=""/>
+              <a:defRPr sz="1600" kern="1200" cap="none">
+                <a:solidFill>
+                  <a:schemeClr val="bg2">
+                    <a:lumMod val="75000"/>
+                  </a:schemeClr>
+                </a:solidFill>
+                <a:effectLst/>
+                <a:latin typeface="+mn-lt"/>
+                <a:ea typeface="+mn-ea"/>
+                <a:cs typeface="+mn-cs"/>
+              </a:defRPr>
+            </a:lvl3pPr>
+            <a:lvl4pPr marL="1543050" indent="-171450" algn="l" defTabSz="457200" rtl="0" eaLnBrk="1" latinLnBrk="0" hangingPunct="1">
+              <a:spcBef>
+                <a:spcPct val="20000"/>
+              </a:spcBef>
+              <a:spcAft>
+                <a:spcPts val="600"/>
+              </a:spcAft>
+              <a:buClr>
+                <a:schemeClr val="tx1"/>
+              </a:buClr>
+              <a:buSzPct val="80000"/>
+              <a:buFont typeface="Wingdings 3" panose="05040102010807070707" pitchFamily="18" charset="2"/>
+              <a:buChar char=""/>
+              <a:defRPr sz="1400" kern="1200" cap="none">
+                <a:solidFill>
+                  <a:schemeClr val="bg2">
+                    <a:lumMod val="75000"/>
+                  </a:schemeClr>
+                </a:solidFill>
+                <a:effectLst/>
+                <a:latin typeface="+mn-lt"/>
+                <a:ea typeface="+mn-ea"/>
+                <a:cs typeface="+mn-cs"/>
+              </a:defRPr>
+            </a:lvl4pPr>
+            <a:lvl5pPr marL="2000250" indent="-171450" algn="l" defTabSz="457200" rtl="0" eaLnBrk="1" latinLnBrk="0" hangingPunct="1">
+              <a:spcBef>
+                <a:spcPct val="20000"/>
+              </a:spcBef>
+              <a:spcAft>
+                <a:spcPts val="600"/>
+              </a:spcAft>
+              <a:buClr>
+                <a:schemeClr val="tx1"/>
+              </a:buClr>
+              <a:buSzPct val="80000"/>
+              <a:buFont typeface="Wingdings 3" panose="05040102010807070707" pitchFamily="18" charset="2"/>
+              <a:buChar char=""/>
+              <a:defRPr sz="1400" kern="1200" cap="none">
+                <a:solidFill>
+                  <a:schemeClr val="bg2">
+                    <a:lumMod val="75000"/>
+                  </a:schemeClr>
+                </a:solidFill>
+                <a:effectLst/>
+                <a:latin typeface="+mn-lt"/>
+                <a:ea typeface="+mn-ea"/>
+                <a:cs typeface="+mn-cs"/>
+              </a:defRPr>
+            </a:lvl5pPr>
+            <a:lvl6pPr marL="2514600" indent="-228600" algn="l" defTabSz="457200" rtl="0" eaLnBrk="1" latinLnBrk="0" hangingPunct="1">
+              <a:spcBef>
+                <a:spcPct val="20000"/>
+              </a:spcBef>
+              <a:spcAft>
+                <a:spcPts val="600"/>
+              </a:spcAft>
+              <a:buClr>
+                <a:schemeClr val="tx1"/>
+              </a:buClr>
+              <a:buSzPct val="80000"/>
+              <a:buFont typeface="Wingdings 3" panose="05040102010807070707" pitchFamily="18" charset="2"/>
+              <a:buChar char=""/>
+              <a:defRPr sz="1400" kern="1200" cap="none">
+                <a:solidFill>
+                  <a:schemeClr val="bg2">
+                    <a:lumMod val="75000"/>
+                  </a:schemeClr>
+                </a:solidFill>
+                <a:effectLst/>
+                <a:latin typeface="+mn-lt"/>
+                <a:ea typeface="+mn-ea"/>
+                <a:cs typeface="+mn-cs"/>
+              </a:defRPr>
+            </a:lvl6pPr>
+            <a:lvl7pPr marL="2971800" indent="-228600" algn="l" defTabSz="457200" rtl="0" eaLnBrk="1" latinLnBrk="0" hangingPunct="1">
+              <a:spcBef>
+                <a:spcPct val="20000"/>
+              </a:spcBef>
+              <a:spcAft>
+                <a:spcPts val="600"/>
+              </a:spcAft>
+              <a:buClr>
+                <a:schemeClr val="tx1"/>
+              </a:buClr>
+              <a:buSzPct val="80000"/>
+              <a:buFont typeface="Wingdings 3" panose="05040102010807070707" pitchFamily="18" charset="2"/>
+              <a:buChar char=""/>
+              <a:defRPr sz="1400" kern="1200" cap="none">
+                <a:solidFill>
+                  <a:schemeClr val="bg2">
+                    <a:lumMod val="75000"/>
+                  </a:schemeClr>
+                </a:solidFill>
+                <a:effectLst/>
+                <a:latin typeface="+mn-lt"/>
+                <a:ea typeface="+mn-ea"/>
+                <a:cs typeface="+mn-cs"/>
+              </a:defRPr>
+            </a:lvl7pPr>
+            <a:lvl8pPr marL="3429000" indent="-228600" algn="l" defTabSz="457200" rtl="0" eaLnBrk="1" latinLnBrk="0" hangingPunct="1">
+              <a:spcBef>
+                <a:spcPct val="20000"/>
+              </a:spcBef>
+              <a:spcAft>
+                <a:spcPts val="600"/>
+              </a:spcAft>
+              <a:buClr>
+                <a:schemeClr val="tx1"/>
+              </a:buClr>
+              <a:buSzPct val="80000"/>
+              <a:buFont typeface="Wingdings 3" panose="05040102010807070707" pitchFamily="18" charset="2"/>
+              <a:buChar char=""/>
+              <a:defRPr sz="1400" kern="1200" cap="none">
+                <a:solidFill>
+                  <a:schemeClr val="bg2">
+                    <a:lumMod val="75000"/>
+                  </a:schemeClr>
+                </a:solidFill>
+                <a:effectLst/>
+                <a:latin typeface="+mn-lt"/>
+                <a:ea typeface="+mn-ea"/>
+                <a:cs typeface="+mn-cs"/>
+              </a:defRPr>
+            </a:lvl8pPr>
+            <a:lvl9pPr marL="3886200" indent="-228600" algn="l" defTabSz="457200" rtl="0" eaLnBrk="1" latinLnBrk="0" hangingPunct="1">
+              <a:spcBef>
+                <a:spcPct val="20000"/>
+              </a:spcBef>
+              <a:spcAft>
+                <a:spcPts val="600"/>
+              </a:spcAft>
+              <a:buClr>
+                <a:schemeClr val="tx1"/>
+              </a:buClr>
+              <a:buSzPct val="80000"/>
+              <a:buFont typeface="Wingdings 3" panose="05040102010807070707" pitchFamily="18" charset="2"/>
+              <a:buChar char=""/>
+              <a:defRPr sz="1400" kern="1200" cap="none">
+                <a:solidFill>
+                  <a:schemeClr val="bg2">
+                    <a:lumMod val="75000"/>
+                  </a:schemeClr>
+                </a:solidFill>
+                <a:effectLst/>
+                <a:latin typeface="+mn-lt"/>
+                <a:ea typeface="+mn-ea"/>
+                <a:cs typeface="+mn-cs"/>
+              </a:defRPr>
+            </a:lvl9pPr>
+          </a:lstStyle>
+          <a:p>
+            <a:pPr lvl="1">
+              <a:lnSpc>
+                <a:spcPct val="150000"/>
+              </a:lnSpc>
+            </a:pPr>
+            <a:r>
+              <a:rPr lang="fr-CH" sz="2000" dirty="0">
+                <a:solidFill>
+                  <a:schemeClr val="tx1"/>
+                </a:solidFill>
+              </a:rPr>
+              <a:t>Sujet : La fabrication d’un câble Ethernet</a:t>
+            </a:r>
+          </a:p>
+          <a:p>
+            <a:pPr lvl="1">
+              <a:lnSpc>
+                <a:spcPct val="150000"/>
+              </a:lnSpc>
+            </a:pPr>
+            <a:r>
+              <a:rPr lang="fr-CH" sz="2000" dirty="0">
+                <a:solidFill>
+                  <a:schemeClr val="tx1"/>
+                </a:solidFill>
+              </a:rPr>
+              <a:t>Cette présentation à comme objectifs :</a:t>
+            </a:r>
+          </a:p>
+          <a:p>
+            <a:pPr lvl="2">
+              <a:lnSpc>
+                <a:spcPct val="150000"/>
+              </a:lnSpc>
+            </a:pPr>
+            <a:r>
+              <a:rPr lang="fr-CH" sz="1800" dirty="0">
+                <a:solidFill>
+                  <a:schemeClr val="tx1"/>
+                </a:solidFill>
+              </a:rPr>
+              <a:t>Décrire et présenter les différentes normes, catégories et technologies d’un câble Ethernet</a:t>
+            </a:r>
+          </a:p>
+          <a:p>
+            <a:pPr lvl="2">
+              <a:lnSpc>
+                <a:spcPct val="150000"/>
+              </a:lnSpc>
+            </a:pPr>
+            <a:r>
+              <a:rPr lang="fr-CH" sz="1800" dirty="0">
+                <a:solidFill>
+                  <a:schemeClr val="tx1"/>
+                </a:solidFill>
+              </a:rPr>
+              <a:t>Démontrer la fabrication d’un câble RJ-45</a:t>
+            </a:r>
+          </a:p>
+          <a:p>
+            <a:pPr lvl="2">
+              <a:lnSpc>
+                <a:spcPct val="150000"/>
+              </a:lnSpc>
+            </a:pPr>
+            <a:endParaRPr lang="fr-CH" sz="2200" dirty="0">
+              <a:solidFill>
+                <a:schemeClr val="tx1"/>
+              </a:solidFill>
+            </a:endParaRPr>
+          </a:p>
+          <a:p>
+            <a:pPr lvl="2">
+              <a:lnSpc>
+                <a:spcPct val="150000"/>
+              </a:lnSpc>
+            </a:pPr>
+            <a:endParaRPr lang="fr-CH" sz="2200" dirty="0">
+              <a:solidFill>
+                <a:schemeClr val="tx1"/>
+              </a:solidFill>
+            </a:endParaRPr>
+          </a:p>
+        </p:txBody>
+      </p:sp>
+    </p:spTree>
+    <p:extLst>
+      <p:ext uri="{BB962C8B-B14F-4D97-AF65-F5344CB8AC3E}">
+        <p14:creationId xmlns:p14="http://schemas.microsoft.com/office/powerpoint/2010/main" val="3456633582"/>
+      </p:ext>
+    </p:extLst>
+  </p:cSld>
+  <p:clrMapOvr>
+    <a:masterClrMapping/>
+  </p:clrMapOvr>
+</p:sld>
+</file>
+
+<file path=ppt/slides/slide30.xml><?xml version="1.0" encoding="utf-8"?>
 <p:sld xmlns:a="http://schemas.openxmlformats.org/drawingml/2006/main" xmlns:r="http://schemas.openxmlformats.org/officeDocument/2006/relationships" xmlns:p="http://schemas.openxmlformats.org/presentationml/2006/main">
   <p:cSld>
     <p:spTree>
@@ -12811,401 +13296,7 @@
 </p:sld>
 </file>
 
-<file path=ppt/slides/slide3.xml><?xml version="1.0" encoding="utf-8"?>
-<p:sld xmlns:a="http://schemas.openxmlformats.org/drawingml/2006/main" xmlns:r="http://schemas.openxmlformats.org/officeDocument/2006/relationships" xmlns:p="http://schemas.openxmlformats.org/presentationml/2006/main">
-  <p:cSld>
-    <p:spTree>
-      <p:nvGrpSpPr>
-        <p:cNvPr id="1" name=""/>
-        <p:cNvGrpSpPr/>
-        <p:nvPr/>
-      </p:nvGrpSpPr>
-      <p:grpSpPr>
-        <a:xfrm>
-          <a:off x="0" y="0"/>
-          <a:ext cx="0" cy="0"/>
-          <a:chOff x="0" y="0"/>
-          <a:chExt cx="0" cy="0"/>
-        </a:xfrm>
-      </p:grpSpPr>
-      <p:sp>
-        <p:nvSpPr>
-          <p:cNvPr id="4" name="Title 1"/>
-          <p:cNvSpPr>
-            <a:spLocks noGrp="1"/>
-          </p:cNvSpPr>
-          <p:nvPr>
-            <p:ph type="title"/>
-          </p:nvPr>
-        </p:nvSpPr>
-        <p:spPr>
-          <a:xfrm>
-            <a:off x="0" y="0"/>
-            <a:ext cx="2916820" cy="510199"/>
-          </a:xfrm>
-        </p:spPr>
-        <p:txBody>
-          <a:bodyPr numCol="1">
-            <a:noAutofit/>
-          </a:bodyPr>
-          <a:lstStyle/>
-          <a:p>
-            <a:pPr algn="ctr"/>
-            <a:r>
-              <a:rPr lang="fr-CH" sz="2800" dirty="0"/>
-              <a:t>Introduction</a:t>
-            </a:r>
-          </a:p>
-        </p:txBody>
-      </p:sp>
-      <p:sp>
-        <p:nvSpPr>
-          <p:cNvPr id="5" name="Content Placeholder 2"/>
-          <p:cNvSpPr txBox="1">
-            <a:spLocks/>
-          </p:cNvSpPr>
-          <p:nvPr/>
-        </p:nvSpPr>
-        <p:spPr>
-          <a:xfrm>
-            <a:off x="615821" y="1698172"/>
-            <a:ext cx="10216729" cy="3546074"/>
-          </a:xfrm>
-          <a:prstGeom prst="rect">
-            <a:avLst/>
-          </a:prstGeom>
-        </p:spPr>
-        <p:txBody>
-          <a:bodyPr vert="horz" lIns="91440" tIns="45720" rIns="91440" bIns="45720" rtlCol="0" anchor="ctr">
-            <a:normAutofit/>
-          </a:bodyPr>
-          <a:lstStyle>
-            <a:lvl1pPr marL="285750" indent="-285750" algn="l" defTabSz="457200" rtl="0" eaLnBrk="1" latinLnBrk="0" hangingPunct="1">
-              <a:spcBef>
-                <a:spcPct val="20000"/>
-              </a:spcBef>
-              <a:spcAft>
-                <a:spcPts val="600"/>
-              </a:spcAft>
-              <a:buClr>
-                <a:schemeClr val="tx1"/>
-              </a:buClr>
-              <a:buSzPct val="80000"/>
-              <a:buFont typeface="Wingdings 3" panose="05040102010807070707" pitchFamily="18" charset="2"/>
-              <a:buChar char=""/>
-              <a:defRPr sz="2000" kern="1200" cap="none">
-                <a:solidFill>
-                  <a:schemeClr val="bg2">
-                    <a:lumMod val="75000"/>
-                  </a:schemeClr>
-                </a:solidFill>
-                <a:effectLst/>
-                <a:latin typeface="+mn-lt"/>
-                <a:ea typeface="+mn-ea"/>
-                <a:cs typeface="+mn-cs"/>
-              </a:defRPr>
-            </a:lvl1pPr>
-            <a:lvl2pPr marL="742950" indent="-285750" algn="l" defTabSz="457200" rtl="0" eaLnBrk="1" latinLnBrk="0" hangingPunct="1">
-              <a:spcBef>
-                <a:spcPct val="20000"/>
-              </a:spcBef>
-              <a:spcAft>
-                <a:spcPts val="600"/>
-              </a:spcAft>
-              <a:buClr>
-                <a:schemeClr val="tx1"/>
-              </a:buClr>
-              <a:buSzPct val="80000"/>
-              <a:buFont typeface="Wingdings 3" panose="05040102010807070707" pitchFamily="18" charset="2"/>
-              <a:buChar char=""/>
-              <a:defRPr sz="1800" kern="1200" cap="none">
-                <a:solidFill>
-                  <a:schemeClr val="bg2">
-                    <a:lumMod val="75000"/>
-                  </a:schemeClr>
-                </a:solidFill>
-                <a:effectLst/>
-                <a:latin typeface="+mn-lt"/>
-                <a:ea typeface="+mn-ea"/>
-                <a:cs typeface="+mn-cs"/>
-              </a:defRPr>
-            </a:lvl2pPr>
-            <a:lvl3pPr marL="1200150" indent="-285750" algn="l" defTabSz="457200" rtl="0" eaLnBrk="1" latinLnBrk="0" hangingPunct="1">
-              <a:spcBef>
-                <a:spcPct val="20000"/>
-              </a:spcBef>
-              <a:spcAft>
-                <a:spcPts val="600"/>
-              </a:spcAft>
-              <a:buClr>
-                <a:schemeClr val="tx1"/>
-              </a:buClr>
-              <a:buSzPct val="80000"/>
-              <a:buFont typeface="Wingdings 3" panose="05040102010807070707" pitchFamily="18" charset="2"/>
-              <a:buChar char=""/>
-              <a:defRPr sz="1600" kern="1200" cap="none">
-                <a:solidFill>
-                  <a:schemeClr val="bg2">
-                    <a:lumMod val="75000"/>
-                  </a:schemeClr>
-                </a:solidFill>
-                <a:effectLst/>
-                <a:latin typeface="+mn-lt"/>
-                <a:ea typeface="+mn-ea"/>
-                <a:cs typeface="+mn-cs"/>
-              </a:defRPr>
-            </a:lvl3pPr>
-            <a:lvl4pPr marL="1543050" indent="-171450" algn="l" defTabSz="457200" rtl="0" eaLnBrk="1" latinLnBrk="0" hangingPunct="1">
-              <a:spcBef>
-                <a:spcPct val="20000"/>
-              </a:spcBef>
-              <a:spcAft>
-                <a:spcPts val="600"/>
-              </a:spcAft>
-              <a:buClr>
-                <a:schemeClr val="tx1"/>
-              </a:buClr>
-              <a:buSzPct val="80000"/>
-              <a:buFont typeface="Wingdings 3" panose="05040102010807070707" pitchFamily="18" charset="2"/>
-              <a:buChar char=""/>
-              <a:defRPr sz="1400" kern="1200" cap="none">
-                <a:solidFill>
-                  <a:schemeClr val="bg2">
-                    <a:lumMod val="75000"/>
-                  </a:schemeClr>
-                </a:solidFill>
-                <a:effectLst/>
-                <a:latin typeface="+mn-lt"/>
-                <a:ea typeface="+mn-ea"/>
-                <a:cs typeface="+mn-cs"/>
-              </a:defRPr>
-            </a:lvl4pPr>
-            <a:lvl5pPr marL="2000250" indent="-171450" algn="l" defTabSz="457200" rtl="0" eaLnBrk="1" latinLnBrk="0" hangingPunct="1">
-              <a:spcBef>
-                <a:spcPct val="20000"/>
-              </a:spcBef>
-              <a:spcAft>
-                <a:spcPts val="600"/>
-              </a:spcAft>
-              <a:buClr>
-                <a:schemeClr val="tx1"/>
-              </a:buClr>
-              <a:buSzPct val="80000"/>
-              <a:buFont typeface="Wingdings 3" panose="05040102010807070707" pitchFamily="18" charset="2"/>
-              <a:buChar char=""/>
-              <a:defRPr sz="1400" kern="1200" cap="none">
-                <a:solidFill>
-                  <a:schemeClr val="bg2">
-                    <a:lumMod val="75000"/>
-                  </a:schemeClr>
-                </a:solidFill>
-                <a:effectLst/>
-                <a:latin typeface="+mn-lt"/>
-                <a:ea typeface="+mn-ea"/>
-                <a:cs typeface="+mn-cs"/>
-              </a:defRPr>
-            </a:lvl5pPr>
-            <a:lvl6pPr marL="2514600" indent="-228600" algn="l" defTabSz="457200" rtl="0" eaLnBrk="1" latinLnBrk="0" hangingPunct="1">
-              <a:spcBef>
-                <a:spcPct val="20000"/>
-              </a:spcBef>
-              <a:spcAft>
-                <a:spcPts val="600"/>
-              </a:spcAft>
-              <a:buClr>
-                <a:schemeClr val="tx1"/>
-              </a:buClr>
-              <a:buSzPct val="80000"/>
-              <a:buFont typeface="Wingdings 3" panose="05040102010807070707" pitchFamily="18" charset="2"/>
-              <a:buChar char=""/>
-              <a:defRPr sz="1400" kern="1200" cap="none">
-                <a:solidFill>
-                  <a:schemeClr val="bg2">
-                    <a:lumMod val="75000"/>
-                  </a:schemeClr>
-                </a:solidFill>
-                <a:effectLst/>
-                <a:latin typeface="+mn-lt"/>
-                <a:ea typeface="+mn-ea"/>
-                <a:cs typeface="+mn-cs"/>
-              </a:defRPr>
-            </a:lvl6pPr>
-            <a:lvl7pPr marL="2971800" indent="-228600" algn="l" defTabSz="457200" rtl="0" eaLnBrk="1" latinLnBrk="0" hangingPunct="1">
-              <a:spcBef>
-                <a:spcPct val="20000"/>
-              </a:spcBef>
-              <a:spcAft>
-                <a:spcPts val="600"/>
-              </a:spcAft>
-              <a:buClr>
-                <a:schemeClr val="tx1"/>
-              </a:buClr>
-              <a:buSzPct val="80000"/>
-              <a:buFont typeface="Wingdings 3" panose="05040102010807070707" pitchFamily="18" charset="2"/>
-              <a:buChar char=""/>
-              <a:defRPr sz="1400" kern="1200" cap="none">
-                <a:solidFill>
-                  <a:schemeClr val="bg2">
-                    <a:lumMod val="75000"/>
-                  </a:schemeClr>
-                </a:solidFill>
-                <a:effectLst/>
-                <a:latin typeface="+mn-lt"/>
-                <a:ea typeface="+mn-ea"/>
-                <a:cs typeface="+mn-cs"/>
-              </a:defRPr>
-            </a:lvl7pPr>
-            <a:lvl8pPr marL="3429000" indent="-228600" algn="l" defTabSz="457200" rtl="0" eaLnBrk="1" latinLnBrk="0" hangingPunct="1">
-              <a:spcBef>
-                <a:spcPct val="20000"/>
-              </a:spcBef>
-              <a:spcAft>
-                <a:spcPts val="600"/>
-              </a:spcAft>
-              <a:buClr>
-                <a:schemeClr val="tx1"/>
-              </a:buClr>
-              <a:buSzPct val="80000"/>
-              <a:buFont typeface="Wingdings 3" panose="05040102010807070707" pitchFamily="18" charset="2"/>
-              <a:buChar char=""/>
-              <a:defRPr sz="1400" kern="1200" cap="none">
-                <a:solidFill>
-                  <a:schemeClr val="bg2">
-                    <a:lumMod val="75000"/>
-                  </a:schemeClr>
-                </a:solidFill>
-                <a:effectLst/>
-                <a:latin typeface="+mn-lt"/>
-                <a:ea typeface="+mn-ea"/>
-                <a:cs typeface="+mn-cs"/>
-              </a:defRPr>
-            </a:lvl8pPr>
-            <a:lvl9pPr marL="3886200" indent="-228600" algn="l" defTabSz="457200" rtl="0" eaLnBrk="1" latinLnBrk="0" hangingPunct="1">
-              <a:spcBef>
-                <a:spcPct val="20000"/>
-              </a:spcBef>
-              <a:spcAft>
-                <a:spcPts val="600"/>
-              </a:spcAft>
-              <a:buClr>
-                <a:schemeClr val="tx1"/>
-              </a:buClr>
-              <a:buSzPct val="80000"/>
-              <a:buFont typeface="Wingdings 3" panose="05040102010807070707" pitchFamily="18" charset="2"/>
-              <a:buChar char=""/>
-              <a:defRPr sz="1400" kern="1200" cap="none">
-                <a:solidFill>
-                  <a:schemeClr val="bg2">
-                    <a:lumMod val="75000"/>
-                  </a:schemeClr>
-                </a:solidFill>
-                <a:effectLst/>
-                <a:latin typeface="+mn-lt"/>
-                <a:ea typeface="+mn-ea"/>
-                <a:cs typeface="+mn-cs"/>
-              </a:defRPr>
-            </a:lvl9pPr>
-          </a:lstStyle>
-          <a:p>
-            <a:pPr lvl="1">
-              <a:lnSpc>
-                <a:spcPct val="150000"/>
-              </a:lnSpc>
-            </a:pPr>
-            <a:r>
-              <a:rPr lang="fr-CH" sz="2000" dirty="0">
-                <a:solidFill>
-                  <a:schemeClr val="tx1"/>
-                </a:solidFill>
-              </a:rPr>
-              <a:t>Sujet : La fabrication d’un câble Ethernet</a:t>
-            </a:r>
-          </a:p>
-          <a:p>
-            <a:pPr lvl="1">
-              <a:lnSpc>
-                <a:spcPct val="150000"/>
-              </a:lnSpc>
-            </a:pPr>
-            <a:r>
-              <a:rPr lang="fr-CH" sz="2000" dirty="0">
-                <a:solidFill>
-                  <a:schemeClr val="tx1"/>
-                </a:solidFill>
-              </a:rPr>
-              <a:t>Cette présentation à comme objectifs :</a:t>
-            </a:r>
-          </a:p>
-          <a:p>
-            <a:pPr lvl="2">
-              <a:lnSpc>
-                <a:spcPct val="150000"/>
-              </a:lnSpc>
-            </a:pPr>
-            <a:r>
-              <a:rPr lang="fr-CH" sz="1800" dirty="0">
-                <a:solidFill>
-                  <a:schemeClr val="tx1"/>
-                </a:solidFill>
-              </a:rPr>
-              <a:t>Décrire et présenter les différentes normes, catégories et technologies d’un câble Ethernet</a:t>
-            </a:r>
-          </a:p>
-          <a:p>
-            <a:pPr lvl="2">
-              <a:lnSpc>
-                <a:spcPct val="150000"/>
-              </a:lnSpc>
-            </a:pPr>
-            <a:r>
-              <a:rPr lang="fr-CH" sz="1800" dirty="0">
-                <a:solidFill>
-                  <a:schemeClr val="tx1"/>
-                </a:solidFill>
-              </a:rPr>
-              <a:t>Démontrer la fabrication d’un câble RJ-45</a:t>
-            </a:r>
-          </a:p>
-          <a:p>
-            <a:pPr lvl="2">
-              <a:lnSpc>
-                <a:spcPct val="150000"/>
-              </a:lnSpc>
-            </a:pPr>
-            <a:endParaRPr lang="fr-CH" sz="2200" dirty="0">
-              <a:solidFill>
-                <a:schemeClr val="tx1"/>
-              </a:solidFill>
-            </a:endParaRPr>
-          </a:p>
-          <a:p>
-            <a:pPr lvl="2">
-              <a:lnSpc>
-                <a:spcPct val="150000"/>
-              </a:lnSpc>
-            </a:pPr>
-            <a:endParaRPr lang="fr-CH" sz="2200" dirty="0">
-              <a:solidFill>
-                <a:schemeClr val="tx1"/>
-              </a:solidFill>
-            </a:endParaRPr>
-          </a:p>
-        </p:txBody>
-      </p:sp>
-    </p:spTree>
-    <p:extLst>
-      <p:ext uri="{BB962C8B-B14F-4D97-AF65-F5344CB8AC3E}">
-        <p14:creationId xmlns:p14="http://schemas.microsoft.com/office/powerpoint/2010/main" val="3456633582"/>
-      </p:ext>
-    </p:extLst>
-  </p:cSld>
-  <p:clrMapOvr>
-    <a:masterClrMapping/>
-  </p:clrMapOvr>
-</p:sld>
-</file>
-
-<file path=ppt/slides/slide30.xml><?xml version="1.0" encoding="utf-8"?>
+<file path=ppt/slides/slide31.xml><?xml version="1.0" encoding="utf-8"?>
 <p:sld xmlns:a="http://schemas.openxmlformats.org/drawingml/2006/main" xmlns:r="http://schemas.openxmlformats.org/officeDocument/2006/relationships" xmlns:p="http://schemas.openxmlformats.org/presentationml/2006/main">
   <p:cSld>
     <p:spTree>
@@ -13480,216 +13571,6 @@
 </p:sld>
 </file>
 
-<file path=ppt/slides/slide31.xml><?xml version="1.0" encoding="utf-8"?>
-<p:sld xmlns:a="http://schemas.openxmlformats.org/drawingml/2006/main" xmlns:r="http://schemas.openxmlformats.org/officeDocument/2006/relationships" xmlns:p="http://schemas.openxmlformats.org/presentationml/2006/main">
-  <p:cSld>
-    <p:spTree>
-      <p:nvGrpSpPr>
-        <p:cNvPr id="1" name=""/>
-        <p:cNvGrpSpPr/>
-        <p:nvPr/>
-      </p:nvGrpSpPr>
-      <p:grpSpPr>
-        <a:xfrm>
-          <a:off x="0" y="0"/>
-          <a:ext cx="0" cy="0"/>
-          <a:chOff x="0" y="0"/>
-          <a:chExt cx="0" cy="0"/>
-        </a:xfrm>
-      </p:grpSpPr>
-      <p:sp>
-        <p:nvSpPr>
-          <p:cNvPr id="6" name="Title 1"/>
-          <p:cNvSpPr>
-            <a:spLocks noGrp="1"/>
-          </p:cNvSpPr>
-          <p:nvPr>
-            <p:ph type="title"/>
-          </p:nvPr>
-        </p:nvSpPr>
-        <p:spPr>
-          <a:xfrm>
-            <a:off x="0" y="0"/>
-            <a:ext cx="3032567" cy="510199"/>
-          </a:xfrm>
-        </p:spPr>
-        <p:txBody>
-          <a:bodyPr numCol="1">
-            <a:noAutofit/>
-          </a:bodyPr>
-          <a:lstStyle/>
-          <a:p>
-            <a:pPr algn="ctr"/>
-            <a:r>
-              <a:rPr lang="fr-CH" sz="2800" dirty="0"/>
-              <a:t>CONNECTIQUES</a:t>
-            </a:r>
-          </a:p>
-        </p:txBody>
-      </p:sp>
-      <p:sp>
-        <p:nvSpPr>
-          <p:cNvPr id="2" name="ZoneTexte 1"/>
-          <p:cNvSpPr txBox="1"/>
-          <p:nvPr/>
-        </p:nvSpPr>
-        <p:spPr>
-          <a:xfrm>
-            <a:off x="951721" y="802434"/>
-            <a:ext cx="5747657" cy="1077218"/>
-          </a:xfrm>
-          <a:prstGeom prst="rect">
-            <a:avLst/>
-          </a:prstGeom>
-          <a:noFill/>
-        </p:spPr>
-        <p:txBody>
-          <a:bodyPr wrap="square" rtlCol="0">
-            <a:spAutoFit/>
-          </a:bodyPr>
-          <a:lstStyle/>
-          <a:p>
-            <a:r>
-              <a:rPr lang="fr-CH" sz="3200" b="1" dirty="0"/>
-              <a:t>RJ-11 Femelle - </a:t>
-            </a:r>
-            <a:r>
-              <a:rPr lang="fr-CH" sz="3200" i="1" dirty="0"/>
-              <a:t>Registered Jack 11</a:t>
-            </a:r>
-          </a:p>
-        </p:txBody>
-      </p:sp>
-      <p:sp>
-        <p:nvSpPr>
-          <p:cNvPr id="4" name="ZoneTexte 3"/>
-          <p:cNvSpPr txBox="1"/>
-          <p:nvPr/>
-        </p:nvSpPr>
-        <p:spPr>
-          <a:xfrm>
-            <a:off x="1240971" y="1754155"/>
-            <a:ext cx="7940351" cy="5078313"/>
-          </a:xfrm>
-          <a:prstGeom prst="rect">
-            <a:avLst/>
-          </a:prstGeom>
-          <a:noFill/>
-        </p:spPr>
-        <p:txBody>
-          <a:bodyPr wrap="square" rtlCol="0">
-            <a:spAutoFit/>
-          </a:bodyPr>
-          <a:lstStyle/>
-          <a:p>
-            <a:pPr>
-              <a:lnSpc>
-                <a:spcPct val="150000"/>
-              </a:lnSpc>
-            </a:pPr>
-            <a:r>
-              <a:rPr lang="fr-CH" b="1" u="sng" dirty="0"/>
-              <a:t>Usage du RJ-11 femelle</a:t>
-            </a:r>
-          </a:p>
-          <a:p>
-            <a:pPr>
-              <a:lnSpc>
-                <a:spcPct val="150000"/>
-              </a:lnSpc>
-            </a:pPr>
-            <a:r>
-              <a:rPr lang="fr-CH" dirty="0"/>
-              <a:t>Téléphonie</a:t>
-            </a:r>
-          </a:p>
-          <a:p>
-            <a:pPr>
-              <a:lnSpc>
-                <a:spcPct val="150000"/>
-              </a:lnSpc>
-            </a:pPr>
-            <a:r>
-              <a:rPr lang="fr-CH" dirty="0"/>
-              <a:t>Réseau local</a:t>
-            </a:r>
-          </a:p>
-          <a:p>
-            <a:pPr>
-              <a:lnSpc>
-                <a:spcPct val="150000"/>
-              </a:lnSpc>
-            </a:pPr>
-            <a:r>
-              <a:rPr lang="fr-CH" dirty="0" err="1"/>
-              <a:t>PoE</a:t>
-            </a:r>
-            <a:endParaRPr lang="fr-CH" dirty="0"/>
-          </a:p>
-          <a:p>
-            <a:pPr>
-              <a:lnSpc>
-                <a:spcPct val="150000"/>
-              </a:lnSpc>
-            </a:pPr>
-            <a:r>
-              <a:rPr lang="fr-CH" b="1" u="sng" dirty="0"/>
-              <a:t>Fonctionnement</a:t>
-            </a:r>
-          </a:p>
-          <a:p>
-            <a:pPr>
-              <a:lnSpc>
-                <a:spcPct val="150000"/>
-              </a:lnSpc>
-            </a:pPr>
-            <a:r>
-              <a:rPr lang="fr-CH" dirty="0"/>
-              <a:t>Un RJ-11 possède 4 broches où les paires torsadées passent.</a:t>
-            </a:r>
-          </a:p>
-          <a:p>
-            <a:endParaRPr lang="fr-CH" dirty="0"/>
-          </a:p>
-          <a:p>
-            <a:endParaRPr lang="fr-CH" dirty="0"/>
-          </a:p>
-          <a:p>
-            <a:endParaRPr lang="fr-CH" dirty="0"/>
-          </a:p>
-          <a:p>
-            <a:endParaRPr lang="fr-CH" dirty="0"/>
-          </a:p>
-          <a:p>
-            <a:endParaRPr lang="fr-CH" dirty="0"/>
-          </a:p>
-          <a:p>
-            <a:endParaRPr lang="fr-CH" dirty="0"/>
-          </a:p>
-          <a:p>
-            <a:endParaRPr lang="fr-CH" dirty="0"/>
-          </a:p>
-          <a:p>
-            <a:endParaRPr lang="fr-CH" dirty="0"/>
-          </a:p>
-          <a:p>
-            <a:endParaRPr lang="fr-CH" dirty="0"/>
-          </a:p>
-        </p:txBody>
-      </p:sp>
-    </p:spTree>
-    <p:extLst>
-      <p:ext uri="{BB962C8B-B14F-4D97-AF65-F5344CB8AC3E}">
-        <p14:creationId xmlns:p14="http://schemas.microsoft.com/office/powerpoint/2010/main" val="3659849013"/>
-      </p:ext>
-    </p:extLst>
-  </p:cSld>
-  <p:clrMapOvr>
-    <a:masterClrMapping/>
-  </p:clrMapOvr>
-</p:sld>
-</file>
-
 <file path=ppt/slides/slide32.xml><?xml version="1.0" encoding="utf-8"?>
 <p:sld xmlns:a="http://schemas.openxmlformats.org/drawingml/2006/main" xmlns:r="http://schemas.openxmlformats.org/officeDocument/2006/relationships" xmlns:p="http://schemas.openxmlformats.org/presentationml/2006/main">
   <p:cSld>
@@ -13709,6 +13590,216 @@
       </p:grpSpPr>
       <p:sp>
         <p:nvSpPr>
+          <p:cNvPr id="6" name="Title 1"/>
+          <p:cNvSpPr>
+            <a:spLocks noGrp="1"/>
+          </p:cNvSpPr>
+          <p:nvPr>
+            <p:ph type="title"/>
+          </p:nvPr>
+        </p:nvSpPr>
+        <p:spPr>
+          <a:xfrm>
+            <a:off x="0" y="0"/>
+            <a:ext cx="3032567" cy="510199"/>
+          </a:xfrm>
+        </p:spPr>
+        <p:txBody>
+          <a:bodyPr numCol="1">
+            <a:noAutofit/>
+          </a:bodyPr>
+          <a:lstStyle/>
+          <a:p>
+            <a:pPr algn="ctr"/>
+            <a:r>
+              <a:rPr lang="fr-CH" sz="2800" dirty="0"/>
+              <a:t>CONNECTIQUES</a:t>
+            </a:r>
+          </a:p>
+        </p:txBody>
+      </p:sp>
+      <p:sp>
+        <p:nvSpPr>
+          <p:cNvPr id="2" name="ZoneTexte 1"/>
+          <p:cNvSpPr txBox="1"/>
+          <p:nvPr/>
+        </p:nvSpPr>
+        <p:spPr>
+          <a:xfrm>
+            <a:off x="951721" y="802434"/>
+            <a:ext cx="5747657" cy="1077218"/>
+          </a:xfrm>
+          <a:prstGeom prst="rect">
+            <a:avLst/>
+          </a:prstGeom>
+          <a:noFill/>
+        </p:spPr>
+        <p:txBody>
+          <a:bodyPr wrap="square" rtlCol="0">
+            <a:spAutoFit/>
+          </a:bodyPr>
+          <a:lstStyle/>
+          <a:p>
+            <a:r>
+              <a:rPr lang="fr-CH" sz="3200" b="1" dirty="0"/>
+              <a:t>RJ-11 Femelle - </a:t>
+            </a:r>
+            <a:r>
+              <a:rPr lang="fr-CH" sz="3200" i="1" dirty="0"/>
+              <a:t>Registered Jack 11</a:t>
+            </a:r>
+          </a:p>
+        </p:txBody>
+      </p:sp>
+      <p:sp>
+        <p:nvSpPr>
+          <p:cNvPr id="4" name="ZoneTexte 3"/>
+          <p:cNvSpPr txBox="1"/>
+          <p:nvPr/>
+        </p:nvSpPr>
+        <p:spPr>
+          <a:xfrm>
+            <a:off x="1240971" y="1754155"/>
+            <a:ext cx="7940351" cy="5078313"/>
+          </a:xfrm>
+          <a:prstGeom prst="rect">
+            <a:avLst/>
+          </a:prstGeom>
+          <a:noFill/>
+        </p:spPr>
+        <p:txBody>
+          <a:bodyPr wrap="square" rtlCol="0">
+            <a:spAutoFit/>
+          </a:bodyPr>
+          <a:lstStyle/>
+          <a:p>
+            <a:pPr>
+              <a:lnSpc>
+                <a:spcPct val="150000"/>
+              </a:lnSpc>
+            </a:pPr>
+            <a:r>
+              <a:rPr lang="fr-CH" b="1" u="sng" dirty="0"/>
+              <a:t>Usage du RJ-11 femelle</a:t>
+            </a:r>
+          </a:p>
+          <a:p>
+            <a:pPr>
+              <a:lnSpc>
+                <a:spcPct val="150000"/>
+              </a:lnSpc>
+            </a:pPr>
+            <a:r>
+              <a:rPr lang="fr-CH" dirty="0"/>
+              <a:t>Téléphonie</a:t>
+            </a:r>
+          </a:p>
+          <a:p>
+            <a:pPr>
+              <a:lnSpc>
+                <a:spcPct val="150000"/>
+              </a:lnSpc>
+            </a:pPr>
+            <a:r>
+              <a:rPr lang="fr-CH" dirty="0"/>
+              <a:t>Réseau local</a:t>
+            </a:r>
+          </a:p>
+          <a:p>
+            <a:pPr>
+              <a:lnSpc>
+                <a:spcPct val="150000"/>
+              </a:lnSpc>
+            </a:pPr>
+            <a:r>
+              <a:rPr lang="fr-CH" dirty="0" err="1"/>
+              <a:t>PoE</a:t>
+            </a:r>
+            <a:endParaRPr lang="fr-CH" dirty="0"/>
+          </a:p>
+          <a:p>
+            <a:pPr>
+              <a:lnSpc>
+                <a:spcPct val="150000"/>
+              </a:lnSpc>
+            </a:pPr>
+            <a:r>
+              <a:rPr lang="fr-CH" b="1" u="sng" dirty="0"/>
+              <a:t>Fonctionnement</a:t>
+            </a:r>
+          </a:p>
+          <a:p>
+            <a:pPr>
+              <a:lnSpc>
+                <a:spcPct val="150000"/>
+              </a:lnSpc>
+            </a:pPr>
+            <a:r>
+              <a:rPr lang="fr-CH" dirty="0"/>
+              <a:t>Un RJ-11 possède 4 broches où les paires torsadées passent.</a:t>
+            </a:r>
+          </a:p>
+          <a:p>
+            <a:endParaRPr lang="fr-CH" dirty="0"/>
+          </a:p>
+          <a:p>
+            <a:endParaRPr lang="fr-CH" dirty="0"/>
+          </a:p>
+          <a:p>
+            <a:endParaRPr lang="fr-CH" dirty="0"/>
+          </a:p>
+          <a:p>
+            <a:endParaRPr lang="fr-CH" dirty="0"/>
+          </a:p>
+          <a:p>
+            <a:endParaRPr lang="fr-CH" dirty="0"/>
+          </a:p>
+          <a:p>
+            <a:endParaRPr lang="fr-CH" dirty="0"/>
+          </a:p>
+          <a:p>
+            <a:endParaRPr lang="fr-CH" dirty="0"/>
+          </a:p>
+          <a:p>
+            <a:endParaRPr lang="fr-CH" dirty="0"/>
+          </a:p>
+          <a:p>
+            <a:endParaRPr lang="fr-CH" dirty="0"/>
+          </a:p>
+        </p:txBody>
+      </p:sp>
+    </p:spTree>
+    <p:extLst>
+      <p:ext uri="{BB962C8B-B14F-4D97-AF65-F5344CB8AC3E}">
+        <p14:creationId xmlns:p14="http://schemas.microsoft.com/office/powerpoint/2010/main" val="3659849013"/>
+      </p:ext>
+    </p:extLst>
+  </p:cSld>
+  <p:clrMapOvr>
+    <a:masterClrMapping/>
+  </p:clrMapOvr>
+</p:sld>
+</file>
+
+<file path=ppt/slides/slide33.xml><?xml version="1.0" encoding="utf-8"?>
+<p:sld xmlns:a="http://schemas.openxmlformats.org/drawingml/2006/main" xmlns:r="http://schemas.openxmlformats.org/officeDocument/2006/relationships" xmlns:p="http://schemas.openxmlformats.org/presentationml/2006/main">
+  <p:cSld>
+    <p:spTree>
+      <p:nvGrpSpPr>
+        <p:cNvPr id="1" name=""/>
+        <p:cNvGrpSpPr/>
+        <p:nvPr/>
+      </p:nvGrpSpPr>
+      <p:grpSpPr>
+        <a:xfrm>
+          <a:off x="0" y="0"/>
+          <a:ext cx="0" cy="0"/>
+          <a:chOff x="0" y="0"/>
+          <a:chExt cx="0" cy="0"/>
+        </a:xfrm>
+      </p:grpSpPr>
+      <p:sp>
+        <p:nvSpPr>
           <p:cNvPr id="5" name="Content Placeholder 2"/>
           <p:cNvSpPr>
             <a:spLocks noGrp="1"/>
@@ -13793,7 +13884,7 @@
           <p:cNvPr id="2" name="ZoneTexte 1">
             <a:extLst>
               <a:ext uri="{FF2B5EF4-FFF2-40B4-BE49-F238E27FC236}">
-                <a16:creationId xmlns:a16="http://schemas.microsoft.com/office/drawing/2014/main" id="{A35CA12C-1266-4CF7-B4FA-9BCC04FF0A7A}"/>
+                <a16:creationId xmlns:a16="http://schemas.microsoft.com/office/drawing/2014/main" xmlns="" id="{A35CA12C-1266-4CF7-B4FA-9BCC04FF0A7A}"/>
               </a:ext>
             </a:extLst>
           </p:cNvPr>
@@ -13844,7 +13935,7 @@
           <p:cNvPr id="3" name="ZoneTexte 2">
             <a:extLst>
               <a:ext uri="{FF2B5EF4-FFF2-40B4-BE49-F238E27FC236}">
-                <a16:creationId xmlns:a16="http://schemas.microsoft.com/office/drawing/2014/main" id="{A87DECA1-1134-4B40-9A37-999B0F16999A}"/>
+                <a16:creationId xmlns:a16="http://schemas.microsoft.com/office/drawing/2014/main" xmlns="" id="{A87DECA1-1134-4B40-9A37-999B0F16999A}"/>
               </a:ext>
             </a:extLst>
           </p:cNvPr>
@@ -13879,7 +13970,7 @@
           <p:cNvPr id="4" name="ZoneTexte 3">
             <a:extLst>
               <a:ext uri="{FF2B5EF4-FFF2-40B4-BE49-F238E27FC236}">
-                <a16:creationId xmlns:a16="http://schemas.microsoft.com/office/drawing/2014/main" id="{4484CECE-1614-4AEE-A3E5-0B7519852559}"/>
+                <a16:creationId xmlns:a16="http://schemas.microsoft.com/office/drawing/2014/main" xmlns="" id="{4484CECE-1614-4AEE-A3E5-0B7519852559}"/>
               </a:ext>
             </a:extLst>
           </p:cNvPr>
@@ -13916,7 +14007,7 @@
           <p:cNvPr id="9" name="Groupe 8">
             <a:extLst>
               <a:ext uri="{FF2B5EF4-FFF2-40B4-BE49-F238E27FC236}">
-                <a16:creationId xmlns:a16="http://schemas.microsoft.com/office/drawing/2014/main" id="{23D82E5C-A968-44F6-8506-2728DD4691EC}"/>
+                <a16:creationId xmlns:a16="http://schemas.microsoft.com/office/drawing/2014/main" xmlns="" id="{23D82E5C-A968-44F6-8506-2728DD4691EC}"/>
               </a:ext>
             </a:extLst>
           </p:cNvPr>
@@ -13936,7 +14027,7 @@
             <p:cNvPr id="7" name="Rectangle 6">
               <a:extLst>
                 <a:ext uri="{FF2B5EF4-FFF2-40B4-BE49-F238E27FC236}">
-                  <a16:creationId xmlns:a16="http://schemas.microsoft.com/office/drawing/2014/main" id="{9916E7EC-0F54-4B06-88D6-BC6EA432DDDE}"/>
+                  <a16:creationId xmlns:a16="http://schemas.microsoft.com/office/drawing/2014/main" xmlns="" id="{9916E7EC-0F54-4B06-88D6-BC6EA432DDDE}"/>
                 </a:ext>
               </a:extLst>
             </p:cNvPr>
@@ -13991,7 +14082,7 @@
             <p:cNvPr id="8" name="ZoneTexte 7">
               <a:extLst>
                 <a:ext uri="{FF2B5EF4-FFF2-40B4-BE49-F238E27FC236}">
-                  <a16:creationId xmlns:a16="http://schemas.microsoft.com/office/drawing/2014/main" id="{D91180B7-05B4-4F84-BBE4-1ABBF07A8C2A}"/>
+                  <a16:creationId xmlns:a16="http://schemas.microsoft.com/office/drawing/2014/main" xmlns="" id="{D91180B7-05B4-4F84-BBE4-1ABBF07A8C2A}"/>
                 </a:ext>
               </a:extLst>
             </p:cNvPr>
@@ -14043,7 +14134,7 @@
           <p:cNvPr id="10" name="Groupe 9">
             <a:extLst>
               <a:ext uri="{FF2B5EF4-FFF2-40B4-BE49-F238E27FC236}">
-                <a16:creationId xmlns:a16="http://schemas.microsoft.com/office/drawing/2014/main" id="{465546DD-A06A-4710-95C0-C71CCAD0287A}"/>
+                <a16:creationId xmlns:a16="http://schemas.microsoft.com/office/drawing/2014/main" xmlns="" id="{465546DD-A06A-4710-95C0-C71CCAD0287A}"/>
               </a:ext>
             </a:extLst>
           </p:cNvPr>
@@ -14063,7 +14154,7 @@
             <p:cNvPr id="11" name="Rectangle 10">
               <a:extLst>
                 <a:ext uri="{FF2B5EF4-FFF2-40B4-BE49-F238E27FC236}">
-                  <a16:creationId xmlns:a16="http://schemas.microsoft.com/office/drawing/2014/main" id="{91B49790-0484-4C5B-A768-A3CEE69E7730}"/>
+                  <a16:creationId xmlns:a16="http://schemas.microsoft.com/office/drawing/2014/main" xmlns="" id="{91B49790-0484-4C5B-A768-A3CEE69E7730}"/>
                 </a:ext>
               </a:extLst>
             </p:cNvPr>
@@ -14102,7 +14193,7 @@
             <p:cNvPr id="12" name="ZoneTexte 11">
               <a:extLst>
                 <a:ext uri="{FF2B5EF4-FFF2-40B4-BE49-F238E27FC236}">
-                  <a16:creationId xmlns:a16="http://schemas.microsoft.com/office/drawing/2014/main" id="{CE58D107-D557-4FAB-855F-DF42D305D917}"/>
+                  <a16:creationId xmlns:a16="http://schemas.microsoft.com/office/drawing/2014/main" xmlns="" id="{CE58D107-D557-4FAB-855F-DF42D305D917}"/>
                 </a:ext>
               </a:extLst>
             </p:cNvPr>
@@ -14162,272 +14253,6 @@
 </p:sld>
 </file>
 
-<file path=ppt/slides/slide33.xml><?xml version="1.0" encoding="utf-8"?>
-<p:sld xmlns:a="http://schemas.openxmlformats.org/drawingml/2006/main" xmlns:r="http://schemas.openxmlformats.org/officeDocument/2006/relationships" xmlns:p="http://schemas.openxmlformats.org/presentationml/2006/main">
-  <p:cSld>
-    <p:spTree>
-      <p:nvGrpSpPr>
-        <p:cNvPr id="1" name=""/>
-        <p:cNvGrpSpPr/>
-        <p:nvPr/>
-      </p:nvGrpSpPr>
-      <p:grpSpPr>
-        <a:xfrm>
-          <a:off x="0" y="0"/>
-          <a:ext cx="0" cy="0"/>
-          <a:chOff x="0" y="0"/>
-          <a:chExt cx="0" cy="0"/>
-        </a:xfrm>
-      </p:grpSpPr>
-      <p:sp>
-        <p:nvSpPr>
-          <p:cNvPr id="5" name="Content Placeholder 2"/>
-          <p:cNvSpPr>
-            <a:spLocks noGrp="1"/>
-          </p:cNvSpPr>
-          <p:nvPr>
-            <p:ph idx="1"/>
-          </p:nvPr>
-        </p:nvSpPr>
-        <p:spPr>
-          <a:xfrm>
-            <a:off x="326020" y="634971"/>
-            <a:ext cx="11539959" cy="510199"/>
-          </a:xfrm>
-        </p:spPr>
-        <p:txBody>
-          <a:bodyPr>
-            <a:normAutofit/>
-          </a:bodyPr>
-          <a:lstStyle/>
-          <a:p>
-            <a:pPr marL="0" indent="0">
-              <a:buNone/>
-            </a:pPr>
-            <a:r>
-              <a:rPr lang="it-IT" sz="2400" dirty="0">
-                <a:solidFill>
-                  <a:schemeClr val="tx1"/>
-                </a:solidFill>
-              </a:rPr>
-              <a:t>IEEE </a:t>
-            </a:r>
-            <a:r>
-              <a:rPr lang="it-IT" sz="2400" dirty="0">
-                <a:solidFill>
-                  <a:schemeClr val="tx1"/>
-                </a:solidFill>
-                <a:latin typeface="+mj-lt"/>
-              </a:rPr>
-              <a:t>802.3</a:t>
-            </a:r>
-            <a:endParaRPr lang="fr-CH" sz="2400" dirty="0">
-              <a:solidFill>
-                <a:schemeClr val="tx1"/>
-              </a:solidFill>
-              <a:latin typeface="+mj-lt"/>
-            </a:endParaRPr>
-          </a:p>
-        </p:txBody>
-      </p:sp>
-      <p:sp>
-        <p:nvSpPr>
-          <p:cNvPr id="6" name="Title 1"/>
-          <p:cNvSpPr>
-            <a:spLocks noGrp="1"/>
-          </p:cNvSpPr>
-          <p:nvPr>
-            <p:ph type="title"/>
-          </p:nvPr>
-        </p:nvSpPr>
-        <p:spPr>
-          <a:xfrm>
-            <a:off x="1" y="0"/>
-            <a:ext cx="1689904" cy="510199"/>
-          </a:xfrm>
-        </p:spPr>
-        <p:txBody>
-          <a:bodyPr numCol="1">
-            <a:noAutofit/>
-          </a:bodyPr>
-          <a:lstStyle/>
-          <a:p>
-            <a:pPr algn="ctr"/>
-            <a:r>
-              <a:rPr lang="fr-CH" sz="2800" dirty="0"/>
-              <a:t>NORMES</a:t>
-            </a:r>
-          </a:p>
-        </p:txBody>
-      </p:sp>
-      <p:sp>
-        <p:nvSpPr>
-          <p:cNvPr id="14" name="ZoneTexte 13">
-            <a:extLst>
-              <a:ext uri="{FF2B5EF4-FFF2-40B4-BE49-F238E27FC236}">
-                <a16:creationId xmlns:a16="http://schemas.microsoft.com/office/drawing/2014/main" id="{DCFCBA6D-32BF-45B9-913E-FC03E263FEB7}"/>
-              </a:ext>
-            </a:extLst>
-          </p:cNvPr>
-          <p:cNvSpPr txBox="1"/>
-          <p:nvPr/>
-        </p:nvSpPr>
-        <p:spPr>
-          <a:xfrm>
-            <a:off x="609601" y="1269942"/>
-            <a:ext cx="2974109" cy="369332"/>
-          </a:xfrm>
-          <a:prstGeom prst="rect">
-            <a:avLst/>
-          </a:prstGeom>
-          <a:noFill/>
-        </p:spPr>
-        <p:txBody>
-          <a:bodyPr wrap="square" rtlCol="0">
-            <a:spAutoFit/>
-          </a:bodyPr>
-          <a:lstStyle/>
-          <a:p>
-            <a:r>
-              <a:rPr lang="fr-CH" b="1" dirty="0">
-                <a:latin typeface="+mj-lt"/>
-              </a:rPr>
-              <a:t>Les débits :</a:t>
-            </a:r>
-          </a:p>
-        </p:txBody>
-      </p:sp>
-      <p:sp>
-        <p:nvSpPr>
-          <p:cNvPr id="15" name="ZoneTexte 14">
-            <a:extLst>
-              <a:ext uri="{FF2B5EF4-FFF2-40B4-BE49-F238E27FC236}">
-                <a16:creationId xmlns:a16="http://schemas.microsoft.com/office/drawing/2014/main" id="{6335B29D-0CD6-4CAA-B965-93BCC03492D8}"/>
-              </a:ext>
-            </a:extLst>
-          </p:cNvPr>
-          <p:cNvSpPr txBox="1"/>
-          <p:nvPr/>
-        </p:nvSpPr>
-        <p:spPr>
-          <a:xfrm>
-            <a:off x="942109" y="1764046"/>
-            <a:ext cx="5643418" cy="369332"/>
-          </a:xfrm>
-          <a:prstGeom prst="rect">
-            <a:avLst/>
-          </a:prstGeom>
-          <a:noFill/>
-        </p:spPr>
-        <p:txBody>
-          <a:bodyPr wrap="square" rtlCol="0">
-            <a:spAutoFit/>
-          </a:bodyPr>
-          <a:lstStyle/>
-          <a:p>
-            <a:r>
-              <a:rPr lang="fr-CH" dirty="0"/>
-              <a:t>Il existe 4 débits différents à ce jour.</a:t>
-            </a:r>
-          </a:p>
-        </p:txBody>
-      </p:sp>
-      <p:sp>
-        <p:nvSpPr>
-          <p:cNvPr id="16" name="Rectangle 15">
-            <a:extLst>
-              <a:ext uri="{FF2B5EF4-FFF2-40B4-BE49-F238E27FC236}">
-                <a16:creationId xmlns:a16="http://schemas.microsoft.com/office/drawing/2014/main" id="{598DB639-CD18-4A74-9FFE-C44EB01149A7}"/>
-              </a:ext>
-            </a:extLst>
-          </p:cNvPr>
-          <p:cNvSpPr/>
-          <p:nvPr/>
-        </p:nvSpPr>
-        <p:spPr>
-          <a:xfrm>
-            <a:off x="1320451" y="2258150"/>
-            <a:ext cx="5703806" cy="1701684"/>
-          </a:xfrm>
-          <a:prstGeom prst="rect">
-            <a:avLst/>
-          </a:prstGeom>
-        </p:spPr>
-        <p:txBody>
-          <a:bodyPr wrap="none">
-            <a:spAutoFit/>
-          </a:bodyPr>
-          <a:lstStyle/>
-          <a:p>
-            <a:pPr marL="285750" indent="-285750">
-              <a:lnSpc>
-                <a:spcPct val="150000"/>
-              </a:lnSpc>
-              <a:buFont typeface="Arial" panose="020B0604020202020204" pitchFamily="34" charset="0"/>
-              <a:buChar char="•"/>
-            </a:pPr>
-            <a:r>
-              <a:rPr lang="fr-CH" dirty="0">
-                <a:ea typeface="Calibri" panose="020F0502020204030204" pitchFamily="34" charset="0"/>
-                <a:cs typeface="Arial" panose="020B0604020202020204" pitchFamily="34" charset="0"/>
-              </a:rPr>
-              <a:t>Ethernet qui a un débit de 10 Mb/s,</a:t>
-            </a:r>
-          </a:p>
-          <a:p>
-            <a:pPr marL="285750" indent="-285750">
-              <a:lnSpc>
-                <a:spcPct val="150000"/>
-              </a:lnSpc>
-              <a:buFont typeface="Arial" panose="020B0604020202020204" pitchFamily="34" charset="0"/>
-              <a:buChar char="•"/>
-            </a:pPr>
-            <a:r>
-              <a:rPr lang="fr-CH" dirty="0"/>
-              <a:t>Fast Ethernet qui a un débit de 100 Mb/s,</a:t>
-            </a:r>
-          </a:p>
-          <a:p>
-            <a:pPr marL="285750" indent="-285750">
-              <a:lnSpc>
-                <a:spcPct val="150000"/>
-              </a:lnSpc>
-              <a:buFont typeface="Arial" panose="020B0604020202020204" pitchFamily="34" charset="0"/>
-              <a:buChar char="•"/>
-            </a:pPr>
-            <a:r>
-              <a:rPr lang="fr-CH" dirty="0"/>
-              <a:t>GigaEthernet qui a un débit de 1’000Mb/s et</a:t>
-            </a:r>
-          </a:p>
-          <a:p>
-            <a:pPr marL="285750" indent="-285750">
-              <a:lnSpc>
-                <a:spcPct val="150000"/>
-              </a:lnSpc>
-              <a:buFont typeface="Arial" panose="020B0604020202020204" pitchFamily="34" charset="0"/>
-              <a:buChar char="•"/>
-            </a:pPr>
-            <a:r>
-              <a:rPr lang="fr-CH" dirty="0"/>
-              <a:t>10 GigaEthernet qui a un débit de 10’000Mb/s.</a:t>
-            </a:r>
-          </a:p>
-        </p:txBody>
-      </p:sp>
-    </p:spTree>
-    <p:extLst>
-      <p:ext uri="{BB962C8B-B14F-4D97-AF65-F5344CB8AC3E}">
-        <p14:creationId xmlns:p14="http://schemas.microsoft.com/office/powerpoint/2010/main" val="743191427"/>
-      </p:ext>
-    </p:extLst>
-  </p:cSld>
-  <p:clrMapOvr>
-    <a:masterClrMapping/>
-  </p:clrMapOvr>
-</p:sld>
-</file>
-
 <file path=ppt/slides/slide34.xml><?xml version="1.0" encoding="utf-8"?>
 <p:sld xmlns:a="http://schemas.openxmlformats.org/drawingml/2006/main" xmlns:r="http://schemas.openxmlformats.org/officeDocument/2006/relationships" xmlns:p="http://schemas.openxmlformats.org/presentationml/2006/main">
   <p:cSld>
@@ -14447,13 +14272,58 @@
       </p:grpSpPr>
       <p:sp>
         <p:nvSpPr>
-          <p:cNvPr id="2" name="Titre 1">
-            <a:extLst>
-              <a:ext uri="{FF2B5EF4-FFF2-40B4-BE49-F238E27FC236}">
-                <a16:creationId xmlns:a16="http://schemas.microsoft.com/office/drawing/2014/main" id="{42B1C103-5438-4ED4-9DC3-64DAD3FD626E}"/>
-              </a:ext>
-            </a:extLst>
-          </p:cNvPr>
+          <p:cNvPr id="5" name="Content Placeholder 2"/>
+          <p:cNvSpPr>
+            <a:spLocks noGrp="1"/>
+          </p:cNvSpPr>
+          <p:nvPr>
+            <p:ph idx="1"/>
+          </p:nvPr>
+        </p:nvSpPr>
+        <p:spPr>
+          <a:xfrm>
+            <a:off x="326020" y="634971"/>
+            <a:ext cx="11539959" cy="510199"/>
+          </a:xfrm>
+        </p:spPr>
+        <p:txBody>
+          <a:bodyPr>
+            <a:normAutofit/>
+          </a:bodyPr>
+          <a:lstStyle/>
+          <a:p>
+            <a:pPr marL="0" indent="0">
+              <a:buNone/>
+            </a:pPr>
+            <a:r>
+              <a:rPr lang="it-IT" sz="2400" dirty="0">
+                <a:solidFill>
+                  <a:schemeClr val="tx1"/>
+                </a:solidFill>
+              </a:rPr>
+              <a:t>IEEE </a:t>
+            </a:r>
+            <a:r>
+              <a:rPr lang="it-IT" sz="2400" dirty="0">
+                <a:solidFill>
+                  <a:schemeClr val="tx1"/>
+                </a:solidFill>
+                <a:latin typeface="+mj-lt"/>
+              </a:rPr>
+              <a:t>802.3</a:t>
+            </a:r>
+            <a:endParaRPr lang="fr-CH" sz="2400" dirty="0">
+              <a:solidFill>
+                <a:schemeClr val="tx1"/>
+              </a:solidFill>
+              <a:latin typeface="+mj-lt"/>
+            </a:endParaRPr>
+          </a:p>
+        </p:txBody>
+      </p:sp>
+      <p:sp>
+        <p:nvSpPr>
+          <p:cNvPr id="6" name="Title 1"/>
           <p:cNvSpPr>
             <a:spLocks noGrp="1"/>
           </p:cNvSpPr>
@@ -14461,44 +14331,185 @@
             <p:ph type="title"/>
           </p:nvPr>
         </p:nvSpPr>
-        <p:spPr/>
-        <p:txBody>
-          <a:bodyPr/>
+        <p:spPr>
+          <a:xfrm>
+            <a:off x="1" y="0"/>
+            <a:ext cx="1689904" cy="510199"/>
+          </a:xfrm>
+        </p:spPr>
+        <p:txBody>
+          <a:bodyPr numCol="1">
+            <a:noAutofit/>
+          </a:bodyPr>
           <a:lstStyle/>
           <a:p>
-            <a:endParaRPr lang="fr-CH"/>
-          </a:p>
-        </p:txBody>
-      </p:sp>
-      <p:sp>
-        <p:nvSpPr>
-          <p:cNvPr id="3" name="Espace réservé du contenu 2">
+            <a:pPr algn="ctr"/>
+            <a:r>
+              <a:rPr lang="fr-CH" sz="2800" dirty="0"/>
+              <a:t>NORMES</a:t>
+            </a:r>
+          </a:p>
+        </p:txBody>
+      </p:sp>
+      <p:sp>
+        <p:nvSpPr>
+          <p:cNvPr id="14" name="ZoneTexte 13">
             <a:extLst>
               <a:ext uri="{FF2B5EF4-FFF2-40B4-BE49-F238E27FC236}">
-                <a16:creationId xmlns:a16="http://schemas.microsoft.com/office/drawing/2014/main" id="{3BB66C46-EE36-4F98-8862-5AD66F47ABF5}"/>
+                <a16:creationId xmlns:a16="http://schemas.microsoft.com/office/drawing/2014/main" xmlns="" id="{DCFCBA6D-32BF-45B9-913E-FC03E263FEB7}"/>
               </a:ext>
             </a:extLst>
           </p:cNvPr>
-          <p:cNvSpPr>
-            <a:spLocks noGrp="1"/>
-          </p:cNvSpPr>
-          <p:nvPr>
-            <p:ph idx="1"/>
-          </p:nvPr>
-        </p:nvSpPr>
-        <p:spPr/>
-        <p:txBody>
-          <a:bodyPr/>
+          <p:cNvSpPr txBox="1"/>
+          <p:nvPr/>
+        </p:nvSpPr>
+        <p:spPr>
+          <a:xfrm>
+            <a:off x="609601" y="1269942"/>
+            <a:ext cx="2974109" cy="369332"/>
+          </a:xfrm>
+          <a:prstGeom prst="rect">
+            <a:avLst/>
+          </a:prstGeom>
+          <a:noFill/>
+        </p:spPr>
+        <p:txBody>
+          <a:bodyPr wrap="square" rtlCol="0">
+            <a:spAutoFit/>
+          </a:bodyPr>
           <a:lstStyle/>
           <a:p>
-            <a:endParaRPr lang="fr-CH"/>
+            <a:r>
+              <a:rPr lang="fr-CH" b="1" dirty="0">
+                <a:latin typeface="+mj-lt"/>
+              </a:rPr>
+              <a:t>Les débits :</a:t>
+            </a:r>
+          </a:p>
+        </p:txBody>
+      </p:sp>
+      <p:sp>
+        <p:nvSpPr>
+          <p:cNvPr id="15" name="ZoneTexte 14">
+            <a:extLst>
+              <a:ext uri="{FF2B5EF4-FFF2-40B4-BE49-F238E27FC236}">
+                <a16:creationId xmlns:a16="http://schemas.microsoft.com/office/drawing/2014/main" xmlns="" id="{6335B29D-0CD6-4CAA-B965-93BCC03492D8}"/>
+              </a:ext>
+            </a:extLst>
+          </p:cNvPr>
+          <p:cNvSpPr txBox="1"/>
+          <p:nvPr/>
+        </p:nvSpPr>
+        <p:spPr>
+          <a:xfrm>
+            <a:off x="942109" y="1764046"/>
+            <a:ext cx="5643418" cy="369332"/>
+          </a:xfrm>
+          <a:prstGeom prst="rect">
+            <a:avLst/>
+          </a:prstGeom>
+          <a:noFill/>
+        </p:spPr>
+        <p:txBody>
+          <a:bodyPr wrap="square" rtlCol="0">
+            <a:spAutoFit/>
+          </a:bodyPr>
+          <a:lstStyle/>
+          <a:p>
+            <a:r>
+              <a:rPr lang="fr-CH" dirty="0"/>
+              <a:t>Il existe 4 débits différents à ce jour.</a:t>
+            </a:r>
+          </a:p>
+        </p:txBody>
+      </p:sp>
+      <p:sp>
+        <p:nvSpPr>
+          <p:cNvPr id="16" name="Rectangle 15">
+            <a:extLst>
+              <a:ext uri="{FF2B5EF4-FFF2-40B4-BE49-F238E27FC236}">
+                <a16:creationId xmlns:a16="http://schemas.microsoft.com/office/drawing/2014/main" xmlns="" id="{598DB639-CD18-4A74-9FFE-C44EB01149A7}"/>
+              </a:ext>
+            </a:extLst>
+          </p:cNvPr>
+          <p:cNvSpPr/>
+          <p:nvPr/>
+        </p:nvSpPr>
+        <p:spPr>
+          <a:xfrm>
+            <a:off x="1320451" y="2258150"/>
+            <a:ext cx="5703806" cy="1701684"/>
+          </a:xfrm>
+          <a:prstGeom prst="rect">
+            <a:avLst/>
+          </a:prstGeom>
+        </p:spPr>
+        <p:txBody>
+          <a:bodyPr wrap="none">
+            <a:spAutoFit/>
+          </a:bodyPr>
+          <a:lstStyle/>
+          <a:p>
+            <a:pPr marL="285750" indent="-285750">
+              <a:lnSpc>
+                <a:spcPct val="150000"/>
+              </a:lnSpc>
+              <a:buFont typeface="Arial" panose="020B0604020202020204" pitchFamily="34" charset="0"/>
+              <a:buChar char="•"/>
+            </a:pPr>
+            <a:r>
+              <a:rPr lang="fr-CH" dirty="0">
+                <a:ea typeface="Calibri" panose="020F0502020204030204" pitchFamily="34" charset="0"/>
+                <a:cs typeface="Arial" panose="020B0604020202020204" pitchFamily="34" charset="0"/>
+              </a:rPr>
+              <a:t>Ethernet qui a un débit de 10 Mb/s,</a:t>
+            </a:r>
+          </a:p>
+          <a:p>
+            <a:pPr marL="285750" indent="-285750">
+              <a:lnSpc>
+                <a:spcPct val="150000"/>
+              </a:lnSpc>
+              <a:buFont typeface="Arial" panose="020B0604020202020204" pitchFamily="34" charset="0"/>
+              <a:buChar char="•"/>
+            </a:pPr>
+            <a:r>
+              <a:rPr lang="fr-CH" dirty="0"/>
+              <a:t>Fast Ethernet qui a un débit de 100 Mb/s,</a:t>
+            </a:r>
+          </a:p>
+          <a:p>
+            <a:pPr marL="285750" indent="-285750">
+              <a:lnSpc>
+                <a:spcPct val="150000"/>
+              </a:lnSpc>
+              <a:buFont typeface="Arial" panose="020B0604020202020204" pitchFamily="34" charset="0"/>
+              <a:buChar char="•"/>
+            </a:pPr>
+            <a:r>
+              <a:rPr lang="fr-CH" dirty="0"/>
+              <a:t>GigaEthernet qui a un débit de 1’000Mb/s et</a:t>
+            </a:r>
+          </a:p>
+          <a:p>
+            <a:pPr marL="285750" indent="-285750">
+              <a:lnSpc>
+                <a:spcPct val="150000"/>
+              </a:lnSpc>
+              <a:buFont typeface="Arial" panose="020B0604020202020204" pitchFamily="34" charset="0"/>
+              <a:buChar char="•"/>
+            </a:pPr>
+            <a:r>
+              <a:rPr lang="fr-CH" dirty="0"/>
+              <a:t>10 GigaEthernet qui a un débit de 10’000Mb/s.</a:t>
+            </a:r>
           </a:p>
         </p:txBody>
       </p:sp>
     </p:spTree>
     <p:extLst>
       <p:ext uri="{BB962C8B-B14F-4D97-AF65-F5344CB8AC3E}">
-        <p14:creationId xmlns:p14="http://schemas.microsoft.com/office/powerpoint/2010/main" val="3797207043"/>
+        <p14:creationId xmlns:p14="http://schemas.microsoft.com/office/powerpoint/2010/main" val="743191427"/>
       </p:ext>
     </p:extLst>
   </p:cSld>
@@ -14527,7 +14538,13 @@
       </p:grpSpPr>
       <p:sp>
         <p:nvSpPr>
-          <p:cNvPr id="6" name="Title 1"/>
+          <p:cNvPr id="2" name="Titre 1">
+            <a:extLst>
+              <a:ext uri="{FF2B5EF4-FFF2-40B4-BE49-F238E27FC236}">
+                <a16:creationId xmlns:a16="http://schemas.microsoft.com/office/drawing/2014/main" xmlns="" id="{42B1C103-5438-4ED4-9DC3-64DAD3FD626E}"/>
+              </a:ext>
+            </a:extLst>
+          </p:cNvPr>
           <p:cNvSpPr>
             <a:spLocks noGrp="1"/>
           </p:cNvSpPr>
@@ -14535,173 +14552,44 @@
             <p:ph type="title"/>
           </p:nvPr>
         </p:nvSpPr>
-        <p:spPr>
-          <a:xfrm>
-            <a:off x="0" y="0"/>
-            <a:ext cx="2488557" cy="510199"/>
-          </a:xfrm>
-        </p:spPr>
-        <p:txBody>
-          <a:bodyPr numCol="1">
-            <a:noAutofit/>
-          </a:bodyPr>
+        <p:spPr/>
+        <p:txBody>
+          <a:bodyPr/>
           <a:lstStyle/>
           <a:p>
-            <a:pPr algn="ctr"/>
-            <a:r>
-              <a:rPr lang="fr-CH" sz="2800" dirty="0"/>
-              <a:t>FABRICATION</a:t>
-            </a:r>
-          </a:p>
-        </p:txBody>
-      </p:sp>
-      <p:sp>
-        <p:nvSpPr>
-          <p:cNvPr id="2" name="ZoneTexte 1">
+            <a:endParaRPr lang="fr-CH"/>
+          </a:p>
+        </p:txBody>
+      </p:sp>
+      <p:sp>
+        <p:nvSpPr>
+          <p:cNvPr id="3" name="Espace réservé du contenu 2">
             <a:extLst>
               <a:ext uri="{FF2B5EF4-FFF2-40B4-BE49-F238E27FC236}">
-                <a16:creationId xmlns:a16="http://schemas.microsoft.com/office/drawing/2014/main" id="{95A71DAD-C760-4FB1-9A97-CB83FC9A6215}"/>
+                <a16:creationId xmlns:a16="http://schemas.microsoft.com/office/drawing/2014/main" xmlns="" id="{3BB66C46-EE36-4F98-8862-5AD66F47ABF5}"/>
               </a:ext>
             </a:extLst>
           </p:cNvPr>
-          <p:cNvSpPr txBox="1"/>
-          <p:nvPr/>
-        </p:nvSpPr>
-        <p:spPr>
-          <a:xfrm>
-            <a:off x="374248" y="902826"/>
-            <a:ext cx="3940233" cy="461665"/>
-          </a:xfrm>
-          <a:prstGeom prst="rect">
-            <a:avLst/>
-          </a:prstGeom>
-          <a:noFill/>
-        </p:spPr>
-        <p:txBody>
-          <a:bodyPr wrap="square" rtlCol="0">
-            <a:spAutoFit/>
-          </a:bodyPr>
+          <p:cNvSpPr>
+            <a:spLocks noGrp="1"/>
+          </p:cNvSpPr>
+          <p:nvPr>
+            <p:ph idx="1"/>
+          </p:nvPr>
+        </p:nvSpPr>
+        <p:spPr/>
+        <p:txBody>
+          <a:bodyPr/>
           <a:lstStyle/>
           <a:p>
-            <a:r>
-              <a:rPr lang="fr-CH" sz="2400" b="1" dirty="0"/>
-              <a:t>Préparation du matériel</a:t>
-            </a:r>
-          </a:p>
-        </p:txBody>
-      </p:sp>
-      <p:sp>
-        <p:nvSpPr>
-          <p:cNvPr id="4" name="ZoneTexte 3">
-            <a:extLst>
-              <a:ext uri="{FF2B5EF4-FFF2-40B4-BE49-F238E27FC236}">
-                <a16:creationId xmlns:a16="http://schemas.microsoft.com/office/drawing/2014/main" id="{FBE88C88-B8F1-497D-99A0-7069148CCDE5}"/>
-              </a:ext>
-            </a:extLst>
-          </p:cNvPr>
-          <p:cNvSpPr txBox="1"/>
-          <p:nvPr/>
-        </p:nvSpPr>
-        <p:spPr>
-          <a:xfrm>
-            <a:off x="374248" y="1514120"/>
-            <a:ext cx="6059803" cy="2862322"/>
-          </a:xfrm>
-          <a:prstGeom prst="rect">
-            <a:avLst/>
-          </a:prstGeom>
-          <a:noFill/>
-        </p:spPr>
-        <p:txBody>
-          <a:bodyPr wrap="square" rtlCol="0">
-            <a:spAutoFit/>
-          </a:bodyPr>
-          <a:lstStyle/>
-          <a:p>
-            <a:pPr marL="285750" indent="-285750">
-              <a:buFont typeface="Arial" panose="020B0604020202020204" pitchFamily="34" charset="0"/>
-              <a:buChar char="•"/>
-            </a:pPr>
-            <a:r>
-              <a:rPr lang="fr-CH" sz="2000" dirty="0"/>
-              <a:t>Du câble</a:t>
-            </a:r>
-          </a:p>
-          <a:p>
-            <a:pPr marL="285750" indent="-285750">
-              <a:buFont typeface="Arial" panose="020B0604020202020204" pitchFamily="34" charset="0"/>
-              <a:buChar char="•"/>
-            </a:pPr>
-            <a:r>
-              <a:rPr lang="fr-CH" sz="2000" dirty="0"/>
-              <a:t>Des connecteurs</a:t>
-            </a:r>
-          </a:p>
-          <a:p>
-            <a:endParaRPr lang="fr-CH" sz="2000" dirty="0"/>
-          </a:p>
-          <a:p>
-            <a:r>
-              <a:rPr lang="fr-CH" sz="2000" dirty="0"/>
-              <a:t>Les outils </a:t>
-            </a:r>
-          </a:p>
-          <a:p>
-            <a:pPr marL="285750" indent="-285750">
-              <a:buFont typeface="Arial" panose="020B0604020202020204" pitchFamily="34" charset="0"/>
-              <a:buChar char="•"/>
-            </a:pPr>
-            <a:r>
-              <a:rPr lang="fr-CH" sz="2000" dirty="0"/>
-              <a:t>Un cutter </a:t>
-            </a:r>
-          </a:p>
-          <a:p>
-            <a:pPr marL="285750" indent="-285750">
-              <a:buFont typeface="Arial" panose="020B0604020202020204" pitchFamily="34" charset="0"/>
-              <a:buChar char="•"/>
-            </a:pPr>
-            <a:r>
-              <a:rPr lang="fr-CH" sz="2000" dirty="0"/>
-              <a:t>Une pince à sertir</a:t>
-            </a:r>
-          </a:p>
-          <a:p>
-            <a:pPr marL="285750" indent="-285750">
-              <a:buFont typeface="Arial" panose="020B0604020202020204" pitchFamily="34" charset="0"/>
-              <a:buChar char="•"/>
-            </a:pPr>
-            <a:r>
-              <a:rPr lang="fr-CH" sz="2000" dirty="0"/>
-              <a:t>Une pince coupante</a:t>
-            </a:r>
-          </a:p>
-          <a:p>
-            <a:pPr marL="285750" indent="-285750">
-              <a:buFont typeface="Arial" panose="020B0604020202020204" pitchFamily="34" charset="0"/>
-              <a:buChar char="•"/>
-            </a:pPr>
-            <a:r>
-              <a:rPr lang="fr-CH" sz="2000" dirty="0"/>
-              <a:t>Une règle</a:t>
-            </a:r>
-          </a:p>
-          <a:p>
-            <a:pPr marL="285750" indent="-285750">
-              <a:buFont typeface="Arial" panose="020B0604020202020204" pitchFamily="34" charset="0"/>
-              <a:buChar char="•"/>
-            </a:pPr>
-            <a:r>
-              <a:rPr lang="fr-CH" sz="2000" dirty="0"/>
-              <a:t>Une pince à dénuder</a:t>
-            </a:r>
+            <a:endParaRPr lang="fr-CH"/>
           </a:p>
         </p:txBody>
       </p:sp>
     </p:spTree>
     <p:extLst>
       <p:ext uri="{BB962C8B-B14F-4D97-AF65-F5344CB8AC3E}">
-        <p14:creationId xmlns:p14="http://schemas.microsoft.com/office/powerpoint/2010/main" val="1207272401"/>
+        <p14:creationId xmlns:p14="http://schemas.microsoft.com/office/powerpoint/2010/main" val="3797207043"/>
       </p:ext>
     </p:extLst>
   </p:cSld>
@@ -14763,7 +14651,7 @@
           <p:cNvPr id="2" name="ZoneTexte 1">
             <a:extLst>
               <a:ext uri="{FF2B5EF4-FFF2-40B4-BE49-F238E27FC236}">
-                <a16:creationId xmlns:a16="http://schemas.microsoft.com/office/drawing/2014/main" id="{95A71DAD-C760-4FB1-9A97-CB83FC9A6215}"/>
+                <a16:creationId xmlns:a16="http://schemas.microsoft.com/office/drawing/2014/main" xmlns="" id="{95A71DAD-C760-4FB1-9A97-CB83FC9A6215}"/>
               </a:ext>
             </a:extLst>
           </p:cNvPr>
@@ -14788,7 +14676,7 @@
           <a:p>
             <a:r>
               <a:rPr lang="fr-CH" sz="2400" b="1" dirty="0"/>
-              <a:t>Préparation du câble</a:t>
+              <a:t>Préparation du matériel</a:t>
             </a:r>
           </a:p>
         </p:txBody>
@@ -14798,7 +14686,7 @@
           <p:cNvPr id="4" name="ZoneTexte 3">
             <a:extLst>
               <a:ext uri="{FF2B5EF4-FFF2-40B4-BE49-F238E27FC236}">
-                <a16:creationId xmlns:a16="http://schemas.microsoft.com/office/drawing/2014/main" id="{FBE88C88-B8F1-497D-99A0-7069148CCDE5}"/>
+                <a16:creationId xmlns:a16="http://schemas.microsoft.com/office/drawing/2014/main" xmlns="" id="{FBE88C88-B8F1-497D-99A0-7069148CCDE5}"/>
               </a:ext>
             </a:extLst>
           </p:cNvPr>
@@ -14808,7 +14696,7 @@
         <p:spPr>
           <a:xfrm>
             <a:off x="374248" y="1514120"/>
-            <a:ext cx="6059803" cy="1631216"/>
+            <a:ext cx="6059803" cy="2862322"/>
           </a:xfrm>
           <a:prstGeom prst="rect">
             <a:avLst/>
@@ -14821,9 +14709,23 @@
           </a:bodyPr>
           <a:lstStyle/>
           <a:p>
+            <a:pPr marL="285750" indent="-285750">
+              <a:buFont typeface="Arial" panose="020B0604020202020204" pitchFamily="34" charset="0"/>
+              <a:buChar char="•"/>
+            </a:pPr>
             <a:r>
               <a:rPr lang="fr-CH" sz="2000" dirty="0"/>
-              <a:t>Mesurez la longueur nécessaire de câble et y ajouter 20 centimètres pour les connecteurs.</a:t>
+              <a:t>Du câble</a:t>
+            </a:r>
+          </a:p>
+          <a:p>
+            <a:pPr marL="285750" indent="-285750">
+              <a:buFont typeface="Arial" panose="020B0604020202020204" pitchFamily="34" charset="0"/>
+              <a:buChar char="•"/>
+            </a:pPr>
+            <a:r>
+              <a:rPr lang="fr-CH" sz="2000" dirty="0"/>
+              <a:t>Des connecteurs</a:t>
             </a:r>
           </a:p>
           <a:p>
@@ -14832,7 +14734,57 @@
           <a:p>
             <a:r>
               <a:rPr lang="fr-CH" sz="2000" dirty="0"/>
-              <a:t>Coupez cette longueur à l’aide de la pince coupante.</a:t>
+              <a:t>Les outils </a:t>
+            </a:r>
+          </a:p>
+          <a:p>
+            <a:pPr marL="285750" indent="-285750">
+              <a:buFont typeface="Arial" panose="020B0604020202020204" pitchFamily="34" charset="0"/>
+              <a:buChar char="•"/>
+            </a:pPr>
+            <a:r>
+              <a:rPr lang="fr-CH" sz="2000" dirty="0"/>
+              <a:t>Un cutter </a:t>
+            </a:r>
+          </a:p>
+          <a:p>
+            <a:pPr marL="285750" indent="-285750">
+              <a:buFont typeface="Arial" panose="020B0604020202020204" pitchFamily="34" charset="0"/>
+              <a:buChar char="•"/>
+            </a:pPr>
+            <a:r>
+              <a:rPr lang="fr-CH" sz="2000" dirty="0"/>
+              <a:t>Une pince à sertir</a:t>
+            </a:r>
+          </a:p>
+          <a:p>
+            <a:pPr marL="285750" indent="-285750">
+              <a:buFont typeface="Arial" panose="020B0604020202020204" pitchFamily="34" charset="0"/>
+              <a:buChar char="•"/>
+            </a:pPr>
+            <a:r>
+              <a:rPr lang="fr-CH" sz="2000" dirty="0"/>
+              <a:t>Une pince coupante</a:t>
+            </a:r>
+          </a:p>
+          <a:p>
+            <a:pPr marL="285750" indent="-285750">
+              <a:buFont typeface="Arial" panose="020B0604020202020204" pitchFamily="34" charset="0"/>
+              <a:buChar char="•"/>
+            </a:pPr>
+            <a:r>
+              <a:rPr lang="fr-CH" sz="2000" dirty="0"/>
+              <a:t>Une règle</a:t>
+            </a:r>
+          </a:p>
+          <a:p>
+            <a:pPr marL="285750" indent="-285750">
+              <a:buFont typeface="Arial" panose="020B0604020202020204" pitchFamily="34" charset="0"/>
+              <a:buChar char="•"/>
+            </a:pPr>
+            <a:r>
+              <a:rPr lang="fr-CH" sz="2000" dirty="0"/>
+              <a:t>Une pince à dénuder</a:t>
             </a:r>
           </a:p>
         </p:txBody>
@@ -14840,7 +14792,7 @@
     </p:spTree>
     <p:extLst>
       <p:ext uri="{BB962C8B-B14F-4D97-AF65-F5344CB8AC3E}">
-        <p14:creationId xmlns:p14="http://schemas.microsoft.com/office/powerpoint/2010/main" val="4164296157"/>
+        <p14:creationId xmlns:p14="http://schemas.microsoft.com/office/powerpoint/2010/main" val="1207272401"/>
       </p:ext>
     </p:extLst>
   </p:cSld>
@@ -14902,7 +14854,7 @@
           <p:cNvPr id="2" name="ZoneTexte 1">
             <a:extLst>
               <a:ext uri="{FF2B5EF4-FFF2-40B4-BE49-F238E27FC236}">
-                <a16:creationId xmlns:a16="http://schemas.microsoft.com/office/drawing/2014/main" id="{95A71DAD-C760-4FB1-9A97-CB83FC9A6215}"/>
+                <a16:creationId xmlns:a16="http://schemas.microsoft.com/office/drawing/2014/main" xmlns="" id="{95A71DAD-C760-4FB1-9A97-CB83FC9A6215}"/>
               </a:ext>
             </a:extLst>
           </p:cNvPr>
@@ -14927,7 +14879,7 @@
           <a:p>
             <a:r>
               <a:rPr lang="fr-CH" sz="2400" b="1" dirty="0"/>
-              <a:t>Dénudage</a:t>
+              <a:t>Préparation du câble</a:t>
             </a:r>
           </a:p>
         </p:txBody>
@@ -14937,7 +14889,146 @@
           <p:cNvPr id="4" name="ZoneTexte 3">
             <a:extLst>
               <a:ext uri="{FF2B5EF4-FFF2-40B4-BE49-F238E27FC236}">
-                <a16:creationId xmlns:a16="http://schemas.microsoft.com/office/drawing/2014/main" id="{FBE88C88-B8F1-497D-99A0-7069148CCDE5}"/>
+                <a16:creationId xmlns:a16="http://schemas.microsoft.com/office/drawing/2014/main" xmlns="" id="{FBE88C88-B8F1-497D-99A0-7069148CCDE5}"/>
+              </a:ext>
+            </a:extLst>
+          </p:cNvPr>
+          <p:cNvSpPr txBox="1"/>
+          <p:nvPr/>
+        </p:nvSpPr>
+        <p:spPr>
+          <a:xfrm>
+            <a:off x="374248" y="1514120"/>
+            <a:ext cx="6059803" cy="1631216"/>
+          </a:xfrm>
+          <a:prstGeom prst="rect">
+            <a:avLst/>
+          </a:prstGeom>
+          <a:noFill/>
+        </p:spPr>
+        <p:txBody>
+          <a:bodyPr wrap="square" rtlCol="0">
+            <a:spAutoFit/>
+          </a:bodyPr>
+          <a:lstStyle/>
+          <a:p>
+            <a:r>
+              <a:rPr lang="fr-CH" sz="2000" dirty="0"/>
+              <a:t>Mesurez la longueur nécessaire de câble et y ajouter 20 centimètres pour les connecteurs.</a:t>
+            </a:r>
+          </a:p>
+          <a:p>
+            <a:endParaRPr lang="fr-CH" sz="2000" dirty="0"/>
+          </a:p>
+          <a:p>
+            <a:r>
+              <a:rPr lang="fr-CH" sz="2000" dirty="0"/>
+              <a:t>Coupez cette longueur à l’aide de la pince coupante.</a:t>
+            </a:r>
+          </a:p>
+        </p:txBody>
+      </p:sp>
+    </p:spTree>
+    <p:extLst>
+      <p:ext uri="{BB962C8B-B14F-4D97-AF65-F5344CB8AC3E}">
+        <p14:creationId xmlns:p14="http://schemas.microsoft.com/office/powerpoint/2010/main" val="4164296157"/>
+      </p:ext>
+    </p:extLst>
+  </p:cSld>
+  <p:clrMapOvr>
+    <a:masterClrMapping/>
+  </p:clrMapOvr>
+</p:sld>
+</file>
+
+<file path=ppt/slides/slide38.xml><?xml version="1.0" encoding="utf-8"?>
+<p:sld xmlns:a="http://schemas.openxmlformats.org/drawingml/2006/main" xmlns:r="http://schemas.openxmlformats.org/officeDocument/2006/relationships" xmlns:p="http://schemas.openxmlformats.org/presentationml/2006/main">
+  <p:cSld>
+    <p:spTree>
+      <p:nvGrpSpPr>
+        <p:cNvPr id="1" name=""/>
+        <p:cNvGrpSpPr/>
+        <p:nvPr/>
+      </p:nvGrpSpPr>
+      <p:grpSpPr>
+        <a:xfrm>
+          <a:off x="0" y="0"/>
+          <a:ext cx="0" cy="0"/>
+          <a:chOff x="0" y="0"/>
+          <a:chExt cx="0" cy="0"/>
+        </a:xfrm>
+      </p:grpSpPr>
+      <p:sp>
+        <p:nvSpPr>
+          <p:cNvPr id="6" name="Title 1"/>
+          <p:cNvSpPr>
+            <a:spLocks noGrp="1"/>
+          </p:cNvSpPr>
+          <p:nvPr>
+            <p:ph type="title"/>
+          </p:nvPr>
+        </p:nvSpPr>
+        <p:spPr>
+          <a:xfrm>
+            <a:off x="0" y="0"/>
+            <a:ext cx="2488557" cy="510199"/>
+          </a:xfrm>
+        </p:spPr>
+        <p:txBody>
+          <a:bodyPr numCol="1">
+            <a:noAutofit/>
+          </a:bodyPr>
+          <a:lstStyle/>
+          <a:p>
+            <a:pPr algn="ctr"/>
+            <a:r>
+              <a:rPr lang="fr-CH" sz="2800" dirty="0"/>
+              <a:t>FABRICATION</a:t>
+            </a:r>
+          </a:p>
+        </p:txBody>
+      </p:sp>
+      <p:sp>
+        <p:nvSpPr>
+          <p:cNvPr id="2" name="ZoneTexte 1">
+            <a:extLst>
+              <a:ext uri="{FF2B5EF4-FFF2-40B4-BE49-F238E27FC236}">
+                <a16:creationId xmlns:a16="http://schemas.microsoft.com/office/drawing/2014/main" xmlns="" id="{95A71DAD-C760-4FB1-9A97-CB83FC9A6215}"/>
+              </a:ext>
+            </a:extLst>
+          </p:cNvPr>
+          <p:cNvSpPr txBox="1"/>
+          <p:nvPr/>
+        </p:nvSpPr>
+        <p:spPr>
+          <a:xfrm>
+            <a:off x="374248" y="902826"/>
+            <a:ext cx="3940233" cy="461665"/>
+          </a:xfrm>
+          <a:prstGeom prst="rect">
+            <a:avLst/>
+          </a:prstGeom>
+          <a:noFill/>
+        </p:spPr>
+        <p:txBody>
+          <a:bodyPr wrap="square" rtlCol="0">
+            <a:spAutoFit/>
+          </a:bodyPr>
+          <a:lstStyle/>
+          <a:p>
+            <a:r>
+              <a:rPr lang="fr-CH" sz="2400" b="1" dirty="0"/>
+              <a:t>Dénudage</a:t>
+            </a:r>
+          </a:p>
+        </p:txBody>
+      </p:sp>
+      <p:sp>
+        <p:nvSpPr>
+          <p:cNvPr id="4" name="ZoneTexte 3">
+            <a:extLst>
+              <a:ext uri="{FF2B5EF4-FFF2-40B4-BE49-F238E27FC236}">
+                <a16:creationId xmlns:a16="http://schemas.microsoft.com/office/drawing/2014/main" xmlns="" id="{FBE88C88-B8F1-497D-99A0-7069148CCDE5}"/>
               </a:ext>
             </a:extLst>
           </p:cNvPr>
@@ -14972,7 +15063,7 @@
           <p:cNvPr id="5" name="Image 4">
             <a:extLst>
               <a:ext uri="{FF2B5EF4-FFF2-40B4-BE49-F238E27FC236}">
-                <a16:creationId xmlns:a16="http://schemas.microsoft.com/office/drawing/2014/main" id="{439157CB-1F45-4CE6-A9AB-E46CA4B45337}"/>
+                <a16:creationId xmlns:a16="http://schemas.microsoft.com/office/drawing/2014/main" xmlns="" id="{439157CB-1F45-4CE6-A9AB-E46CA4B45337}"/>
               </a:ext>
             </a:extLst>
           </p:cNvPr>
@@ -15016,7 +15107,7 @@
 </p:sld>
 </file>
 
-<file path=ppt/slides/slide38.xml><?xml version="1.0" encoding="utf-8"?>
+<file path=ppt/slides/slide39.xml><?xml version="1.0" encoding="utf-8"?>
 <p:sld xmlns:a="http://schemas.openxmlformats.org/drawingml/2006/main" xmlns:r="http://schemas.openxmlformats.org/officeDocument/2006/relationships" xmlns:p="http://schemas.openxmlformats.org/presentationml/2006/main">
   <p:cSld>
     <p:spTree>
@@ -15206,7 +15297,7 @@
           <p:cNvPr id="8" name="Groupe 7">
             <a:extLst>
               <a:ext uri="{FF2B5EF4-FFF2-40B4-BE49-F238E27FC236}">
-                <a16:creationId xmlns:a16="http://schemas.microsoft.com/office/drawing/2014/main" id="{45CE9A5B-2BF5-4887-83F2-4BE1643502B9}"/>
+                <a16:creationId xmlns:a16="http://schemas.microsoft.com/office/drawing/2014/main" xmlns="" id="{45CE9A5B-2BF5-4887-83F2-4BE1643502B9}"/>
               </a:ext>
             </a:extLst>
           </p:cNvPr>
@@ -15226,7 +15317,7 @@
             <p:cNvPr id="2" name="Image 1">
               <a:extLst>
                 <a:ext uri="{FF2B5EF4-FFF2-40B4-BE49-F238E27FC236}">
-                  <a16:creationId xmlns:a16="http://schemas.microsoft.com/office/drawing/2014/main" id="{650A4185-1561-4B95-A05D-FEDD73B2D58C}"/>
+                  <a16:creationId xmlns:a16="http://schemas.microsoft.com/office/drawing/2014/main" xmlns="" id="{650A4185-1561-4B95-A05D-FEDD73B2D58C}"/>
                 </a:ext>
               </a:extLst>
             </p:cNvPr>
@@ -15255,7 +15346,7 @@
             <p:cNvPr id="6" name="ZoneTexte 5">
               <a:extLst>
                 <a:ext uri="{FF2B5EF4-FFF2-40B4-BE49-F238E27FC236}">
-                  <a16:creationId xmlns:a16="http://schemas.microsoft.com/office/drawing/2014/main" id="{3CCBC606-F3FD-4F1A-ACB0-51D37C16A945}"/>
+                  <a16:creationId xmlns:a16="http://schemas.microsoft.com/office/drawing/2014/main" xmlns="" id="{3CCBC606-F3FD-4F1A-ACB0-51D37C16A945}"/>
                 </a:ext>
               </a:extLst>
             </p:cNvPr>
@@ -15297,7 +15388,7 @@
           <p:cNvPr id="9" name="Groupe 8">
             <a:extLst>
               <a:ext uri="{FF2B5EF4-FFF2-40B4-BE49-F238E27FC236}">
-                <a16:creationId xmlns:a16="http://schemas.microsoft.com/office/drawing/2014/main" id="{35BF348F-7788-4FD2-B7A6-7B1F65FFCFDA}"/>
+                <a16:creationId xmlns:a16="http://schemas.microsoft.com/office/drawing/2014/main" xmlns="" id="{35BF348F-7788-4FD2-B7A6-7B1F65FFCFDA}"/>
               </a:ext>
             </a:extLst>
           </p:cNvPr>
@@ -15317,7 +15408,7 @@
             <p:cNvPr id="1028" name="Picture 4" descr="https://ieeecs-media.computer.org/wp-media/2018/04/11182850/davidboggs-e1523471453351.jpg">
               <a:extLst>
                 <a:ext uri="{FF2B5EF4-FFF2-40B4-BE49-F238E27FC236}">
-                  <a16:creationId xmlns:a16="http://schemas.microsoft.com/office/drawing/2014/main" id="{26ACF9C1-B83F-407C-9C49-41DED14C035C}"/>
+                  <a16:creationId xmlns:a16="http://schemas.microsoft.com/office/drawing/2014/main" xmlns="" id="{26ACF9C1-B83F-407C-9C49-41DED14C035C}"/>
                 </a:ext>
               </a:extLst>
             </p:cNvPr>
@@ -15362,7 +15453,7 @@
             <p:cNvPr id="10" name="ZoneTexte 9">
               <a:extLst>
                 <a:ext uri="{FF2B5EF4-FFF2-40B4-BE49-F238E27FC236}">
-                  <a16:creationId xmlns:a16="http://schemas.microsoft.com/office/drawing/2014/main" id="{6DBF9C99-3A06-4889-B38A-43FE2DD859D8}"/>
+                  <a16:creationId xmlns:a16="http://schemas.microsoft.com/office/drawing/2014/main" xmlns="" id="{6DBF9C99-3A06-4889-B38A-43FE2DD859D8}"/>
                 </a:ext>
               </a:extLst>
             </p:cNvPr>
@@ -15399,7 +15490,7 @@
           <p:cNvPr id="7" name="ZoneTexte 6">
             <a:extLst>
               <a:ext uri="{FF2B5EF4-FFF2-40B4-BE49-F238E27FC236}">
-                <a16:creationId xmlns:a16="http://schemas.microsoft.com/office/drawing/2014/main" id="{1A93F582-9049-457B-9589-571AD11F982B}"/>
+                <a16:creationId xmlns:a16="http://schemas.microsoft.com/office/drawing/2014/main" xmlns="" id="{1A93F582-9049-457B-9589-571AD11F982B}"/>
               </a:ext>
             </a:extLst>
           </p:cNvPr>
@@ -15434,7 +15525,7 @@
           <p:cNvPr id="11" name="ZoneTexte 10">
             <a:extLst>
               <a:ext uri="{FF2B5EF4-FFF2-40B4-BE49-F238E27FC236}">
-                <a16:creationId xmlns:a16="http://schemas.microsoft.com/office/drawing/2014/main" id="{7785E246-28F5-4FEA-A6C4-269F51F6041C}"/>
+                <a16:creationId xmlns:a16="http://schemas.microsoft.com/office/drawing/2014/main" xmlns="" id="{7785E246-28F5-4FEA-A6C4-269F51F6041C}"/>
               </a:ext>
             </a:extLst>
           </p:cNvPr>
@@ -15964,7 +16055,7 @@
           <p:cNvPr id="11" name="ZoneTexte 10">
             <a:extLst>
               <a:ext uri="{FF2B5EF4-FFF2-40B4-BE49-F238E27FC236}">
-                <a16:creationId xmlns:a16="http://schemas.microsoft.com/office/drawing/2014/main" id="{7785E246-28F5-4FEA-A6C4-269F51F6041C}"/>
+                <a16:creationId xmlns:a16="http://schemas.microsoft.com/office/drawing/2014/main" xmlns="" id="{7785E246-28F5-4FEA-A6C4-269F51F6041C}"/>
               </a:ext>
             </a:extLst>
           </p:cNvPr>
@@ -16046,7 +16137,7 @@
           <p:cNvPr id="14" name="ZoneTexte 13">
             <a:extLst>
               <a:ext uri="{FF2B5EF4-FFF2-40B4-BE49-F238E27FC236}">
-                <a16:creationId xmlns:a16="http://schemas.microsoft.com/office/drawing/2014/main" id="{62641573-ED7D-433D-81BF-0492492F1156}"/>
+                <a16:creationId xmlns:a16="http://schemas.microsoft.com/office/drawing/2014/main" xmlns="" id="{62641573-ED7D-433D-81BF-0492492F1156}"/>
               </a:ext>
             </a:extLst>
           </p:cNvPr>
@@ -16145,7 +16236,7 @@
           <p:cNvPr id="15" name="Content Placeholder 2">
             <a:extLst>
               <a:ext uri="{FF2B5EF4-FFF2-40B4-BE49-F238E27FC236}">
-                <a16:creationId xmlns:a16="http://schemas.microsoft.com/office/drawing/2014/main" id="{714B2A4D-02FA-44D2-923C-DD9509380C18}"/>
+                <a16:creationId xmlns:a16="http://schemas.microsoft.com/office/drawing/2014/main" xmlns="" id="{714B2A4D-02FA-44D2-923C-DD9509380C18}"/>
               </a:ext>
             </a:extLst>
           </p:cNvPr>

</xml_diff>

<commit_message>
Update Module 214 - Fabrication_Ethernet.pptx
</commit_message>
<xml_diff>
--- a/Module 214 - Fabrication_Ethernet.pptx
+++ b/Module 214 - Fabrication_Ethernet.pptx
@@ -40,7 +40,10 @@
     <p:sldId id="264" r:id="rId34"/>
     <p:sldId id="310" r:id="rId35"/>
     <p:sldId id="311" r:id="rId36"/>
-    <p:sldId id="265" r:id="rId37"/>
+    <p:sldId id="315" r:id="rId37"/>
+    <p:sldId id="316" r:id="rId38"/>
+    <p:sldId id="317" r:id="rId39"/>
+    <p:sldId id="265" r:id="rId40"/>
   </p:sldIdLst>
   <p:sldSz cx="12192000" cy="6858000"/>
   <p:notesSz cx="6858000" cy="9144000"/>
@@ -179,6 +182,9 @@
             <p14:sldId id="264"/>
             <p14:sldId id="310"/>
             <p14:sldId id="311"/>
+            <p14:sldId id="315"/>
+            <p14:sldId id="316"/>
+            <p14:sldId id="317"/>
             <p14:sldId id="265"/>
           </p14:sldIdLst>
         </p14:section>
@@ -382,7 +388,7 @@
           <a:p>
             <a:fld id="{D406E69D-613E-4019-8533-7F772451DAA2}" type="datetimeFigureOut">
               <a:rPr lang="fr-CH" smtClean="0"/>
-              <a:t>29.04.2019</a:t>
+              <a:t>02.05.2019</a:t>
             </a:fld>
             <a:endParaRPr lang="fr-CH"/>
           </a:p>
@@ -424,7 +430,7 @@
           <a:p>
             <a:fld id="{CE6FAF98-85C3-4CED-96AD-EC23129ABD35}" type="slidenum">
               <a:rPr lang="fr-CH" smtClean="0"/>
-              <a:t>‹#›</a:t>
+              <a:t>‹N°›</a:t>
             </a:fld>
             <a:endParaRPr lang="fr-CH"/>
           </a:p>
@@ -818,7 +824,7 @@
           <a:p>
             <a:fld id="{D406E69D-613E-4019-8533-7F772451DAA2}" type="datetimeFigureOut">
               <a:rPr lang="fr-CH" smtClean="0"/>
-              <a:t>29.04.2019</a:t>
+              <a:t>02.05.2019</a:t>
             </a:fld>
             <a:endParaRPr lang="fr-CH"/>
           </a:p>
@@ -860,7 +866,7 @@
           <a:p>
             <a:fld id="{CE6FAF98-85C3-4CED-96AD-EC23129ABD35}" type="slidenum">
               <a:rPr lang="fr-CH" smtClean="0"/>
-              <a:t>‹#›</a:t>
+              <a:t>‹N°›</a:t>
             </a:fld>
             <a:endParaRPr lang="fr-CH"/>
           </a:p>
@@ -1068,7 +1074,7 @@
           <a:p>
             <a:fld id="{D406E69D-613E-4019-8533-7F772451DAA2}" type="datetimeFigureOut">
               <a:rPr lang="fr-CH" smtClean="0"/>
-              <a:t>29.04.2019</a:t>
+              <a:t>02.05.2019</a:t>
             </a:fld>
             <a:endParaRPr lang="fr-CH"/>
           </a:p>
@@ -1110,7 +1116,7 @@
           <a:p>
             <a:fld id="{CE6FAF98-85C3-4CED-96AD-EC23129ABD35}" type="slidenum">
               <a:rPr lang="fr-CH" smtClean="0"/>
-              <a:t>‹#›</a:t>
+              <a:t>‹N°›</a:t>
             </a:fld>
             <a:endParaRPr lang="fr-CH"/>
           </a:p>
@@ -1376,7 +1382,7 @@
           <a:p>
             <a:fld id="{D406E69D-613E-4019-8533-7F772451DAA2}" type="datetimeFigureOut">
               <a:rPr lang="fr-CH" smtClean="0"/>
-              <a:t>29.04.2019</a:t>
+              <a:t>02.05.2019</a:t>
             </a:fld>
             <a:endParaRPr lang="fr-CH"/>
           </a:p>
@@ -1418,7 +1424,7 @@
           <a:p>
             <a:fld id="{CE6FAF98-85C3-4CED-96AD-EC23129ABD35}" type="slidenum">
               <a:rPr lang="fr-CH" smtClean="0"/>
-              <a:t>‹#›</a:t>
+              <a:t>‹N°›</a:t>
             </a:fld>
             <a:endParaRPr lang="fr-CH"/>
           </a:p>
@@ -1694,7 +1700,7 @@
           <a:p>
             <a:fld id="{D406E69D-613E-4019-8533-7F772451DAA2}" type="datetimeFigureOut">
               <a:rPr lang="fr-CH" smtClean="0"/>
-              <a:t>29.04.2019</a:t>
+              <a:t>02.05.2019</a:t>
             </a:fld>
             <a:endParaRPr lang="fr-CH"/>
           </a:p>
@@ -1736,7 +1742,7 @@
           <a:p>
             <a:fld id="{CE6FAF98-85C3-4CED-96AD-EC23129ABD35}" type="slidenum">
               <a:rPr lang="fr-CH" smtClean="0"/>
-              <a:t>‹#›</a:t>
+              <a:t>‹N°›</a:t>
             </a:fld>
             <a:endParaRPr lang="fr-CH"/>
           </a:p>
@@ -1996,7 +2002,7 @@
           <a:p>
             <a:fld id="{D406E69D-613E-4019-8533-7F772451DAA2}" type="datetimeFigureOut">
               <a:rPr lang="fr-CH" smtClean="0"/>
-              <a:t>29.04.2019</a:t>
+              <a:t>02.05.2019</a:t>
             </a:fld>
             <a:endParaRPr lang="fr-CH"/>
           </a:p>
@@ -2038,7 +2044,7 @@
           <a:p>
             <a:fld id="{CE6FAF98-85C3-4CED-96AD-EC23129ABD35}" type="slidenum">
               <a:rPr lang="fr-CH" smtClean="0"/>
-              <a:t>‹#›</a:t>
+              <a:t>‹N°›</a:t>
             </a:fld>
             <a:endParaRPr lang="fr-CH"/>
           </a:p>
@@ -2363,7 +2369,7 @@
           <a:p>
             <a:fld id="{D406E69D-613E-4019-8533-7F772451DAA2}" type="datetimeFigureOut">
               <a:rPr lang="fr-CH" smtClean="0"/>
-              <a:t>29.04.2019</a:t>
+              <a:t>02.05.2019</a:t>
             </a:fld>
             <a:endParaRPr lang="fr-CH"/>
           </a:p>
@@ -2405,7 +2411,7 @@
           <a:p>
             <a:fld id="{CE6FAF98-85C3-4CED-96AD-EC23129ABD35}" type="slidenum">
               <a:rPr lang="fr-CH" smtClean="0"/>
-              <a:t>‹#›</a:t>
+              <a:t>‹N°›</a:t>
             </a:fld>
             <a:endParaRPr lang="fr-CH"/>
           </a:p>
@@ -2537,7 +2543,7 @@
           <a:p>
             <a:fld id="{D406E69D-613E-4019-8533-7F772451DAA2}" type="datetimeFigureOut">
               <a:rPr lang="fr-CH" smtClean="0"/>
-              <a:t>29.04.2019</a:t>
+              <a:t>02.05.2019</a:t>
             </a:fld>
             <a:endParaRPr lang="fr-CH"/>
           </a:p>
@@ -2579,7 +2585,7 @@
           <a:p>
             <a:fld id="{CE6FAF98-85C3-4CED-96AD-EC23129ABD35}" type="slidenum">
               <a:rPr lang="fr-CH" smtClean="0"/>
-              <a:t>‹#›</a:t>
+              <a:t>‹N°›</a:t>
             </a:fld>
             <a:endParaRPr lang="fr-CH"/>
           </a:p>
@@ -2717,7 +2723,7 @@
           <a:p>
             <a:fld id="{D406E69D-613E-4019-8533-7F772451DAA2}" type="datetimeFigureOut">
               <a:rPr lang="fr-CH" smtClean="0"/>
-              <a:t>29.04.2019</a:t>
+              <a:t>02.05.2019</a:t>
             </a:fld>
             <a:endParaRPr lang="fr-CH"/>
           </a:p>
@@ -2759,7 +2765,7 @@
           <a:p>
             <a:fld id="{CE6FAF98-85C3-4CED-96AD-EC23129ABD35}" type="slidenum">
               <a:rPr lang="fr-CH" smtClean="0"/>
-              <a:t>‹#›</a:t>
+              <a:t>‹N°›</a:t>
             </a:fld>
             <a:endParaRPr lang="fr-CH"/>
           </a:p>
@@ -2887,7 +2893,7 @@
           <a:p>
             <a:fld id="{D406E69D-613E-4019-8533-7F772451DAA2}" type="datetimeFigureOut">
               <a:rPr lang="fr-CH" smtClean="0"/>
-              <a:t>29.04.2019</a:t>
+              <a:t>02.05.2019</a:t>
             </a:fld>
             <a:endParaRPr lang="fr-CH"/>
           </a:p>
@@ -2929,7 +2935,7 @@
           <a:p>
             <a:fld id="{CE6FAF98-85C3-4CED-96AD-EC23129ABD35}" type="slidenum">
               <a:rPr lang="fr-CH" smtClean="0"/>
-              <a:t>‹#›</a:t>
+              <a:t>‹N°›</a:t>
             </a:fld>
             <a:endParaRPr lang="fr-CH"/>
           </a:p>
@@ -3137,7 +3143,7 @@
           <a:p>
             <a:fld id="{D406E69D-613E-4019-8533-7F772451DAA2}" type="datetimeFigureOut">
               <a:rPr lang="fr-CH" smtClean="0"/>
-              <a:t>29.04.2019</a:t>
+              <a:t>02.05.2019</a:t>
             </a:fld>
             <a:endParaRPr lang="fr-CH"/>
           </a:p>
@@ -3179,7 +3185,7 @@
           <a:p>
             <a:fld id="{CE6FAF98-85C3-4CED-96AD-EC23129ABD35}" type="slidenum">
               <a:rPr lang="fr-CH" smtClean="0"/>
-              <a:t>‹#›</a:t>
+              <a:t>‹N°›</a:t>
             </a:fld>
             <a:endParaRPr lang="fr-CH"/>
           </a:p>
@@ -3373,7 +3379,7 @@
           <a:p>
             <a:fld id="{D406E69D-613E-4019-8533-7F772451DAA2}" type="datetimeFigureOut">
               <a:rPr lang="fr-CH" smtClean="0"/>
-              <a:t>29.04.2019</a:t>
+              <a:t>02.05.2019</a:t>
             </a:fld>
             <a:endParaRPr lang="fr-CH"/>
           </a:p>
@@ -3415,7 +3421,7 @@
           <a:p>
             <a:fld id="{CE6FAF98-85C3-4CED-96AD-EC23129ABD35}" type="slidenum">
               <a:rPr lang="fr-CH" smtClean="0"/>
-              <a:t>‹#›</a:t>
+              <a:t>‹N°›</a:t>
             </a:fld>
             <a:endParaRPr lang="fr-CH"/>
           </a:p>
@@ -3755,7 +3761,7 @@
           <a:p>
             <a:fld id="{D406E69D-613E-4019-8533-7F772451DAA2}" type="datetimeFigureOut">
               <a:rPr lang="fr-CH" smtClean="0"/>
-              <a:t>29.04.2019</a:t>
+              <a:t>02.05.2019</a:t>
             </a:fld>
             <a:endParaRPr lang="fr-CH"/>
           </a:p>
@@ -3797,7 +3803,7 @@
           <a:p>
             <a:fld id="{CE6FAF98-85C3-4CED-96AD-EC23129ABD35}" type="slidenum">
               <a:rPr lang="fr-CH" smtClean="0"/>
-              <a:t>‹#›</a:t>
+              <a:t>‹N°›</a:t>
             </a:fld>
             <a:endParaRPr lang="fr-CH"/>
           </a:p>
@@ -3873,7 +3879,7 @@
           <a:p>
             <a:fld id="{D406E69D-613E-4019-8533-7F772451DAA2}" type="datetimeFigureOut">
               <a:rPr lang="fr-CH" smtClean="0"/>
-              <a:t>29.04.2019</a:t>
+              <a:t>02.05.2019</a:t>
             </a:fld>
             <a:endParaRPr lang="fr-CH"/>
           </a:p>
@@ -3915,7 +3921,7 @@
           <a:p>
             <a:fld id="{CE6FAF98-85C3-4CED-96AD-EC23129ABD35}" type="slidenum">
               <a:rPr lang="fr-CH" smtClean="0"/>
-              <a:t>‹#›</a:t>
+              <a:t>‹N°›</a:t>
             </a:fld>
             <a:endParaRPr lang="fr-CH"/>
           </a:p>
@@ -3968,7 +3974,7 @@
           <a:p>
             <a:fld id="{D406E69D-613E-4019-8533-7F772451DAA2}" type="datetimeFigureOut">
               <a:rPr lang="fr-CH" smtClean="0"/>
-              <a:t>29.04.2019</a:t>
+              <a:t>02.05.2019</a:t>
             </a:fld>
             <a:endParaRPr lang="fr-CH"/>
           </a:p>
@@ -4010,7 +4016,7 @@
           <a:p>
             <a:fld id="{CE6FAF98-85C3-4CED-96AD-EC23129ABD35}" type="slidenum">
               <a:rPr lang="fr-CH" smtClean="0"/>
-              <a:t>‹#›</a:t>
+              <a:t>‹N°›</a:t>
             </a:fld>
             <a:endParaRPr lang="fr-CH"/>
           </a:p>
@@ -4223,7 +4229,7 @@
           <a:p>
             <a:fld id="{D406E69D-613E-4019-8533-7F772451DAA2}" type="datetimeFigureOut">
               <a:rPr lang="fr-CH" smtClean="0"/>
-              <a:t>29.04.2019</a:t>
+              <a:t>02.05.2019</a:t>
             </a:fld>
             <a:endParaRPr lang="fr-CH"/>
           </a:p>
@@ -4265,7 +4271,7 @@
           <a:p>
             <a:fld id="{CE6FAF98-85C3-4CED-96AD-EC23129ABD35}" type="slidenum">
               <a:rPr lang="fr-CH" smtClean="0"/>
-              <a:t>‹#›</a:t>
+              <a:t>‹N°›</a:t>
             </a:fld>
             <a:endParaRPr lang="fr-CH"/>
           </a:p>
@@ -4506,7 +4512,7 @@
           <a:p>
             <a:fld id="{D406E69D-613E-4019-8533-7F772451DAA2}" type="datetimeFigureOut">
               <a:rPr lang="fr-CH" smtClean="0"/>
-              <a:t>29.04.2019</a:t>
+              <a:t>02.05.2019</a:t>
             </a:fld>
             <a:endParaRPr lang="fr-CH"/>
           </a:p>
@@ -4548,7 +4554,7 @@
           <a:p>
             <a:fld id="{CE6FAF98-85C3-4CED-96AD-EC23129ABD35}" type="slidenum">
               <a:rPr lang="fr-CH" smtClean="0"/>
-              <a:t>‹#›</a:t>
+              <a:t>‹N°›</a:t>
             </a:fld>
             <a:endParaRPr lang="fr-CH"/>
           </a:p>
@@ -4912,7 +4918,7 @@
           <a:p>
             <a:fld id="{D406E69D-613E-4019-8533-7F772451DAA2}" type="datetimeFigureOut">
               <a:rPr lang="fr-CH" smtClean="0"/>
-              <a:t>29.04.2019</a:t>
+              <a:t>02.05.2019</a:t>
             </a:fld>
             <a:endParaRPr lang="fr-CH"/>
           </a:p>
@@ -4994,7 +5000,7 @@
           <a:p>
             <a:fld id="{CE6FAF98-85C3-4CED-96AD-EC23129ABD35}" type="slidenum">
               <a:rPr lang="fr-CH" smtClean="0"/>
-              <a:t>‹#›</a:t>
+              <a:t>‹N°›</a:t>
             </a:fld>
             <a:endParaRPr lang="fr-CH"/>
           </a:p>
@@ -9140,7 +9146,7 @@
           <p:cNvPr id="5" name="Content Placeholder 2">
             <a:extLst>
               <a:ext uri="{FF2B5EF4-FFF2-40B4-BE49-F238E27FC236}">
-                <a16:creationId xmlns:a16="http://schemas.microsoft.com/office/drawing/2014/main" xmlns="" id="{F8CDF8D4-22A3-4F52-B3A1-BDF90524C006}"/>
+                <a16:creationId xmlns:a16="http://schemas.microsoft.com/office/drawing/2014/main" id="{F8CDF8D4-22A3-4F52-B3A1-BDF90524C006}"/>
               </a:ext>
             </a:extLst>
           </p:cNvPr>
@@ -9407,7 +9413,7 @@
           <p:cNvPr id="6" name="Content Placeholder 2">
             <a:extLst>
               <a:ext uri="{FF2B5EF4-FFF2-40B4-BE49-F238E27FC236}">
-                <a16:creationId xmlns:a16="http://schemas.microsoft.com/office/drawing/2014/main" xmlns="" id="{8D58F6CE-D1F4-48B3-95BD-E6A6BBA27883}"/>
+                <a16:creationId xmlns:a16="http://schemas.microsoft.com/office/drawing/2014/main" id="{8D58F6CE-D1F4-48B3-95BD-E6A6BBA27883}"/>
               </a:ext>
             </a:extLst>
           </p:cNvPr>
@@ -10105,7 +10111,7 @@
           <p:cNvPr id="4" name="Title 1">
             <a:extLst>
               <a:ext uri="{FF2B5EF4-FFF2-40B4-BE49-F238E27FC236}">
-                <a16:creationId xmlns:a16="http://schemas.microsoft.com/office/drawing/2014/main" xmlns="" id="{02619F9C-EB8C-47C2-8D51-281BE6C9E803}"/>
+                <a16:creationId xmlns:a16="http://schemas.microsoft.com/office/drawing/2014/main" id="{02619F9C-EB8C-47C2-8D51-281BE6C9E803}"/>
               </a:ext>
             </a:extLst>
           </p:cNvPr>
@@ -10218,7 +10224,7 @@
           <p:cNvPr id="9" name="Image 8">
             <a:extLst>
               <a:ext uri="{FF2B5EF4-FFF2-40B4-BE49-F238E27FC236}">
-                <a16:creationId xmlns:a16="http://schemas.microsoft.com/office/drawing/2014/main" xmlns="" id="{581026FC-1090-4023-909F-15FCFF27EEA7}"/>
+                <a16:creationId xmlns:a16="http://schemas.microsoft.com/office/drawing/2014/main" id="{581026FC-1090-4023-909F-15FCFF27EEA7}"/>
               </a:ext>
             </a:extLst>
           </p:cNvPr>
@@ -10278,7 +10284,7 @@
           <p:cNvPr id="4" name="Title 1">
             <a:extLst>
               <a:ext uri="{FF2B5EF4-FFF2-40B4-BE49-F238E27FC236}">
-                <a16:creationId xmlns:a16="http://schemas.microsoft.com/office/drawing/2014/main" xmlns="" id="{02619F9C-EB8C-47C2-8D51-281BE6C9E803}"/>
+                <a16:creationId xmlns:a16="http://schemas.microsoft.com/office/drawing/2014/main" id="{02619F9C-EB8C-47C2-8D51-281BE6C9E803}"/>
               </a:ext>
             </a:extLst>
           </p:cNvPr>
@@ -10391,7 +10397,7 @@
           <p:cNvPr id="2" name="ZoneTexte 1">
             <a:extLst>
               <a:ext uri="{FF2B5EF4-FFF2-40B4-BE49-F238E27FC236}">
-                <a16:creationId xmlns:a16="http://schemas.microsoft.com/office/drawing/2014/main" xmlns="" id="{08E408DC-C551-47B5-8C33-FA0FF463FB0C}"/>
+                <a16:creationId xmlns:a16="http://schemas.microsoft.com/office/drawing/2014/main" id="{08E408DC-C551-47B5-8C33-FA0FF463FB0C}"/>
               </a:ext>
             </a:extLst>
           </p:cNvPr>
@@ -10431,7 +10437,7 @@
           <p:cNvPr id="5" name="Picture 14" descr="C:\Users\wmeisen\AppData\Local\Microsoft\Windows\INetCache\Content.MSO\A42E0746.tmp">
             <a:extLst>
               <a:ext uri="{FF2B5EF4-FFF2-40B4-BE49-F238E27FC236}">
-                <a16:creationId xmlns:a16="http://schemas.microsoft.com/office/drawing/2014/main" xmlns="" id="{DB87F8D8-06EF-4D76-BC3D-CB6B00B6B72E}"/>
+                <a16:creationId xmlns:a16="http://schemas.microsoft.com/office/drawing/2014/main" id="{DB87F8D8-06EF-4D76-BC3D-CB6B00B6B72E}"/>
               </a:ext>
             </a:extLst>
           </p:cNvPr>
@@ -10500,7 +10506,7 @@
           <p:cNvPr id="4" name="Title 1">
             <a:extLst>
               <a:ext uri="{FF2B5EF4-FFF2-40B4-BE49-F238E27FC236}">
-                <a16:creationId xmlns:a16="http://schemas.microsoft.com/office/drawing/2014/main" xmlns="" id="{02619F9C-EB8C-47C2-8D51-281BE6C9E803}"/>
+                <a16:creationId xmlns:a16="http://schemas.microsoft.com/office/drawing/2014/main" id="{02619F9C-EB8C-47C2-8D51-281BE6C9E803}"/>
               </a:ext>
             </a:extLst>
           </p:cNvPr>
@@ -10613,7 +10619,7 @@
           <p:cNvPr id="2" name="ZoneTexte 1">
             <a:extLst>
               <a:ext uri="{FF2B5EF4-FFF2-40B4-BE49-F238E27FC236}">
-                <a16:creationId xmlns:a16="http://schemas.microsoft.com/office/drawing/2014/main" xmlns="" id="{08E408DC-C551-47B5-8C33-FA0FF463FB0C}"/>
+                <a16:creationId xmlns:a16="http://schemas.microsoft.com/office/drawing/2014/main" id="{08E408DC-C551-47B5-8C33-FA0FF463FB0C}"/>
               </a:ext>
             </a:extLst>
           </p:cNvPr>
@@ -10653,7 +10659,7 @@
           <p:cNvPr id="6" name="Picture 16" descr="RÃ©sultat de recherche d'images pour &quot;paire torsadÃ©e F/UTP&quot;">
             <a:extLst>
               <a:ext uri="{FF2B5EF4-FFF2-40B4-BE49-F238E27FC236}">
-                <a16:creationId xmlns:a16="http://schemas.microsoft.com/office/drawing/2014/main" xmlns="" id="{2BCB4FA7-7321-47D4-A2CA-C79743355770}"/>
+                <a16:creationId xmlns:a16="http://schemas.microsoft.com/office/drawing/2014/main" id="{2BCB4FA7-7321-47D4-A2CA-C79743355770}"/>
               </a:ext>
             </a:extLst>
           </p:cNvPr>
@@ -10722,7 +10728,7 @@
           <p:cNvPr id="4" name="Title 1">
             <a:extLst>
               <a:ext uri="{FF2B5EF4-FFF2-40B4-BE49-F238E27FC236}">
-                <a16:creationId xmlns:a16="http://schemas.microsoft.com/office/drawing/2014/main" xmlns="" id="{02619F9C-EB8C-47C2-8D51-281BE6C9E803}"/>
+                <a16:creationId xmlns:a16="http://schemas.microsoft.com/office/drawing/2014/main" id="{02619F9C-EB8C-47C2-8D51-281BE6C9E803}"/>
               </a:ext>
             </a:extLst>
           </p:cNvPr>
@@ -10835,7 +10841,7 @@
           <p:cNvPr id="2" name="ZoneTexte 1">
             <a:extLst>
               <a:ext uri="{FF2B5EF4-FFF2-40B4-BE49-F238E27FC236}">
-                <a16:creationId xmlns:a16="http://schemas.microsoft.com/office/drawing/2014/main" xmlns="" id="{08E408DC-C551-47B5-8C33-FA0FF463FB0C}"/>
+                <a16:creationId xmlns:a16="http://schemas.microsoft.com/office/drawing/2014/main" id="{08E408DC-C551-47B5-8C33-FA0FF463FB0C}"/>
               </a:ext>
             </a:extLst>
           </p:cNvPr>
@@ -10884,7 +10890,7 @@
           <p:cNvPr id="5" name="Picture 17" descr="RÃ©sultat de recherche d'images pour &quot;paire torsadÃ©e U/FTP&quot;">
             <a:extLst>
               <a:ext uri="{FF2B5EF4-FFF2-40B4-BE49-F238E27FC236}">
-                <a16:creationId xmlns:a16="http://schemas.microsoft.com/office/drawing/2014/main" xmlns="" id="{C285CD3B-FCE6-4B9F-ADED-4D7689EB7309}"/>
+                <a16:creationId xmlns:a16="http://schemas.microsoft.com/office/drawing/2014/main" id="{C285CD3B-FCE6-4B9F-ADED-4D7689EB7309}"/>
               </a:ext>
             </a:extLst>
           </p:cNvPr>
@@ -10953,7 +10959,7 @@
           <p:cNvPr id="4" name="Title 1">
             <a:extLst>
               <a:ext uri="{FF2B5EF4-FFF2-40B4-BE49-F238E27FC236}">
-                <a16:creationId xmlns:a16="http://schemas.microsoft.com/office/drawing/2014/main" xmlns="" id="{02619F9C-EB8C-47C2-8D51-281BE6C9E803}"/>
+                <a16:creationId xmlns:a16="http://schemas.microsoft.com/office/drawing/2014/main" id="{02619F9C-EB8C-47C2-8D51-281BE6C9E803}"/>
               </a:ext>
             </a:extLst>
           </p:cNvPr>
@@ -11066,7 +11072,7 @@
           <p:cNvPr id="2" name="ZoneTexte 1">
             <a:extLst>
               <a:ext uri="{FF2B5EF4-FFF2-40B4-BE49-F238E27FC236}">
-                <a16:creationId xmlns:a16="http://schemas.microsoft.com/office/drawing/2014/main" xmlns="" id="{08E408DC-C551-47B5-8C33-FA0FF463FB0C}"/>
+                <a16:creationId xmlns:a16="http://schemas.microsoft.com/office/drawing/2014/main" id="{08E408DC-C551-47B5-8C33-FA0FF463FB0C}"/>
               </a:ext>
             </a:extLst>
           </p:cNvPr>
@@ -11115,7 +11121,7 @@
           <p:cNvPr id="6" name="Picture 18" descr="RÃ©sultat de recherche d'images pour &quot;paire torsadÃ©e U/FTP&quot;">
             <a:extLst>
               <a:ext uri="{FF2B5EF4-FFF2-40B4-BE49-F238E27FC236}">
-                <a16:creationId xmlns:a16="http://schemas.microsoft.com/office/drawing/2014/main" xmlns="" id="{9D8E18DB-E786-4429-9285-47D633DE094F}"/>
+                <a16:creationId xmlns:a16="http://schemas.microsoft.com/office/drawing/2014/main" id="{9D8E18DB-E786-4429-9285-47D633DE094F}"/>
               </a:ext>
             </a:extLst>
           </p:cNvPr>
@@ -11184,7 +11190,7 @@
           <p:cNvPr id="4" name="Title 1">
             <a:extLst>
               <a:ext uri="{FF2B5EF4-FFF2-40B4-BE49-F238E27FC236}">
-                <a16:creationId xmlns:a16="http://schemas.microsoft.com/office/drawing/2014/main" xmlns="" id="{02619F9C-EB8C-47C2-8D51-281BE6C9E803}"/>
+                <a16:creationId xmlns:a16="http://schemas.microsoft.com/office/drawing/2014/main" id="{02619F9C-EB8C-47C2-8D51-281BE6C9E803}"/>
               </a:ext>
             </a:extLst>
           </p:cNvPr>
@@ -11297,7 +11303,7 @@
           <p:cNvPr id="2" name="ZoneTexte 1">
             <a:extLst>
               <a:ext uri="{FF2B5EF4-FFF2-40B4-BE49-F238E27FC236}">
-                <a16:creationId xmlns:a16="http://schemas.microsoft.com/office/drawing/2014/main" xmlns="" id="{08E408DC-C551-47B5-8C33-FA0FF463FB0C}"/>
+                <a16:creationId xmlns:a16="http://schemas.microsoft.com/office/drawing/2014/main" id="{08E408DC-C551-47B5-8C33-FA0FF463FB0C}"/>
               </a:ext>
             </a:extLst>
           </p:cNvPr>
@@ -11346,7 +11352,7 @@
           <p:cNvPr id="5" name="Picture 19">
             <a:extLst>
               <a:ext uri="{FF2B5EF4-FFF2-40B4-BE49-F238E27FC236}">
-                <a16:creationId xmlns:a16="http://schemas.microsoft.com/office/drawing/2014/main" xmlns="" id="{13636A98-632D-420B-8319-4B91165B5181}"/>
+                <a16:creationId xmlns:a16="http://schemas.microsoft.com/office/drawing/2014/main" id="{13636A98-632D-420B-8319-4B91165B5181}"/>
               </a:ext>
             </a:extLst>
           </p:cNvPr>
@@ -11417,7 +11423,7 @@
           <p:cNvPr id="4" name="Title 1">
             <a:extLst>
               <a:ext uri="{FF2B5EF4-FFF2-40B4-BE49-F238E27FC236}">
-                <a16:creationId xmlns:a16="http://schemas.microsoft.com/office/drawing/2014/main" xmlns="" id="{02619F9C-EB8C-47C2-8D51-281BE6C9E803}"/>
+                <a16:creationId xmlns:a16="http://schemas.microsoft.com/office/drawing/2014/main" id="{02619F9C-EB8C-47C2-8D51-281BE6C9E803}"/>
               </a:ext>
             </a:extLst>
           </p:cNvPr>
@@ -11530,7 +11536,7 @@
           <p:cNvPr id="2" name="ZoneTexte 1">
             <a:extLst>
               <a:ext uri="{FF2B5EF4-FFF2-40B4-BE49-F238E27FC236}">
-                <a16:creationId xmlns:a16="http://schemas.microsoft.com/office/drawing/2014/main" xmlns="" id="{08E408DC-C551-47B5-8C33-FA0FF463FB0C}"/>
+                <a16:creationId xmlns:a16="http://schemas.microsoft.com/office/drawing/2014/main" id="{08E408DC-C551-47B5-8C33-FA0FF463FB0C}"/>
               </a:ext>
             </a:extLst>
           </p:cNvPr>
@@ -11579,7 +11585,7 @@
           <p:cNvPr id="6" name="Picture 20">
             <a:extLst>
               <a:ext uri="{FF2B5EF4-FFF2-40B4-BE49-F238E27FC236}">
-                <a16:creationId xmlns:a16="http://schemas.microsoft.com/office/drawing/2014/main" xmlns="" id="{C7598FC5-56B3-45F2-AD6E-4CFF22FFEDAE}"/>
+                <a16:creationId xmlns:a16="http://schemas.microsoft.com/office/drawing/2014/main" id="{C7598FC5-56B3-45F2-AD6E-4CFF22FFEDAE}"/>
               </a:ext>
             </a:extLst>
           </p:cNvPr>
@@ -12904,7 +12910,7 @@
           <p:cNvPr id="2" name="ZoneTexte 1">
             <a:extLst>
               <a:ext uri="{FF2B5EF4-FFF2-40B4-BE49-F238E27FC236}">
-                <a16:creationId xmlns:a16="http://schemas.microsoft.com/office/drawing/2014/main" xmlns="" id="{A35CA12C-1266-4CF7-B4FA-9BCC04FF0A7A}"/>
+                <a16:creationId xmlns:a16="http://schemas.microsoft.com/office/drawing/2014/main" id="{A35CA12C-1266-4CF7-B4FA-9BCC04FF0A7A}"/>
               </a:ext>
             </a:extLst>
           </p:cNvPr>
@@ -12955,7 +12961,7 @@
           <p:cNvPr id="3" name="ZoneTexte 2">
             <a:extLst>
               <a:ext uri="{FF2B5EF4-FFF2-40B4-BE49-F238E27FC236}">
-                <a16:creationId xmlns:a16="http://schemas.microsoft.com/office/drawing/2014/main" xmlns="" id="{A87DECA1-1134-4B40-9A37-999B0F16999A}"/>
+                <a16:creationId xmlns:a16="http://schemas.microsoft.com/office/drawing/2014/main" id="{A87DECA1-1134-4B40-9A37-999B0F16999A}"/>
               </a:ext>
             </a:extLst>
           </p:cNvPr>
@@ -12990,7 +12996,7 @@
           <p:cNvPr id="4" name="ZoneTexte 3">
             <a:extLst>
               <a:ext uri="{FF2B5EF4-FFF2-40B4-BE49-F238E27FC236}">
-                <a16:creationId xmlns:a16="http://schemas.microsoft.com/office/drawing/2014/main" xmlns="" id="{4484CECE-1614-4AEE-A3E5-0B7519852559}"/>
+                <a16:creationId xmlns:a16="http://schemas.microsoft.com/office/drawing/2014/main" id="{4484CECE-1614-4AEE-A3E5-0B7519852559}"/>
               </a:ext>
             </a:extLst>
           </p:cNvPr>
@@ -13027,7 +13033,7 @@
           <p:cNvPr id="9" name="Groupe 8">
             <a:extLst>
               <a:ext uri="{FF2B5EF4-FFF2-40B4-BE49-F238E27FC236}">
-                <a16:creationId xmlns:a16="http://schemas.microsoft.com/office/drawing/2014/main" xmlns="" id="{23D82E5C-A968-44F6-8506-2728DD4691EC}"/>
+                <a16:creationId xmlns:a16="http://schemas.microsoft.com/office/drawing/2014/main" id="{23D82E5C-A968-44F6-8506-2728DD4691EC}"/>
               </a:ext>
             </a:extLst>
           </p:cNvPr>
@@ -13047,7 +13053,7 @@
             <p:cNvPr id="7" name="Rectangle 6">
               <a:extLst>
                 <a:ext uri="{FF2B5EF4-FFF2-40B4-BE49-F238E27FC236}">
-                  <a16:creationId xmlns:a16="http://schemas.microsoft.com/office/drawing/2014/main" xmlns="" id="{9916E7EC-0F54-4B06-88D6-BC6EA432DDDE}"/>
+                  <a16:creationId xmlns:a16="http://schemas.microsoft.com/office/drawing/2014/main" id="{9916E7EC-0F54-4B06-88D6-BC6EA432DDDE}"/>
                 </a:ext>
               </a:extLst>
             </p:cNvPr>
@@ -13102,7 +13108,7 @@
             <p:cNvPr id="8" name="ZoneTexte 7">
               <a:extLst>
                 <a:ext uri="{FF2B5EF4-FFF2-40B4-BE49-F238E27FC236}">
-                  <a16:creationId xmlns:a16="http://schemas.microsoft.com/office/drawing/2014/main" xmlns="" id="{D91180B7-05B4-4F84-BBE4-1ABBF07A8C2A}"/>
+                  <a16:creationId xmlns:a16="http://schemas.microsoft.com/office/drawing/2014/main" id="{D91180B7-05B4-4F84-BBE4-1ABBF07A8C2A}"/>
                 </a:ext>
               </a:extLst>
             </p:cNvPr>
@@ -13154,7 +13160,7 @@
           <p:cNvPr id="10" name="Groupe 9">
             <a:extLst>
               <a:ext uri="{FF2B5EF4-FFF2-40B4-BE49-F238E27FC236}">
-                <a16:creationId xmlns:a16="http://schemas.microsoft.com/office/drawing/2014/main" xmlns="" id="{465546DD-A06A-4710-95C0-C71CCAD0287A}"/>
+                <a16:creationId xmlns:a16="http://schemas.microsoft.com/office/drawing/2014/main" id="{465546DD-A06A-4710-95C0-C71CCAD0287A}"/>
               </a:ext>
             </a:extLst>
           </p:cNvPr>
@@ -13174,7 +13180,7 @@
             <p:cNvPr id="11" name="Rectangle 10">
               <a:extLst>
                 <a:ext uri="{FF2B5EF4-FFF2-40B4-BE49-F238E27FC236}">
-                  <a16:creationId xmlns:a16="http://schemas.microsoft.com/office/drawing/2014/main" xmlns="" id="{91B49790-0484-4C5B-A768-A3CEE69E7730}"/>
+                  <a16:creationId xmlns:a16="http://schemas.microsoft.com/office/drawing/2014/main" id="{91B49790-0484-4C5B-A768-A3CEE69E7730}"/>
                 </a:ext>
               </a:extLst>
             </p:cNvPr>
@@ -13213,7 +13219,7 @@
             <p:cNvPr id="12" name="ZoneTexte 11">
               <a:extLst>
                 <a:ext uri="{FF2B5EF4-FFF2-40B4-BE49-F238E27FC236}">
-                  <a16:creationId xmlns:a16="http://schemas.microsoft.com/office/drawing/2014/main" xmlns="" id="{CE58D107-D557-4FAB-855F-DF42D305D917}"/>
+                  <a16:creationId xmlns:a16="http://schemas.microsoft.com/office/drawing/2014/main" id="{CE58D107-D557-4FAB-855F-DF42D305D917}"/>
                 </a:ext>
               </a:extLst>
             </p:cNvPr>
@@ -13383,7 +13389,7 @@
           <p:cNvPr id="14" name="ZoneTexte 13">
             <a:extLst>
               <a:ext uri="{FF2B5EF4-FFF2-40B4-BE49-F238E27FC236}">
-                <a16:creationId xmlns:a16="http://schemas.microsoft.com/office/drawing/2014/main" xmlns="" id="{DCFCBA6D-32BF-45B9-913E-FC03E263FEB7}"/>
+                <a16:creationId xmlns:a16="http://schemas.microsoft.com/office/drawing/2014/main" id="{DCFCBA6D-32BF-45B9-913E-FC03E263FEB7}"/>
               </a:ext>
             </a:extLst>
           </p:cNvPr>
@@ -13420,7 +13426,7 @@
           <p:cNvPr id="15" name="ZoneTexte 14">
             <a:extLst>
               <a:ext uri="{FF2B5EF4-FFF2-40B4-BE49-F238E27FC236}">
-                <a16:creationId xmlns:a16="http://schemas.microsoft.com/office/drawing/2014/main" xmlns="" id="{6335B29D-0CD6-4CAA-B965-93BCC03492D8}"/>
+                <a16:creationId xmlns:a16="http://schemas.microsoft.com/office/drawing/2014/main" id="{6335B29D-0CD6-4CAA-B965-93BCC03492D8}"/>
               </a:ext>
             </a:extLst>
           </p:cNvPr>
@@ -13455,7 +13461,7 @@
           <p:cNvPr id="16" name="Rectangle 15">
             <a:extLst>
               <a:ext uri="{FF2B5EF4-FFF2-40B4-BE49-F238E27FC236}">
-                <a16:creationId xmlns:a16="http://schemas.microsoft.com/office/drawing/2014/main" xmlns="" id="{598DB639-CD18-4A74-9FFE-C44EB01149A7}"/>
+                <a16:creationId xmlns:a16="http://schemas.microsoft.com/office/drawing/2014/main" id="{598DB639-CD18-4A74-9FFE-C44EB01149A7}"/>
               </a:ext>
             </a:extLst>
           </p:cNvPr>
@@ -13575,7 +13581,7 @@
           <p:cNvPr id="2" name="Titre 1">
             <a:extLst>
               <a:ext uri="{FF2B5EF4-FFF2-40B4-BE49-F238E27FC236}">
-                <a16:creationId xmlns:a16="http://schemas.microsoft.com/office/drawing/2014/main" xmlns="" id="{42B1C103-5438-4ED4-9DC3-64DAD3FD626E}"/>
+                <a16:creationId xmlns:a16="http://schemas.microsoft.com/office/drawing/2014/main" id="{42B1C103-5438-4ED4-9DC3-64DAD3FD626E}"/>
               </a:ext>
             </a:extLst>
           </p:cNvPr>
@@ -13600,7 +13606,7 @@
           <p:cNvPr id="3" name="Espace réservé du contenu 2">
             <a:extLst>
               <a:ext uri="{FF2B5EF4-FFF2-40B4-BE49-F238E27FC236}">
-                <a16:creationId xmlns:a16="http://schemas.microsoft.com/office/drawing/2014/main" xmlns="" id="{3BB66C46-EE36-4F98-8862-5AD66F47ABF5}"/>
+                <a16:creationId xmlns:a16="http://schemas.microsoft.com/office/drawing/2014/main" id="{3BB66C46-EE36-4F98-8862-5AD66F47ABF5}"/>
               </a:ext>
             </a:extLst>
           </p:cNvPr>
@@ -13692,7 +13698,7 @@
           <p:cNvPr id="2" name="ZoneTexte 1">
             <a:extLst>
               <a:ext uri="{FF2B5EF4-FFF2-40B4-BE49-F238E27FC236}">
-                <a16:creationId xmlns:a16="http://schemas.microsoft.com/office/drawing/2014/main" xmlns="" id="{95A71DAD-C760-4FB1-9A97-CB83FC9A6215}"/>
+                <a16:creationId xmlns:a16="http://schemas.microsoft.com/office/drawing/2014/main" id="{95A71DAD-C760-4FB1-9A97-CB83FC9A6215}"/>
               </a:ext>
             </a:extLst>
           </p:cNvPr>
@@ -13727,7 +13733,7 @@
           <p:cNvPr id="4" name="ZoneTexte 3">
             <a:extLst>
               <a:ext uri="{FF2B5EF4-FFF2-40B4-BE49-F238E27FC236}">
-                <a16:creationId xmlns:a16="http://schemas.microsoft.com/office/drawing/2014/main" xmlns="" id="{FBE88C88-B8F1-497D-99A0-7069148CCDE5}"/>
+                <a16:creationId xmlns:a16="http://schemas.microsoft.com/office/drawing/2014/main" id="{FBE88C88-B8F1-497D-99A0-7069148CCDE5}"/>
               </a:ext>
             </a:extLst>
           </p:cNvPr>
@@ -13902,7 +13908,7 @@
           <p:cNvPr id="2" name="ZoneTexte 1">
             <a:extLst>
               <a:ext uri="{FF2B5EF4-FFF2-40B4-BE49-F238E27FC236}">
-                <a16:creationId xmlns:a16="http://schemas.microsoft.com/office/drawing/2014/main" xmlns="" id="{95A71DAD-C760-4FB1-9A97-CB83FC9A6215}"/>
+                <a16:creationId xmlns:a16="http://schemas.microsoft.com/office/drawing/2014/main" id="{95A71DAD-C760-4FB1-9A97-CB83FC9A6215}"/>
               </a:ext>
             </a:extLst>
           </p:cNvPr>
@@ -13937,7 +13943,7 @@
           <p:cNvPr id="4" name="ZoneTexte 3">
             <a:extLst>
               <a:ext uri="{FF2B5EF4-FFF2-40B4-BE49-F238E27FC236}">
-                <a16:creationId xmlns:a16="http://schemas.microsoft.com/office/drawing/2014/main" xmlns="" id="{FBE88C88-B8F1-497D-99A0-7069148CCDE5}"/>
+                <a16:creationId xmlns:a16="http://schemas.microsoft.com/office/drawing/2014/main" id="{FBE88C88-B8F1-497D-99A0-7069148CCDE5}"/>
               </a:ext>
             </a:extLst>
           </p:cNvPr>
@@ -14048,7 +14054,7 @@
           <p:cNvPr id="2" name="ZoneTexte 1">
             <a:extLst>
               <a:ext uri="{FF2B5EF4-FFF2-40B4-BE49-F238E27FC236}">
-                <a16:creationId xmlns:a16="http://schemas.microsoft.com/office/drawing/2014/main" xmlns="" id="{95A71DAD-C760-4FB1-9A97-CB83FC9A6215}"/>
+                <a16:creationId xmlns:a16="http://schemas.microsoft.com/office/drawing/2014/main" id="{95A71DAD-C760-4FB1-9A97-CB83FC9A6215}"/>
               </a:ext>
             </a:extLst>
           </p:cNvPr>
@@ -14083,7 +14089,7 @@
           <p:cNvPr id="4" name="ZoneTexte 3">
             <a:extLst>
               <a:ext uri="{FF2B5EF4-FFF2-40B4-BE49-F238E27FC236}">
-                <a16:creationId xmlns:a16="http://schemas.microsoft.com/office/drawing/2014/main" xmlns="" id="{FBE88C88-B8F1-497D-99A0-7069148CCDE5}"/>
+                <a16:creationId xmlns:a16="http://schemas.microsoft.com/office/drawing/2014/main" id="{FBE88C88-B8F1-497D-99A0-7069148CCDE5}"/>
               </a:ext>
             </a:extLst>
           </p:cNvPr>
@@ -14118,7 +14124,7 @@
           <p:cNvPr id="5" name="Image 4">
             <a:extLst>
               <a:ext uri="{FF2B5EF4-FFF2-40B4-BE49-F238E27FC236}">
-                <a16:creationId xmlns:a16="http://schemas.microsoft.com/office/drawing/2014/main" xmlns="" id="{439157CB-1F45-4CE6-A9AB-E46CA4B45337}"/>
+                <a16:creationId xmlns:a16="http://schemas.microsoft.com/office/drawing/2014/main" id="{439157CB-1F45-4CE6-A9AB-E46CA4B45337}"/>
               </a:ext>
             </a:extLst>
           </p:cNvPr>
@@ -14188,6 +14194,684 @@
       </p:grpSpPr>
       <p:sp>
         <p:nvSpPr>
+          <p:cNvPr id="6" name="Title 1"/>
+          <p:cNvSpPr>
+            <a:spLocks noGrp="1"/>
+          </p:cNvSpPr>
+          <p:nvPr>
+            <p:ph type="title"/>
+          </p:nvPr>
+        </p:nvSpPr>
+        <p:spPr>
+          <a:xfrm>
+            <a:off x="0" y="0"/>
+            <a:ext cx="2488557" cy="510199"/>
+          </a:xfrm>
+        </p:spPr>
+        <p:txBody>
+          <a:bodyPr numCol="1">
+            <a:noAutofit/>
+          </a:bodyPr>
+          <a:lstStyle/>
+          <a:p>
+            <a:pPr algn="ctr"/>
+            <a:r>
+              <a:rPr lang="fr-CH" sz="2800" dirty="0"/>
+              <a:t>FABRICATION</a:t>
+            </a:r>
+          </a:p>
+        </p:txBody>
+      </p:sp>
+      <p:sp>
+        <p:nvSpPr>
+          <p:cNvPr id="2" name="ZoneTexte 1">
+            <a:extLst>
+              <a:ext uri="{FF2B5EF4-FFF2-40B4-BE49-F238E27FC236}">
+                <a16:creationId xmlns:a16="http://schemas.microsoft.com/office/drawing/2014/main" id="{95A71DAD-C760-4FB1-9A97-CB83FC9A6215}"/>
+              </a:ext>
+            </a:extLst>
+          </p:cNvPr>
+          <p:cNvSpPr txBox="1"/>
+          <p:nvPr/>
+        </p:nvSpPr>
+        <p:spPr>
+          <a:xfrm>
+            <a:off x="374248" y="902826"/>
+            <a:ext cx="3940233" cy="461665"/>
+          </a:xfrm>
+          <a:prstGeom prst="rect">
+            <a:avLst/>
+          </a:prstGeom>
+          <a:noFill/>
+        </p:spPr>
+        <p:txBody>
+          <a:bodyPr wrap="square" rtlCol="0">
+            <a:spAutoFit/>
+          </a:bodyPr>
+          <a:lstStyle/>
+          <a:p>
+            <a:r>
+              <a:rPr lang="fr-CH" sz="2400" b="1" dirty="0" smtClean="0"/>
+              <a:t>Décroiser les câbles</a:t>
+            </a:r>
+            <a:endParaRPr lang="fr-CH" sz="2400" b="1" dirty="0"/>
+          </a:p>
+        </p:txBody>
+      </p:sp>
+      <p:sp>
+        <p:nvSpPr>
+          <p:cNvPr id="4" name="ZoneTexte 3">
+            <a:extLst>
+              <a:ext uri="{FF2B5EF4-FFF2-40B4-BE49-F238E27FC236}">
+                <a16:creationId xmlns:a16="http://schemas.microsoft.com/office/drawing/2014/main" id="{FBE88C88-B8F1-497D-99A0-7069148CCDE5}"/>
+              </a:ext>
+            </a:extLst>
+          </p:cNvPr>
+          <p:cNvSpPr txBox="1"/>
+          <p:nvPr/>
+        </p:nvSpPr>
+        <p:spPr>
+          <a:xfrm>
+            <a:off x="374248" y="1514120"/>
+            <a:ext cx="6059803" cy="923330"/>
+          </a:xfrm>
+          <a:prstGeom prst="rect">
+            <a:avLst/>
+          </a:prstGeom>
+          <a:noFill/>
+        </p:spPr>
+        <p:txBody>
+          <a:bodyPr wrap="square" rtlCol="0">
+            <a:spAutoFit/>
+          </a:bodyPr>
+          <a:lstStyle/>
+          <a:p>
+            <a:r>
+              <a:rPr lang="fr-CH" dirty="0"/>
+              <a:t>Une fois la gaine enlevée, il vous faut </a:t>
+            </a:r>
+            <a:r>
+              <a:rPr lang="fr-CH" b="1" dirty="0"/>
+              <a:t>décroiser les câbles</a:t>
+            </a:r>
+            <a:r>
+              <a:rPr lang="fr-CH" dirty="0"/>
+              <a:t>. Si le câble est blindé vous devez aussi détresser le </a:t>
+            </a:r>
+            <a:r>
+              <a:rPr lang="fr-CH" dirty="0" smtClean="0"/>
+              <a:t>blindage.</a:t>
+            </a:r>
+            <a:endParaRPr lang="fr-CH" sz="2000" dirty="0"/>
+          </a:p>
+        </p:txBody>
+      </p:sp>
+      <p:pic>
+        <p:nvPicPr>
+          <p:cNvPr id="1026" name="Picture 2" descr="cable-denudé"/>
+          <p:cNvPicPr>
+            <a:picLocks noChangeAspect="1" noChangeArrowheads="1"/>
+          </p:cNvPicPr>
+          <p:nvPr/>
+        </p:nvPicPr>
+        <p:blipFill>
+          <a:blip r:embed="rId2">
+            <a:extLst>
+              <a:ext uri="{28A0092B-C50C-407E-A947-70E740481C1C}">
+                <a14:useLocalDpi xmlns:a14="http://schemas.microsoft.com/office/drawing/2010/main" val="0"/>
+              </a:ext>
+            </a:extLst>
+          </a:blip>
+          <a:srcRect/>
+          <a:stretch>
+            <a:fillRect/>
+          </a:stretch>
+        </p:blipFill>
+        <p:spPr bwMode="auto">
+          <a:xfrm>
+            <a:off x="3532164" y="2811970"/>
+            <a:ext cx="4605996" cy="2698825"/>
+          </a:xfrm>
+          <a:prstGeom prst="rect">
+            <a:avLst/>
+          </a:prstGeom>
+          <a:noFill/>
+          <a:extLst>
+            <a:ext uri="{909E8E84-426E-40DD-AFC4-6F175D3DCCD1}">
+              <a14:hiddenFill xmlns:a14="http://schemas.microsoft.com/office/drawing/2010/main">
+                <a:solidFill>
+                  <a:srgbClr val="FFFFFF"/>
+                </a:solidFill>
+              </a14:hiddenFill>
+            </a:ext>
+          </a:extLst>
+        </p:spPr>
+      </p:pic>
+    </p:spTree>
+    <p:extLst>
+      <p:ext uri="{BB962C8B-B14F-4D97-AF65-F5344CB8AC3E}">
+        <p14:creationId xmlns:p14="http://schemas.microsoft.com/office/powerpoint/2010/main" val="769150630"/>
+      </p:ext>
+    </p:extLst>
+  </p:cSld>
+  <p:clrMapOvr>
+    <a:masterClrMapping/>
+  </p:clrMapOvr>
+  <p:timing>
+    <p:tnLst>
+      <p:par>
+        <p:cTn id="1" dur="indefinite" restart="never" nodeType="tmRoot"/>
+      </p:par>
+    </p:tnLst>
+  </p:timing>
+</p:sld>
+</file>
+
+<file path=ppt/slides/slide37.xml><?xml version="1.0" encoding="utf-8"?>
+<p:sld xmlns:a="http://schemas.openxmlformats.org/drawingml/2006/main" xmlns:r="http://schemas.openxmlformats.org/officeDocument/2006/relationships" xmlns:p="http://schemas.openxmlformats.org/presentationml/2006/main">
+  <p:cSld>
+    <p:spTree>
+      <p:nvGrpSpPr>
+        <p:cNvPr id="1" name=""/>
+        <p:cNvGrpSpPr/>
+        <p:nvPr/>
+      </p:nvGrpSpPr>
+      <p:grpSpPr>
+        <a:xfrm>
+          <a:off x="0" y="0"/>
+          <a:ext cx="0" cy="0"/>
+          <a:chOff x="0" y="0"/>
+          <a:chExt cx="0" cy="0"/>
+        </a:xfrm>
+      </p:grpSpPr>
+      <p:sp>
+        <p:nvSpPr>
+          <p:cNvPr id="6" name="Title 1"/>
+          <p:cNvSpPr>
+            <a:spLocks noGrp="1"/>
+          </p:cNvSpPr>
+          <p:nvPr>
+            <p:ph type="title"/>
+          </p:nvPr>
+        </p:nvSpPr>
+        <p:spPr>
+          <a:xfrm>
+            <a:off x="0" y="0"/>
+            <a:ext cx="2488557" cy="510199"/>
+          </a:xfrm>
+        </p:spPr>
+        <p:txBody>
+          <a:bodyPr numCol="1">
+            <a:noAutofit/>
+          </a:bodyPr>
+          <a:lstStyle/>
+          <a:p>
+            <a:pPr algn="ctr"/>
+            <a:r>
+              <a:rPr lang="fr-CH" sz="2800" dirty="0"/>
+              <a:t>FABRICATION</a:t>
+            </a:r>
+          </a:p>
+        </p:txBody>
+      </p:sp>
+      <p:sp>
+        <p:nvSpPr>
+          <p:cNvPr id="2" name="ZoneTexte 1">
+            <a:extLst>
+              <a:ext uri="{FF2B5EF4-FFF2-40B4-BE49-F238E27FC236}">
+                <a16:creationId xmlns:a16="http://schemas.microsoft.com/office/drawing/2014/main" id="{95A71DAD-C760-4FB1-9A97-CB83FC9A6215}"/>
+              </a:ext>
+            </a:extLst>
+          </p:cNvPr>
+          <p:cNvSpPr txBox="1"/>
+          <p:nvPr/>
+        </p:nvSpPr>
+        <p:spPr>
+          <a:xfrm>
+            <a:off x="374248" y="902826"/>
+            <a:ext cx="3940233" cy="461665"/>
+          </a:xfrm>
+          <a:prstGeom prst="rect">
+            <a:avLst/>
+          </a:prstGeom>
+          <a:noFill/>
+        </p:spPr>
+        <p:txBody>
+          <a:bodyPr wrap="square" rtlCol="0">
+            <a:spAutoFit/>
+          </a:bodyPr>
+          <a:lstStyle/>
+          <a:p>
+            <a:r>
+              <a:rPr lang="fr-CH" sz="2400" b="1" dirty="0" smtClean="0"/>
+              <a:t>Aligner les paires</a:t>
+            </a:r>
+            <a:endParaRPr lang="fr-CH" sz="2400" b="1" dirty="0"/>
+          </a:p>
+        </p:txBody>
+      </p:sp>
+      <p:sp>
+        <p:nvSpPr>
+          <p:cNvPr id="4" name="ZoneTexte 3">
+            <a:extLst>
+              <a:ext uri="{FF2B5EF4-FFF2-40B4-BE49-F238E27FC236}">
+                <a16:creationId xmlns:a16="http://schemas.microsoft.com/office/drawing/2014/main" id="{FBE88C88-B8F1-497D-99A0-7069148CCDE5}"/>
+              </a:ext>
+            </a:extLst>
+          </p:cNvPr>
+          <p:cNvSpPr txBox="1"/>
+          <p:nvPr/>
+        </p:nvSpPr>
+        <p:spPr>
+          <a:xfrm>
+            <a:off x="374248" y="1514120"/>
+            <a:ext cx="6059803" cy="646331"/>
+          </a:xfrm>
+          <a:prstGeom prst="rect">
+            <a:avLst/>
+          </a:prstGeom>
+          <a:noFill/>
+        </p:spPr>
+        <p:txBody>
+          <a:bodyPr wrap="square" rtlCol="0">
+            <a:spAutoFit/>
+          </a:bodyPr>
+          <a:lstStyle/>
+          <a:p>
+            <a:r>
+              <a:rPr lang="fr-CH" dirty="0" smtClean="0"/>
+              <a:t>Aligner les paires selon le type de câble que vous voulez créer.</a:t>
+            </a:r>
+            <a:endParaRPr lang="fr-CH" sz="2000" dirty="0"/>
+          </a:p>
+        </p:txBody>
+      </p:sp>
+      <p:pic>
+        <p:nvPicPr>
+          <p:cNvPr id="2050" name="Picture 2" descr="patch-rj45-droit-1024x512"/>
+          <p:cNvPicPr>
+            <a:picLocks noChangeAspect="1" noChangeArrowheads="1"/>
+          </p:cNvPicPr>
+          <p:nvPr/>
+        </p:nvPicPr>
+        <p:blipFill>
+          <a:blip r:embed="rId2">
+            <a:extLst>
+              <a:ext uri="{28A0092B-C50C-407E-A947-70E740481C1C}">
+                <a14:useLocalDpi xmlns:a14="http://schemas.microsoft.com/office/drawing/2010/main" val="0"/>
+              </a:ext>
+            </a:extLst>
+          </a:blip>
+          <a:srcRect/>
+          <a:stretch>
+            <a:fillRect/>
+          </a:stretch>
+        </p:blipFill>
+        <p:spPr bwMode="auto">
+          <a:xfrm>
+            <a:off x="374248" y="2610057"/>
+            <a:ext cx="4677881" cy="2338941"/>
+          </a:xfrm>
+          <a:prstGeom prst="rect">
+            <a:avLst/>
+          </a:prstGeom>
+          <a:noFill/>
+          <a:extLst>
+            <a:ext uri="{909E8E84-426E-40DD-AFC4-6F175D3DCCD1}">
+              <a14:hiddenFill xmlns:a14="http://schemas.microsoft.com/office/drawing/2010/main">
+                <a:solidFill>
+                  <a:srgbClr val="FFFFFF"/>
+                </a:solidFill>
+              </a14:hiddenFill>
+            </a:ext>
+          </a:extLst>
+        </p:spPr>
+      </p:pic>
+      <p:pic>
+        <p:nvPicPr>
+          <p:cNvPr id="2051" name="Picture 3" descr="patch-rj45-croise-1024x512"/>
+          <p:cNvPicPr>
+            <a:picLocks noChangeAspect="1" noChangeArrowheads="1"/>
+          </p:cNvPicPr>
+          <p:nvPr/>
+        </p:nvPicPr>
+        <p:blipFill>
+          <a:blip r:embed="rId3">
+            <a:extLst>
+              <a:ext uri="{28A0092B-C50C-407E-A947-70E740481C1C}">
+                <a14:useLocalDpi xmlns:a14="http://schemas.microsoft.com/office/drawing/2010/main" val="0"/>
+              </a:ext>
+            </a:extLst>
+          </a:blip>
+          <a:srcRect/>
+          <a:stretch>
+            <a:fillRect/>
+          </a:stretch>
+        </p:blipFill>
+        <p:spPr bwMode="auto">
+          <a:xfrm>
+            <a:off x="5536882" y="2610058"/>
+            <a:ext cx="4719949" cy="2338941"/>
+          </a:xfrm>
+          <a:prstGeom prst="rect">
+            <a:avLst/>
+          </a:prstGeom>
+          <a:noFill/>
+          <a:ln>
+            <a:noFill/>
+          </a:ln>
+          <a:extLst>
+            <a:ext uri="{909E8E84-426E-40DD-AFC4-6F175D3DCCD1}">
+              <a14:hiddenFill xmlns:a14="http://schemas.microsoft.com/office/drawing/2010/main">
+                <a:solidFill>
+                  <a:srgbClr val="FFFFFF"/>
+                </a:solidFill>
+              </a14:hiddenFill>
+            </a:ext>
+            <a:ext uri="{91240B29-F687-4F45-9708-019B960494DF}">
+              <a14:hiddenLine xmlns:a14="http://schemas.microsoft.com/office/drawing/2010/main" w="9525">
+                <a:solidFill>
+                  <a:srgbClr val="000000"/>
+                </a:solidFill>
+                <a:miter lim="800000"/>
+                <a:headEnd/>
+                <a:tailEnd/>
+              </a14:hiddenLine>
+            </a:ext>
+          </a:extLst>
+        </p:spPr>
+      </p:pic>
+      <p:sp>
+        <p:nvSpPr>
+          <p:cNvPr id="8" name="ZoneTexte 7">
+            <a:extLst>
+              <a:ext uri="{FF2B5EF4-FFF2-40B4-BE49-F238E27FC236}">
+                <a16:creationId xmlns:a16="http://schemas.microsoft.com/office/drawing/2014/main" id="{FBE88C88-B8F1-497D-99A0-7069148CCDE5}"/>
+              </a:ext>
+            </a:extLst>
+          </p:cNvPr>
+          <p:cNvSpPr txBox="1"/>
+          <p:nvPr/>
+        </p:nvSpPr>
+        <p:spPr>
+          <a:xfrm>
+            <a:off x="283604" y="4948998"/>
+            <a:ext cx="4859167" cy="369332"/>
+          </a:xfrm>
+          <a:prstGeom prst="rect">
+            <a:avLst/>
+          </a:prstGeom>
+          <a:noFill/>
+        </p:spPr>
+        <p:txBody>
+          <a:bodyPr wrap="square" rtlCol="0">
+            <a:spAutoFit/>
+          </a:bodyPr>
+          <a:lstStyle/>
+          <a:p>
+            <a:r>
+              <a:rPr lang="fr-CH" dirty="0" smtClean="0"/>
+              <a:t>Pour connecter à un switch ou un routeur</a:t>
+            </a:r>
+            <a:endParaRPr lang="fr-CH" sz="2000" dirty="0"/>
+          </a:p>
+        </p:txBody>
+      </p:sp>
+      <p:sp>
+        <p:nvSpPr>
+          <p:cNvPr id="9" name="ZoneTexte 8">
+            <a:extLst>
+              <a:ext uri="{FF2B5EF4-FFF2-40B4-BE49-F238E27FC236}">
+                <a16:creationId xmlns:a16="http://schemas.microsoft.com/office/drawing/2014/main" id="{FBE88C88-B8F1-497D-99A0-7069148CCDE5}"/>
+              </a:ext>
+            </a:extLst>
+          </p:cNvPr>
+          <p:cNvSpPr txBox="1"/>
+          <p:nvPr/>
+        </p:nvSpPr>
+        <p:spPr>
+          <a:xfrm>
+            <a:off x="5467272" y="4970932"/>
+            <a:ext cx="4859167" cy="369332"/>
+          </a:xfrm>
+          <a:prstGeom prst="rect">
+            <a:avLst/>
+          </a:prstGeom>
+          <a:noFill/>
+        </p:spPr>
+        <p:txBody>
+          <a:bodyPr wrap="square" rtlCol="0">
+            <a:spAutoFit/>
+          </a:bodyPr>
+          <a:lstStyle/>
+          <a:p>
+            <a:r>
+              <a:rPr lang="fr-CH" dirty="0" smtClean="0"/>
+              <a:t>Pour connecter 2 ordinateurs</a:t>
+            </a:r>
+            <a:endParaRPr lang="fr-CH" sz="2000" dirty="0"/>
+          </a:p>
+        </p:txBody>
+      </p:sp>
+    </p:spTree>
+    <p:extLst>
+      <p:ext uri="{BB962C8B-B14F-4D97-AF65-F5344CB8AC3E}">
+        <p14:creationId xmlns:p14="http://schemas.microsoft.com/office/powerpoint/2010/main" val="1572432645"/>
+      </p:ext>
+    </p:extLst>
+  </p:cSld>
+  <p:clrMapOvr>
+    <a:masterClrMapping/>
+  </p:clrMapOvr>
+  <p:timing>
+    <p:tnLst>
+      <p:par>
+        <p:cTn id="1" dur="indefinite" restart="never" nodeType="tmRoot"/>
+      </p:par>
+    </p:tnLst>
+  </p:timing>
+</p:sld>
+</file>
+
+<file path=ppt/slides/slide38.xml><?xml version="1.0" encoding="utf-8"?>
+<p:sld xmlns:a="http://schemas.openxmlformats.org/drawingml/2006/main" xmlns:r="http://schemas.openxmlformats.org/officeDocument/2006/relationships" xmlns:p="http://schemas.openxmlformats.org/presentationml/2006/main">
+  <p:cSld>
+    <p:spTree>
+      <p:nvGrpSpPr>
+        <p:cNvPr id="1" name=""/>
+        <p:cNvGrpSpPr/>
+        <p:nvPr/>
+      </p:nvGrpSpPr>
+      <p:grpSpPr>
+        <a:xfrm>
+          <a:off x="0" y="0"/>
+          <a:ext cx="0" cy="0"/>
+          <a:chOff x="0" y="0"/>
+          <a:chExt cx="0" cy="0"/>
+        </a:xfrm>
+      </p:grpSpPr>
+      <p:sp>
+        <p:nvSpPr>
+          <p:cNvPr id="6" name="Title 1"/>
+          <p:cNvSpPr>
+            <a:spLocks noGrp="1"/>
+          </p:cNvSpPr>
+          <p:nvPr>
+            <p:ph type="title"/>
+          </p:nvPr>
+        </p:nvSpPr>
+        <p:spPr>
+          <a:xfrm>
+            <a:off x="0" y="0"/>
+            <a:ext cx="2488557" cy="510199"/>
+          </a:xfrm>
+        </p:spPr>
+        <p:txBody>
+          <a:bodyPr numCol="1">
+            <a:noAutofit/>
+          </a:bodyPr>
+          <a:lstStyle/>
+          <a:p>
+            <a:pPr algn="ctr"/>
+            <a:r>
+              <a:rPr lang="fr-CH" sz="2800" dirty="0"/>
+              <a:t>FABRICATION</a:t>
+            </a:r>
+          </a:p>
+        </p:txBody>
+      </p:sp>
+      <p:sp>
+        <p:nvSpPr>
+          <p:cNvPr id="2" name="ZoneTexte 1">
+            <a:extLst>
+              <a:ext uri="{FF2B5EF4-FFF2-40B4-BE49-F238E27FC236}">
+                <a16:creationId xmlns:a16="http://schemas.microsoft.com/office/drawing/2014/main" id="{95A71DAD-C760-4FB1-9A97-CB83FC9A6215}"/>
+              </a:ext>
+            </a:extLst>
+          </p:cNvPr>
+          <p:cNvSpPr txBox="1"/>
+          <p:nvPr/>
+        </p:nvSpPr>
+        <p:spPr>
+          <a:xfrm>
+            <a:off x="374248" y="902826"/>
+            <a:ext cx="3940233" cy="461665"/>
+          </a:xfrm>
+          <a:prstGeom prst="rect">
+            <a:avLst/>
+          </a:prstGeom>
+          <a:noFill/>
+        </p:spPr>
+        <p:txBody>
+          <a:bodyPr wrap="square" rtlCol="0">
+            <a:spAutoFit/>
+          </a:bodyPr>
+          <a:lstStyle/>
+          <a:p>
+            <a:r>
+              <a:rPr lang="fr-CH" sz="2400" b="1" dirty="0" smtClean="0"/>
+              <a:t>Couper les paires</a:t>
+            </a:r>
+            <a:endParaRPr lang="fr-CH" sz="2400" b="1" dirty="0"/>
+          </a:p>
+        </p:txBody>
+      </p:sp>
+      <p:sp>
+        <p:nvSpPr>
+          <p:cNvPr id="4" name="ZoneTexte 3">
+            <a:extLst>
+              <a:ext uri="{FF2B5EF4-FFF2-40B4-BE49-F238E27FC236}">
+                <a16:creationId xmlns:a16="http://schemas.microsoft.com/office/drawing/2014/main" id="{FBE88C88-B8F1-497D-99A0-7069148CCDE5}"/>
+              </a:ext>
+            </a:extLst>
+          </p:cNvPr>
+          <p:cNvSpPr txBox="1"/>
+          <p:nvPr/>
+        </p:nvSpPr>
+        <p:spPr>
+          <a:xfrm>
+            <a:off x="374248" y="1514120"/>
+            <a:ext cx="6059803" cy="646331"/>
+          </a:xfrm>
+          <a:prstGeom prst="rect">
+            <a:avLst/>
+          </a:prstGeom>
+          <a:noFill/>
+        </p:spPr>
+        <p:txBody>
+          <a:bodyPr wrap="square" rtlCol="0">
+            <a:spAutoFit/>
+          </a:bodyPr>
+          <a:lstStyle/>
+          <a:p>
+            <a:r>
+              <a:rPr lang="fr-CH" dirty="0" smtClean="0"/>
+              <a:t>Il faut bien aligner et couper droit les paires pour qu’elles touchent toutes les contacts du connecteur</a:t>
+            </a:r>
+            <a:endParaRPr lang="fr-CH" sz="2000" dirty="0"/>
+          </a:p>
+        </p:txBody>
+      </p:sp>
+      <p:pic>
+        <p:nvPicPr>
+          <p:cNvPr id="3074" name="Picture 2" descr="decoupe"/>
+          <p:cNvPicPr>
+            <a:picLocks noChangeAspect="1" noChangeArrowheads="1"/>
+          </p:cNvPicPr>
+          <p:nvPr/>
+        </p:nvPicPr>
+        <p:blipFill>
+          <a:blip r:embed="rId2">
+            <a:extLst>
+              <a:ext uri="{28A0092B-C50C-407E-A947-70E740481C1C}">
+                <a14:useLocalDpi xmlns:a14="http://schemas.microsoft.com/office/drawing/2010/main" val="0"/>
+              </a:ext>
+            </a:extLst>
+          </a:blip>
+          <a:srcRect/>
+          <a:stretch>
+            <a:fillRect/>
+          </a:stretch>
+        </p:blipFill>
+        <p:spPr bwMode="auto">
+          <a:xfrm>
+            <a:off x="3574694" y="2829588"/>
+            <a:ext cx="4606504" cy="2698825"/>
+          </a:xfrm>
+          <a:prstGeom prst="rect">
+            <a:avLst/>
+          </a:prstGeom>
+          <a:noFill/>
+          <a:extLst>
+            <a:ext uri="{909E8E84-426E-40DD-AFC4-6F175D3DCCD1}">
+              <a14:hiddenFill xmlns:a14="http://schemas.microsoft.com/office/drawing/2010/main">
+                <a:solidFill>
+                  <a:srgbClr val="FFFFFF"/>
+                </a:solidFill>
+              </a14:hiddenFill>
+            </a:ext>
+          </a:extLst>
+        </p:spPr>
+      </p:pic>
+    </p:spTree>
+    <p:extLst>
+      <p:ext uri="{BB962C8B-B14F-4D97-AF65-F5344CB8AC3E}">
+        <p14:creationId xmlns:p14="http://schemas.microsoft.com/office/powerpoint/2010/main" val="2286041639"/>
+      </p:ext>
+    </p:extLst>
+  </p:cSld>
+  <p:clrMapOvr>
+    <a:masterClrMapping/>
+  </p:clrMapOvr>
+  <p:timing>
+    <p:tnLst>
+      <p:par>
+        <p:cTn id="1" dur="indefinite" restart="never" nodeType="tmRoot"/>
+      </p:par>
+    </p:tnLst>
+  </p:timing>
+</p:sld>
+</file>
+
+<file path=ppt/slides/slide39.xml><?xml version="1.0" encoding="utf-8"?>
+<p:sld xmlns:a="http://schemas.openxmlformats.org/drawingml/2006/main" xmlns:r="http://schemas.openxmlformats.org/officeDocument/2006/relationships" xmlns:p="http://schemas.openxmlformats.org/presentationml/2006/main">
+  <p:cSld>
+    <p:spTree>
+      <p:nvGrpSpPr>
+        <p:cNvPr id="1" name=""/>
+        <p:cNvGrpSpPr/>
+        <p:nvPr/>
+      </p:nvGrpSpPr>
+      <p:grpSpPr>
+        <a:xfrm>
+          <a:off x="0" y="0"/>
+          <a:ext cx="0" cy="0"/>
+          <a:chOff x="0" y="0"/>
+          <a:chExt cx="0" cy="0"/>
+        </a:xfrm>
+      </p:grpSpPr>
+      <p:sp>
+        <p:nvSpPr>
           <p:cNvPr id="2" name="Title 1"/>
           <p:cNvSpPr>
             <a:spLocks noGrp="1"/>
@@ -14366,7 +15050,7 @@
           <p:cNvPr id="8" name="Groupe 7">
             <a:extLst>
               <a:ext uri="{FF2B5EF4-FFF2-40B4-BE49-F238E27FC236}">
-                <a16:creationId xmlns:a16="http://schemas.microsoft.com/office/drawing/2014/main" xmlns="" id="{45CE9A5B-2BF5-4887-83F2-4BE1643502B9}"/>
+                <a16:creationId xmlns:a16="http://schemas.microsoft.com/office/drawing/2014/main" id="{45CE9A5B-2BF5-4887-83F2-4BE1643502B9}"/>
               </a:ext>
             </a:extLst>
           </p:cNvPr>
@@ -14386,7 +15070,7 @@
             <p:cNvPr id="2" name="Image 1">
               <a:extLst>
                 <a:ext uri="{FF2B5EF4-FFF2-40B4-BE49-F238E27FC236}">
-                  <a16:creationId xmlns:a16="http://schemas.microsoft.com/office/drawing/2014/main" xmlns="" id="{650A4185-1561-4B95-A05D-FEDD73B2D58C}"/>
+                  <a16:creationId xmlns:a16="http://schemas.microsoft.com/office/drawing/2014/main" id="{650A4185-1561-4B95-A05D-FEDD73B2D58C}"/>
                 </a:ext>
               </a:extLst>
             </p:cNvPr>
@@ -14415,7 +15099,7 @@
             <p:cNvPr id="6" name="ZoneTexte 5">
               <a:extLst>
                 <a:ext uri="{FF2B5EF4-FFF2-40B4-BE49-F238E27FC236}">
-                  <a16:creationId xmlns:a16="http://schemas.microsoft.com/office/drawing/2014/main" xmlns="" id="{3CCBC606-F3FD-4F1A-ACB0-51D37C16A945}"/>
+                  <a16:creationId xmlns:a16="http://schemas.microsoft.com/office/drawing/2014/main" id="{3CCBC606-F3FD-4F1A-ACB0-51D37C16A945}"/>
                 </a:ext>
               </a:extLst>
             </p:cNvPr>
@@ -14457,7 +15141,7 @@
           <p:cNvPr id="9" name="Groupe 8">
             <a:extLst>
               <a:ext uri="{FF2B5EF4-FFF2-40B4-BE49-F238E27FC236}">
-                <a16:creationId xmlns:a16="http://schemas.microsoft.com/office/drawing/2014/main" xmlns="" id="{35BF348F-7788-4FD2-B7A6-7B1F65FFCFDA}"/>
+                <a16:creationId xmlns:a16="http://schemas.microsoft.com/office/drawing/2014/main" id="{35BF348F-7788-4FD2-B7A6-7B1F65FFCFDA}"/>
               </a:ext>
             </a:extLst>
           </p:cNvPr>
@@ -14477,7 +15161,7 @@
             <p:cNvPr id="1028" name="Picture 4" descr="https://ieeecs-media.computer.org/wp-media/2018/04/11182850/davidboggs-e1523471453351.jpg">
               <a:extLst>
                 <a:ext uri="{FF2B5EF4-FFF2-40B4-BE49-F238E27FC236}">
-                  <a16:creationId xmlns:a16="http://schemas.microsoft.com/office/drawing/2014/main" xmlns="" id="{26ACF9C1-B83F-407C-9C49-41DED14C035C}"/>
+                  <a16:creationId xmlns:a16="http://schemas.microsoft.com/office/drawing/2014/main" id="{26ACF9C1-B83F-407C-9C49-41DED14C035C}"/>
                 </a:ext>
               </a:extLst>
             </p:cNvPr>
@@ -14522,7 +15206,7 @@
             <p:cNvPr id="10" name="ZoneTexte 9">
               <a:extLst>
                 <a:ext uri="{FF2B5EF4-FFF2-40B4-BE49-F238E27FC236}">
-                  <a16:creationId xmlns:a16="http://schemas.microsoft.com/office/drawing/2014/main" xmlns="" id="{6DBF9C99-3A06-4889-B38A-43FE2DD859D8}"/>
+                  <a16:creationId xmlns:a16="http://schemas.microsoft.com/office/drawing/2014/main" id="{6DBF9C99-3A06-4889-B38A-43FE2DD859D8}"/>
                 </a:ext>
               </a:extLst>
             </p:cNvPr>
@@ -14559,7 +15243,7 @@
           <p:cNvPr id="7" name="ZoneTexte 6">
             <a:extLst>
               <a:ext uri="{FF2B5EF4-FFF2-40B4-BE49-F238E27FC236}">
-                <a16:creationId xmlns:a16="http://schemas.microsoft.com/office/drawing/2014/main" xmlns="" id="{1A93F582-9049-457B-9589-571AD11F982B}"/>
+                <a16:creationId xmlns:a16="http://schemas.microsoft.com/office/drawing/2014/main" id="{1A93F582-9049-457B-9589-571AD11F982B}"/>
               </a:ext>
             </a:extLst>
           </p:cNvPr>
@@ -14594,7 +15278,7 @@
           <p:cNvPr id="11" name="ZoneTexte 10">
             <a:extLst>
               <a:ext uri="{FF2B5EF4-FFF2-40B4-BE49-F238E27FC236}">
-                <a16:creationId xmlns:a16="http://schemas.microsoft.com/office/drawing/2014/main" xmlns="" id="{7785E246-28F5-4FEA-A6C4-269F51F6041C}"/>
+                <a16:creationId xmlns:a16="http://schemas.microsoft.com/office/drawing/2014/main" id="{7785E246-28F5-4FEA-A6C4-269F51F6041C}"/>
               </a:ext>
             </a:extLst>
           </p:cNvPr>
@@ -15124,7 +15808,7 @@
           <p:cNvPr id="11" name="ZoneTexte 10">
             <a:extLst>
               <a:ext uri="{FF2B5EF4-FFF2-40B4-BE49-F238E27FC236}">
-                <a16:creationId xmlns:a16="http://schemas.microsoft.com/office/drawing/2014/main" xmlns="" id="{7785E246-28F5-4FEA-A6C4-269F51F6041C}"/>
+                <a16:creationId xmlns:a16="http://schemas.microsoft.com/office/drawing/2014/main" id="{7785E246-28F5-4FEA-A6C4-269F51F6041C}"/>
               </a:ext>
             </a:extLst>
           </p:cNvPr>
@@ -15206,7 +15890,7 @@
           <p:cNvPr id="14" name="ZoneTexte 13">
             <a:extLst>
               <a:ext uri="{FF2B5EF4-FFF2-40B4-BE49-F238E27FC236}">
-                <a16:creationId xmlns:a16="http://schemas.microsoft.com/office/drawing/2014/main" xmlns="" id="{62641573-ED7D-433D-81BF-0492492F1156}"/>
+                <a16:creationId xmlns:a16="http://schemas.microsoft.com/office/drawing/2014/main" id="{62641573-ED7D-433D-81BF-0492492F1156}"/>
               </a:ext>
             </a:extLst>
           </p:cNvPr>
@@ -15305,7 +15989,7 @@
           <p:cNvPr id="15" name="Content Placeholder 2">
             <a:extLst>
               <a:ext uri="{FF2B5EF4-FFF2-40B4-BE49-F238E27FC236}">
-                <a16:creationId xmlns:a16="http://schemas.microsoft.com/office/drawing/2014/main" xmlns="" id="{714B2A4D-02FA-44D2-923C-DD9509380C18}"/>
+                <a16:creationId xmlns:a16="http://schemas.microsoft.com/office/drawing/2014/main" id="{714B2A4D-02FA-44D2-923C-DD9509380C18}"/>
               </a:ext>
             </a:extLst>
           </p:cNvPr>

</xml_diff>

<commit_message>
Mise en page et correctiion des docuements
</commit_message>
<xml_diff>
--- a/Module 214 - Fabrication_Ethernet.pptx
+++ b/Module 214 - Fabrication_Ethernet.pptx
@@ -394,7 +394,7 @@
           <a:p>
             <a:fld id="{D406E69D-613E-4019-8533-7F772451DAA2}" type="datetimeFigureOut">
               <a:rPr lang="fr-CH" smtClean="0"/>
-              <a:t>02.05.2019</a:t>
+              <a:t>03.05.2019</a:t>
             </a:fld>
             <a:endParaRPr lang="fr-CH"/>
           </a:p>
@@ -830,7 +830,7 @@
           <a:p>
             <a:fld id="{D406E69D-613E-4019-8533-7F772451DAA2}" type="datetimeFigureOut">
               <a:rPr lang="fr-CH" smtClean="0"/>
-              <a:t>02.05.2019</a:t>
+              <a:t>03.05.2019</a:t>
             </a:fld>
             <a:endParaRPr lang="fr-CH"/>
           </a:p>
@@ -1080,7 +1080,7 @@
           <a:p>
             <a:fld id="{D406E69D-613E-4019-8533-7F772451DAA2}" type="datetimeFigureOut">
               <a:rPr lang="fr-CH" smtClean="0"/>
-              <a:t>02.05.2019</a:t>
+              <a:t>03.05.2019</a:t>
             </a:fld>
             <a:endParaRPr lang="fr-CH"/>
           </a:p>
@@ -1388,7 +1388,7 @@
           <a:p>
             <a:fld id="{D406E69D-613E-4019-8533-7F772451DAA2}" type="datetimeFigureOut">
               <a:rPr lang="fr-CH" smtClean="0"/>
-              <a:t>02.05.2019</a:t>
+              <a:t>03.05.2019</a:t>
             </a:fld>
             <a:endParaRPr lang="fr-CH"/>
           </a:p>
@@ -1706,7 +1706,7 @@
           <a:p>
             <a:fld id="{D406E69D-613E-4019-8533-7F772451DAA2}" type="datetimeFigureOut">
               <a:rPr lang="fr-CH" smtClean="0"/>
-              <a:t>02.05.2019</a:t>
+              <a:t>03.05.2019</a:t>
             </a:fld>
             <a:endParaRPr lang="fr-CH"/>
           </a:p>
@@ -2008,7 +2008,7 @@
           <a:p>
             <a:fld id="{D406E69D-613E-4019-8533-7F772451DAA2}" type="datetimeFigureOut">
               <a:rPr lang="fr-CH" smtClean="0"/>
-              <a:t>02.05.2019</a:t>
+              <a:t>03.05.2019</a:t>
             </a:fld>
             <a:endParaRPr lang="fr-CH"/>
           </a:p>
@@ -2375,7 +2375,7 @@
           <a:p>
             <a:fld id="{D406E69D-613E-4019-8533-7F772451DAA2}" type="datetimeFigureOut">
               <a:rPr lang="fr-CH" smtClean="0"/>
-              <a:t>02.05.2019</a:t>
+              <a:t>03.05.2019</a:t>
             </a:fld>
             <a:endParaRPr lang="fr-CH"/>
           </a:p>
@@ -2549,7 +2549,7 @@
           <a:p>
             <a:fld id="{D406E69D-613E-4019-8533-7F772451DAA2}" type="datetimeFigureOut">
               <a:rPr lang="fr-CH" smtClean="0"/>
-              <a:t>02.05.2019</a:t>
+              <a:t>03.05.2019</a:t>
             </a:fld>
             <a:endParaRPr lang="fr-CH"/>
           </a:p>
@@ -2729,7 +2729,7 @@
           <a:p>
             <a:fld id="{D406E69D-613E-4019-8533-7F772451DAA2}" type="datetimeFigureOut">
               <a:rPr lang="fr-CH" smtClean="0"/>
-              <a:t>02.05.2019</a:t>
+              <a:t>03.05.2019</a:t>
             </a:fld>
             <a:endParaRPr lang="fr-CH"/>
           </a:p>
@@ -2899,7 +2899,7 @@
           <a:p>
             <a:fld id="{D406E69D-613E-4019-8533-7F772451DAA2}" type="datetimeFigureOut">
               <a:rPr lang="fr-CH" smtClean="0"/>
-              <a:t>02.05.2019</a:t>
+              <a:t>03.05.2019</a:t>
             </a:fld>
             <a:endParaRPr lang="fr-CH"/>
           </a:p>
@@ -3149,7 +3149,7 @@
           <a:p>
             <a:fld id="{D406E69D-613E-4019-8533-7F772451DAA2}" type="datetimeFigureOut">
               <a:rPr lang="fr-CH" smtClean="0"/>
-              <a:t>02.05.2019</a:t>
+              <a:t>03.05.2019</a:t>
             </a:fld>
             <a:endParaRPr lang="fr-CH"/>
           </a:p>
@@ -3385,7 +3385,7 @@
           <a:p>
             <a:fld id="{D406E69D-613E-4019-8533-7F772451DAA2}" type="datetimeFigureOut">
               <a:rPr lang="fr-CH" smtClean="0"/>
-              <a:t>02.05.2019</a:t>
+              <a:t>03.05.2019</a:t>
             </a:fld>
             <a:endParaRPr lang="fr-CH"/>
           </a:p>
@@ -3767,7 +3767,7 @@
           <a:p>
             <a:fld id="{D406E69D-613E-4019-8533-7F772451DAA2}" type="datetimeFigureOut">
               <a:rPr lang="fr-CH" smtClean="0"/>
-              <a:t>02.05.2019</a:t>
+              <a:t>03.05.2019</a:t>
             </a:fld>
             <a:endParaRPr lang="fr-CH"/>
           </a:p>
@@ -3885,7 +3885,7 @@
           <a:p>
             <a:fld id="{D406E69D-613E-4019-8533-7F772451DAA2}" type="datetimeFigureOut">
               <a:rPr lang="fr-CH" smtClean="0"/>
-              <a:t>02.05.2019</a:t>
+              <a:t>03.05.2019</a:t>
             </a:fld>
             <a:endParaRPr lang="fr-CH"/>
           </a:p>
@@ -3980,7 +3980,7 @@
           <a:p>
             <a:fld id="{D406E69D-613E-4019-8533-7F772451DAA2}" type="datetimeFigureOut">
               <a:rPr lang="fr-CH" smtClean="0"/>
-              <a:t>02.05.2019</a:t>
+              <a:t>03.05.2019</a:t>
             </a:fld>
             <a:endParaRPr lang="fr-CH"/>
           </a:p>
@@ -4235,7 +4235,7 @@
           <a:p>
             <a:fld id="{D406E69D-613E-4019-8533-7F772451DAA2}" type="datetimeFigureOut">
               <a:rPr lang="fr-CH" smtClean="0"/>
-              <a:t>02.05.2019</a:t>
+              <a:t>03.05.2019</a:t>
             </a:fld>
             <a:endParaRPr lang="fr-CH"/>
           </a:p>
@@ -4518,7 +4518,7 @@
           <a:p>
             <a:fld id="{D406E69D-613E-4019-8533-7F772451DAA2}" type="datetimeFigureOut">
               <a:rPr lang="fr-CH" smtClean="0"/>
-              <a:t>02.05.2019</a:t>
+              <a:t>03.05.2019</a:t>
             </a:fld>
             <a:endParaRPr lang="fr-CH"/>
           </a:p>
@@ -4924,7 +4924,7 @@
           <a:p>
             <a:fld id="{D406E69D-613E-4019-8533-7F772451DAA2}" type="datetimeFigureOut">
               <a:rPr lang="fr-CH" smtClean="0"/>
-              <a:t>02.05.2019</a:t>
+              <a:t>03.05.2019</a:t>
             </a:fld>
             <a:endParaRPr lang="fr-CH"/>
           </a:p>
@@ -6285,7 +6285,7 @@
         </p:spPr>
         <p:txBody>
           <a:bodyPr>
-            <a:normAutofit fontScale="92500" lnSpcReduction="10000"/>
+            <a:normAutofit lnSpcReduction="10000"/>
           </a:bodyPr>
           <a:lstStyle/>
           <a:p>
@@ -6295,7 +6295,7 @@
               </a:lnSpc>
             </a:pPr>
             <a:r>
-              <a:rPr lang="fr-CH" sz="4400" dirty="0" smtClean="0">
+              <a:rPr lang="fr-CH" sz="4400" dirty="0">
                 <a:solidFill>
                   <a:schemeClr val="tx1"/>
                 </a:solidFill>
@@ -6310,20 +6310,12 @@
               </a:lnSpc>
             </a:pPr>
             <a:r>
-              <a:rPr lang="fr-CH" sz="4400" dirty="0" smtClean="0">
+              <a:rPr lang="fr-CH" sz="4400" dirty="0">
                 <a:solidFill>
                   <a:schemeClr val="tx1"/>
                 </a:solidFill>
               </a:rPr>
-              <a:t>CAT5 </a:t>
-            </a:r>
-            <a:r>
-              <a:rPr lang="fr-CH" sz="4400" dirty="0">
-                <a:solidFill>
-                  <a:schemeClr val="tx1"/>
-                </a:solidFill>
-              </a:rPr>
-              <a:t>/ 5E</a:t>
+              <a:t>CAT5 / 5E</a:t>
             </a:r>
           </a:p>
           <a:p>
@@ -6413,13 +6405,6 @@
   <p:clrMapOvr>
     <a:masterClrMapping/>
   </p:clrMapOvr>
-  <p:timing>
-    <p:tnLst>
-      <p:par>
-        <p:cTn id="1" dur="indefinite" restart="never" nodeType="tmRoot"/>
-      </p:par>
-    </p:tnLst>
-  </p:timing>
 </p:sld>
 </file>
 
@@ -6504,13 +6489,6 @@
   <p:clrMapOvr>
     <a:masterClrMapping/>
   </p:clrMapOvr>
-  <p:timing>
-    <p:tnLst>
-      <p:par>
-        <p:cTn id="1" dur="indefinite" restart="never" nodeType="tmRoot"/>
-      </p:par>
-    </p:tnLst>
-  </p:timing>
 </p:sld>
 </file>
 
@@ -6580,13 +6558,8 @@
             <a:pPr algn="ctr"/>
             <a:r>
               <a:rPr lang="fr-CH" sz="2800" dirty="0"/>
-              <a:t>CATEGORIE </a:t>
-            </a:r>
-            <a:r>
-              <a:rPr lang="fr-CH" sz="2800" dirty="0" smtClean="0"/>
-              <a:t>5 / 5E</a:t>
-            </a:r>
-            <a:endParaRPr lang="fr-CH" sz="2800" dirty="0"/>
+              <a:t>CATEGORIE 5 / 5E</a:t>
+            </a:r>
           </a:p>
         </p:txBody>
       </p:sp>
@@ -6600,13 +6573,6 @@
   <p:clrMapOvr>
     <a:masterClrMapping/>
   </p:clrMapOvr>
-  <p:timing>
-    <p:tnLst>
-      <p:par>
-        <p:cTn id="1" dur="indefinite" restart="never" nodeType="tmRoot"/>
-      </p:par>
-    </p:tnLst>
-  </p:timing>
 </p:sld>
 </file>
 
@@ -6676,13 +6642,8 @@
             <a:pPr algn="ctr"/>
             <a:r>
               <a:rPr lang="fr-CH" sz="2800" dirty="0"/>
-              <a:t>CATEGORIE </a:t>
-            </a:r>
-            <a:r>
-              <a:rPr lang="fr-CH" sz="2800" dirty="0" smtClean="0"/>
-              <a:t>5 / 5E</a:t>
-            </a:r>
-            <a:endParaRPr lang="fr-CH" sz="2800" dirty="0"/>
+              <a:t>CATEGORIE 5 / 5E</a:t>
+            </a:r>
           </a:p>
         </p:txBody>
       </p:sp>
@@ -6696,13 +6657,6 @@
   <p:clrMapOvr>
     <a:masterClrMapping/>
   </p:clrMapOvr>
-  <p:timing>
-    <p:tnLst>
-      <p:par>
-        <p:cTn id="1" dur="indefinite" restart="never" nodeType="tmRoot"/>
-      </p:par>
-    </p:tnLst>
-  </p:timing>
 </p:sld>
 </file>
 
@@ -6749,18 +6703,13 @@
               <a:buNone/>
             </a:pPr>
             <a:r>
-              <a:rPr lang="fr-CH" sz="2400" b="1" u="sng" dirty="0" smtClean="0">
+              <a:rPr lang="fr-CH" sz="2400" b="1" u="sng" dirty="0">
                 <a:solidFill>
                   <a:schemeClr val="tx1"/>
                 </a:solidFill>
               </a:rPr>
               <a:t>Caractéristiques technique CAT6:</a:t>
             </a:r>
-            <a:endParaRPr lang="fr-CH" sz="2400" b="1" u="sng" dirty="0">
-              <a:solidFill>
-                <a:schemeClr val="tx1"/>
-              </a:solidFill>
-            </a:endParaRPr>
           </a:p>
           <a:p>
             <a:pPr lvl="1"/>
@@ -6829,36 +6778,8 @@
                   <a:schemeClr val="tx1"/>
                 </a:solidFill>
               </a:rPr>
-              <a:t>250 </a:t>
-            </a:r>
-            <a:r>
-              <a:rPr lang="fr-CH" b="1" dirty="0" smtClean="0">
-                <a:solidFill>
-                  <a:schemeClr val="tx1"/>
-                </a:solidFill>
-              </a:rPr>
-              <a:t>Mhz</a:t>
-            </a:r>
-          </a:p>
-          <a:p>
-            <a:pPr marL="457200" lvl="1" indent="0">
-              <a:buNone/>
-            </a:pPr>
-            <a:endParaRPr lang="fr-CH" b="1" dirty="0" smtClean="0">
-              <a:solidFill>
-                <a:schemeClr val="tx1"/>
-              </a:solidFill>
-            </a:endParaRPr>
-          </a:p>
-          <a:p>
-            <a:pPr marL="457200" lvl="1" indent="0">
-              <a:buNone/>
-            </a:pPr>
-            <a:endParaRPr lang="fr-CH" b="1" dirty="0" smtClean="0">
-              <a:solidFill>
-                <a:schemeClr val="tx1"/>
-              </a:solidFill>
-            </a:endParaRPr>
+              <a:t>250 Mhz</a:t>
+            </a:r>
           </a:p>
           <a:p>
             <a:pPr marL="457200" lvl="1" indent="0">
@@ -6871,6 +6792,26 @@
             </a:endParaRPr>
           </a:p>
           <a:p>
+            <a:pPr marL="457200" lvl="1" indent="0">
+              <a:buNone/>
+            </a:pPr>
+            <a:endParaRPr lang="fr-CH" b="1" dirty="0">
+              <a:solidFill>
+                <a:schemeClr val="tx1"/>
+              </a:solidFill>
+            </a:endParaRPr>
+          </a:p>
+          <a:p>
+            <a:pPr marL="457200" lvl="1" indent="0">
+              <a:buNone/>
+            </a:pPr>
+            <a:endParaRPr lang="fr-CH" b="1" dirty="0">
+              <a:solidFill>
+                <a:schemeClr val="tx1"/>
+              </a:solidFill>
+            </a:endParaRPr>
+          </a:p>
+          <a:p>
             <a:pPr marL="0" indent="0">
               <a:buNone/>
             </a:pPr>
@@ -7002,13 +6943,8 @@
             <a:pPr algn="ctr"/>
             <a:r>
               <a:rPr lang="fr-CH" sz="2800" dirty="0"/>
-              <a:t>CATEGORIE </a:t>
-            </a:r>
-            <a:r>
-              <a:rPr lang="fr-CH" sz="2800" dirty="0" smtClean="0"/>
-              <a:t>6 / 6A</a:t>
-            </a:r>
-            <a:endParaRPr lang="fr-CH" sz="2800" dirty="0"/>
+              <a:t>CATEGORIE 6 / 6A</a:t>
+            </a:r>
           </a:p>
         </p:txBody>
       </p:sp>
@@ -7469,15 +7405,7 @@
                   <a:schemeClr val="tx1"/>
                 </a:solidFill>
               </a:rPr>
-              <a:t>Caractéristiques </a:t>
-            </a:r>
-            <a:r>
-              <a:rPr lang="fr-CH" b="1" u="sng" dirty="0" smtClean="0">
-                <a:solidFill>
-                  <a:schemeClr val="tx1"/>
-                </a:solidFill>
-              </a:rPr>
-              <a:t>physique CAT6 / CAT 6A:</a:t>
+              <a:t>Caractéristiques physique CAT6 / CAT 6A:</a:t>
             </a:r>
           </a:p>
         </p:txBody>
@@ -7688,13 +7616,8 @@
             <a:pPr algn="ctr"/>
             <a:r>
               <a:rPr lang="fr-CH" sz="2800" dirty="0"/>
-              <a:t>CATEGORIE </a:t>
-            </a:r>
-            <a:r>
-              <a:rPr lang="fr-CH" sz="2800" dirty="0" smtClean="0"/>
-              <a:t>6 / 6A</a:t>
-            </a:r>
-            <a:endParaRPr lang="fr-CH" sz="2800" dirty="0"/>
+              <a:t>CATEGORIE 6 / 6A</a:t>
+            </a:r>
           </a:p>
         </p:txBody>
       </p:sp>
@@ -8162,7 +8085,7 @@
             <a:pPr marL="457200" lvl="1" indent="0">
               <a:buNone/>
             </a:pPr>
-            <a:endParaRPr lang="fr-CH" dirty="0" smtClean="0">
+            <a:endParaRPr lang="fr-CH" dirty="0">
               <a:solidFill>
                 <a:schemeClr val="tx1"/>
               </a:solidFill>
@@ -9090,13 +9013,6 @@
   <p:clrMapOvr>
     <a:masterClrMapping/>
   </p:clrMapOvr>
-  <p:timing>
-    <p:tnLst>
-      <p:par>
-        <p:cTn id="1" dur="indefinite" restart="never" nodeType="tmRoot"/>
-      </p:par>
-    </p:tnLst>
-  </p:timing>
 </p:sld>
 </file>
 
@@ -11637,13 +11553,6 @@
   <p:clrMapOvr>
     <a:masterClrMapping/>
   </p:clrMapOvr>
-  <p:timing>
-    <p:tnLst>
-      <p:par>
-        <p:cTn id="1" dur="indefinite" restart="never" nodeType="tmRoot"/>
-      </p:par>
-    </p:tnLst>
-  </p:timing>
 </p:sld>
 </file>
 
@@ -11922,13 +11831,6 @@
   <p:clrMapOvr>
     <a:masterClrMapping/>
   </p:clrMapOvr>
-  <p:timing>
-    <p:tnLst>
-      <p:par>
-        <p:cTn id="1" dur="indefinite" restart="never" nodeType="tmRoot"/>
-      </p:par>
-    </p:tnLst>
-  </p:timing>
 </p:sld>
 </file>
 
@@ -12126,13 +12028,6 @@
   <p:clrMapOvr>
     <a:masterClrMapping/>
   </p:clrMapOvr>
-  <p:timing>
-    <p:tnLst>
-      <p:par>
-        <p:cTn id="1" dur="indefinite" restart="never" nodeType="tmRoot"/>
-      </p:par>
-    </p:tnLst>
-  </p:timing>
 </p:sld>
 </file>
 
@@ -12409,13 +12304,6 @@
   <p:clrMapOvr>
     <a:masterClrMapping/>
   </p:clrMapOvr>
-  <p:timing>
-    <p:tnLst>
-      <p:par>
-        <p:cTn id="1" dur="indefinite" restart="never" nodeType="tmRoot"/>
-      </p:par>
-    </p:tnLst>
-  </p:timing>
 </p:sld>
 </file>
 
@@ -12743,6 +12631,34 @@
               </a:rPr>
               <a:t>Cette présentation à comme objectifs :</a:t>
             </a:r>
+          </a:p>
+          <a:p>
+            <a:pPr lvl="2">
+              <a:lnSpc>
+                <a:spcPct val="150000"/>
+              </a:lnSpc>
+            </a:pPr>
+            <a:r>
+              <a:rPr lang="fr-CH" sz="1800" dirty="0">
+                <a:solidFill>
+                  <a:schemeClr val="tx1"/>
+                </a:solidFill>
+              </a:rPr>
+              <a:t>Expliquer l’histoire et les usages du </a:t>
+            </a:r>
+            <a:r>
+              <a:rPr lang="fr-CH" sz="1800">
+                <a:solidFill>
+                  <a:schemeClr val="tx1"/>
+                </a:solidFill>
+              </a:rPr>
+              <a:t>câble Ethernet</a:t>
+            </a:r>
+            <a:endParaRPr lang="fr-CH" sz="1800" dirty="0">
+              <a:solidFill>
+                <a:schemeClr val="tx1"/>
+              </a:solidFill>
+            </a:endParaRPr>
           </a:p>
           <a:p>
             <a:pPr lvl="2">
@@ -13282,13 +13198,6 @@
   <p:clrMapOvr>
     <a:masterClrMapping/>
   </p:clrMapOvr>
-  <p:timing>
-    <p:tnLst>
-      <p:par>
-        <p:cTn id="1" dur="indefinite" restart="never" nodeType="tmRoot"/>
-      </p:par>
-    </p:tnLst>
-  </p:timing>
 </p:sld>
 </file>
 
@@ -13555,13 +13464,6 @@
   <p:clrMapOvr>
     <a:masterClrMapping/>
   </p:clrMapOvr>
-  <p:timing>
-    <p:tnLst>
-      <p:par>
-        <p:cTn id="1" dur="indefinite" restart="never" nodeType="tmRoot"/>
-      </p:par>
-    </p:tnLst>
-  </p:timing>
 </p:sld>
 </file>
 
@@ -13642,13 +13544,6 @@
   <p:clrMapOvr>
     <a:masterClrMapping/>
   </p:clrMapOvr>
-  <p:timing>
-    <p:tnLst>
-      <p:par>
-        <p:cTn id="1" dur="indefinite" restart="never" nodeType="tmRoot"/>
-      </p:par>
-    </p:tnLst>
-  </p:timing>
 </p:sld>
 </file>
 
@@ -13852,13 +13747,6 @@
   <p:clrMapOvr>
     <a:masterClrMapping/>
   </p:clrMapOvr>
-  <p:timing>
-    <p:tnLst>
-      <p:par>
-        <p:cTn id="1" dur="indefinite" restart="never" nodeType="tmRoot"/>
-      </p:par>
-    </p:tnLst>
-  </p:timing>
 </p:sld>
 </file>
 
@@ -13998,13 +13886,6 @@
   <p:clrMapOvr>
     <a:masterClrMapping/>
   </p:clrMapOvr>
-  <p:timing>
-    <p:tnLst>
-      <p:par>
-        <p:cTn id="1" dur="indefinite" restart="never" nodeType="tmRoot"/>
-      </p:par>
-    </p:tnLst>
-  </p:timing>
 </p:sld>
 </file>
 
@@ -14171,13 +14052,6 @@
   <p:clrMapOvr>
     <a:masterClrMapping/>
   </p:clrMapOvr>
-  <p:timing>
-    <p:tnLst>
-      <p:par>
-        <p:cTn id="1" dur="indefinite" restart="never" nodeType="tmRoot"/>
-      </p:par>
-    </p:tnLst>
-  </p:timing>
 </p:sld>
 </file>
 
@@ -14257,10 +14131,9 @@
           <a:lstStyle/>
           <a:p>
             <a:r>
-              <a:rPr lang="fr-CH" sz="2400" b="1" dirty="0" smtClean="0"/>
+              <a:rPr lang="fr-CH" sz="2400" b="1" dirty="0"/>
               <a:t>Décroiser les câbles</a:t>
             </a:r>
-            <a:endParaRPr lang="fr-CH" sz="2400" b="1" dirty="0"/>
           </a:p>
         </p:txBody>
       </p:sp>
@@ -14302,11 +14175,7 @@
             </a:r>
             <a:r>
               <a:rPr lang="fr-CH" dirty="0"/>
-              <a:t>. Si le câble est blindé vous devez aussi détresser le </a:t>
-            </a:r>
-            <a:r>
-              <a:rPr lang="fr-CH" dirty="0" smtClean="0"/>
-              <a:t>blindage.</a:t>
+              <a:t>. Si le câble est blindé vous devez aussi détresser le blindage.</a:t>
             </a:r>
             <a:endParaRPr lang="fr-CH" sz="2000" dirty="0"/>
           </a:p>
@@ -14363,13 +14232,6 @@
   <p:clrMapOvr>
     <a:masterClrMapping/>
   </p:clrMapOvr>
-  <p:timing>
-    <p:tnLst>
-      <p:par>
-        <p:cTn id="1" dur="indefinite" restart="never" nodeType="tmRoot"/>
-      </p:par>
-    </p:tnLst>
-  </p:timing>
 </p:sld>
 </file>
 
@@ -14449,10 +14311,9 @@
           <a:lstStyle/>
           <a:p>
             <a:r>
-              <a:rPr lang="fr-CH" sz="2400" b="1" dirty="0" smtClean="0"/>
+              <a:rPr lang="fr-CH" sz="2400" b="1" dirty="0"/>
               <a:t>Aligner les paires</a:t>
             </a:r>
-            <a:endParaRPr lang="fr-CH" sz="2400" b="1" dirty="0"/>
           </a:p>
         </p:txBody>
       </p:sp>
@@ -14485,7 +14346,7 @@
           <a:lstStyle/>
           <a:p>
             <a:r>
-              <a:rPr lang="fr-CH" dirty="0" smtClean="0"/>
+              <a:rPr lang="fr-CH" dirty="0"/>
               <a:t>Aligner les paires selon le type de câble que vous voulez créer.</a:t>
             </a:r>
             <a:endParaRPr lang="fr-CH" sz="2000" dirty="0"/>
@@ -14616,7 +14477,7 @@
           <a:lstStyle/>
           <a:p>
             <a:r>
-              <a:rPr lang="fr-CH" dirty="0" smtClean="0"/>
+              <a:rPr lang="fr-CH" dirty="0"/>
               <a:t>Pour connecter à un switch ou un routeur</a:t>
             </a:r>
             <a:endParaRPr lang="fr-CH" sz="2000" dirty="0"/>
@@ -14652,7 +14513,7 @@
           <a:lstStyle/>
           <a:p>
             <a:r>
-              <a:rPr lang="fr-CH" dirty="0" smtClean="0"/>
+              <a:rPr lang="fr-CH" dirty="0"/>
               <a:t>Pour connecter 2 ordinateurs</a:t>
             </a:r>
             <a:endParaRPr lang="fr-CH" sz="2000" dirty="0"/>
@@ -14669,13 +14530,6 @@
   <p:clrMapOvr>
     <a:masterClrMapping/>
   </p:clrMapOvr>
-  <p:timing>
-    <p:tnLst>
-      <p:par>
-        <p:cTn id="1" dur="indefinite" restart="never" nodeType="tmRoot"/>
-      </p:par>
-    </p:tnLst>
-  </p:timing>
 </p:sld>
 </file>
 
@@ -14755,10 +14609,9 @@
           <a:lstStyle/>
           <a:p>
             <a:r>
-              <a:rPr lang="fr-CH" sz="2400" b="1" dirty="0" smtClean="0"/>
+              <a:rPr lang="fr-CH" sz="2400" b="1" dirty="0"/>
               <a:t>Couper les paires</a:t>
             </a:r>
-            <a:endParaRPr lang="fr-CH" sz="2400" b="1" dirty="0"/>
           </a:p>
         </p:txBody>
       </p:sp>
@@ -14791,7 +14644,7 @@
           <a:lstStyle/>
           <a:p>
             <a:r>
-              <a:rPr lang="fr-CH" dirty="0" smtClean="0"/>
+              <a:rPr lang="fr-CH" dirty="0"/>
               <a:t>Il faut bien aligner et couper droit les paires pour qu’elles touchent toutes les contacts du connecteur</a:t>
             </a:r>
             <a:endParaRPr lang="fr-CH" sz="2000" dirty="0"/>
@@ -14849,13 +14702,6 @@
   <p:clrMapOvr>
     <a:masterClrMapping/>
   </p:clrMapOvr>
-  <p:timing>
-    <p:tnLst>
-      <p:par>
-        <p:cTn id="1" dur="indefinite" restart="never" nodeType="tmRoot"/>
-      </p:par>
-    </p:tnLst>
-  </p:timing>
 </p:sld>
 </file>
 
@@ -14935,10 +14781,9 @@
           <a:lstStyle/>
           <a:p>
             <a:r>
-              <a:rPr lang="fr-CH" sz="2400" b="1" dirty="0" smtClean="0"/>
+              <a:rPr lang="fr-CH" sz="2400" b="1" dirty="0"/>
               <a:t>Insérer les paires dans le connecteur</a:t>
             </a:r>
-            <a:endParaRPr lang="fr-CH" sz="2400" b="1" dirty="0"/>
           </a:p>
         </p:txBody>
       </p:sp>
@@ -14971,7 +14816,7 @@
           <a:lstStyle/>
           <a:p>
             <a:r>
-              <a:rPr lang="fr-CH" dirty="0" smtClean="0"/>
+              <a:rPr lang="fr-CH" dirty="0"/>
               <a:t>Faites attention à garder l’ordre des paires correct !</a:t>
             </a:r>
             <a:endParaRPr lang="fr-CH" sz="2000" dirty="0"/>
@@ -15021,13 +14866,6 @@
   <p:clrMapOvr>
     <a:masterClrMapping/>
   </p:clrMapOvr>
-  <p:timing>
-    <p:tnLst>
-      <p:par>
-        <p:cTn id="1" dur="indefinite" restart="never" nodeType="tmRoot"/>
-      </p:par>
-    </p:tnLst>
-  </p:timing>
 </p:sld>
 </file>
 
@@ -15131,7 +14969,7 @@
         </p:nvGrpSpPr>
         <p:grpSpPr>
           <a:xfrm>
-            <a:off x="1474498" y="2218908"/>
+            <a:off x="3481387" y="2236719"/>
             <a:ext cx="1743075" cy="2081624"/>
             <a:chOff x="1467663" y="1689372"/>
             <a:chExt cx="1743075" cy="2081624"/>
@@ -15222,7 +15060,7 @@
         </p:nvGrpSpPr>
         <p:grpSpPr>
           <a:xfrm>
-            <a:off x="4557882" y="2218908"/>
+            <a:off x="6967538" y="2218908"/>
             <a:ext cx="1743076" cy="2099435"/>
             <a:chOff x="4443527" y="1689372"/>
             <a:chExt cx="1743076" cy="2099435"/>
@@ -15815,10 +15653,9 @@
           <a:lstStyle/>
           <a:p>
             <a:r>
-              <a:rPr lang="fr-CH" sz="2400" b="1" dirty="0" smtClean="0"/>
+              <a:rPr lang="fr-CH" sz="2400" b="1" dirty="0"/>
               <a:t>Sertir</a:t>
             </a:r>
-            <a:endParaRPr lang="fr-CH" sz="2400" b="1" dirty="0"/>
           </a:p>
         </p:txBody>
       </p:sp>
@@ -15851,7 +15688,7 @@
           <a:lstStyle/>
           <a:p>
             <a:r>
-              <a:rPr lang="fr-CH" dirty="0" smtClean="0"/>
+              <a:rPr lang="fr-CH" dirty="0"/>
               <a:t>Placez le connecteur dans la pince et appliquez une pression pour sertir le câble.</a:t>
             </a:r>
             <a:endParaRPr lang="fr-CH" sz="2000" dirty="0"/>
@@ -15922,13 +15759,6 @@
   <p:clrMapOvr>
     <a:masterClrMapping/>
   </p:clrMapOvr>
-  <p:timing>
-    <p:tnLst>
-      <p:par>
-        <p:cTn id="1" dur="indefinite" restart="never" nodeType="tmRoot"/>
-      </p:par>
-    </p:tnLst>
-  </p:timing>
 </p:sld>
 </file>
 
@@ -16008,10 +15838,9 @@
           <a:lstStyle/>
           <a:p>
             <a:r>
-              <a:rPr lang="fr-CH" sz="2400" b="1" dirty="0" smtClean="0"/>
+              <a:rPr lang="fr-CH" sz="2400" b="1" dirty="0"/>
               <a:t>Couvre câble</a:t>
             </a:r>
-            <a:endParaRPr lang="fr-CH" sz="2400" b="1" dirty="0"/>
           </a:p>
         </p:txBody>
       </p:sp>
@@ -16044,7 +15873,7 @@
           <a:lstStyle/>
           <a:p>
             <a:r>
-              <a:rPr lang="fr-CH" dirty="0" smtClean="0"/>
+              <a:rPr lang="fr-CH" dirty="0"/>
               <a:t>Vous pouvez, si vous en disposez, appliquer un couvre câble qui sert à protéger et rend le câble plus joli</a:t>
             </a:r>
             <a:endParaRPr lang="fr-CH" sz="2000" dirty="0"/>
@@ -16091,13 +15920,6 @@
   <p:clrMapOvr>
     <a:masterClrMapping/>
   </p:clrMapOvr>
-  <p:timing>
-    <p:tnLst>
-      <p:par>
-        <p:cTn id="1" dur="indefinite" restart="never" nodeType="tmRoot"/>
-      </p:par>
-    </p:tnLst>
-  </p:timing>
 </p:sld>
 </file>
 
@@ -16197,13 +16019,6 @@
   <p:clrMapOvr>
     <a:masterClrMapping/>
   </p:clrMapOvr>
-  <p:timing>
-    <p:tnLst>
-      <p:par>
-        <p:cTn id="1" dur="indefinite" restart="never" nodeType="tmRoot"/>
-      </p:par>
-    </p:tnLst>
-  </p:timing>
 </p:sld>
 </file>
 
@@ -17210,13 +17025,6 @@
   <p:clrMapOvr>
     <a:masterClrMapping/>
   </p:clrMapOvr>
-  <p:timing>
-    <p:tnLst>
-      <p:par>
-        <p:cTn id="1" dur="indefinite" restart="never" nodeType="tmRoot"/>
-      </p:par>
-    </p:tnLst>
-  </p:timing>
 </p:sld>
 </file>
 

</xml_diff>